<commit_message>
Modifying the diagrams and creating more cross links between VPC patterns
</commit_message>
<xml_diff>
--- a/pattern/large-vpc-for-amazon-ecs-cluster/diagram.pptx
+++ b/pattern/large-vpc-for-amazon-ecs-cluster/diagram.pptx
@@ -259,7 +259,7 @@
           <a:p>
             <a:fld id="{55F0E5CF-1040-4245-9F91-D18CDDA0757F}" type="datetimeFigureOut">
               <a:rPr lang="en-US" smtClean="0"/>
-              <a:t>5/15/23</a:t>
+              <a:t>3/5/24</a:t>
             </a:fld>
             <a:endParaRPr lang="en-US"/>
           </a:p>
@@ -457,7 +457,7 @@
           <a:p>
             <a:fld id="{55F0E5CF-1040-4245-9F91-D18CDDA0757F}" type="datetimeFigureOut">
               <a:rPr lang="en-US" smtClean="0"/>
-              <a:t>5/15/23</a:t>
+              <a:t>3/5/24</a:t>
             </a:fld>
             <a:endParaRPr lang="en-US"/>
           </a:p>
@@ -665,7 +665,7 @@
           <a:p>
             <a:fld id="{55F0E5CF-1040-4245-9F91-D18CDDA0757F}" type="datetimeFigureOut">
               <a:rPr lang="en-US" smtClean="0"/>
-              <a:t>5/15/23</a:t>
+              <a:t>3/5/24</a:t>
             </a:fld>
             <a:endParaRPr lang="en-US"/>
           </a:p>
@@ -863,7 +863,7 @@
           <a:p>
             <a:fld id="{55F0E5CF-1040-4245-9F91-D18CDDA0757F}" type="datetimeFigureOut">
               <a:rPr lang="en-US" smtClean="0"/>
-              <a:t>5/15/23</a:t>
+              <a:t>3/5/24</a:t>
             </a:fld>
             <a:endParaRPr lang="en-US"/>
           </a:p>
@@ -1138,7 +1138,7 @@
           <a:p>
             <a:fld id="{55F0E5CF-1040-4245-9F91-D18CDDA0757F}" type="datetimeFigureOut">
               <a:rPr lang="en-US" smtClean="0"/>
-              <a:t>5/15/23</a:t>
+              <a:t>3/5/24</a:t>
             </a:fld>
             <a:endParaRPr lang="en-US"/>
           </a:p>
@@ -1403,7 +1403,7 @@
           <a:p>
             <a:fld id="{55F0E5CF-1040-4245-9F91-D18CDDA0757F}" type="datetimeFigureOut">
               <a:rPr lang="en-US" smtClean="0"/>
-              <a:t>5/15/23</a:t>
+              <a:t>3/5/24</a:t>
             </a:fld>
             <a:endParaRPr lang="en-US"/>
           </a:p>
@@ -1815,7 +1815,7 @@
           <a:p>
             <a:fld id="{55F0E5CF-1040-4245-9F91-D18CDDA0757F}" type="datetimeFigureOut">
               <a:rPr lang="en-US" smtClean="0"/>
-              <a:t>5/15/23</a:t>
+              <a:t>3/5/24</a:t>
             </a:fld>
             <a:endParaRPr lang="en-US"/>
           </a:p>
@@ -1956,7 +1956,7 @@
           <a:p>
             <a:fld id="{55F0E5CF-1040-4245-9F91-D18CDDA0757F}" type="datetimeFigureOut">
               <a:rPr lang="en-US" smtClean="0"/>
-              <a:t>5/15/23</a:t>
+              <a:t>3/5/24</a:t>
             </a:fld>
             <a:endParaRPr lang="en-US"/>
           </a:p>
@@ -2069,7 +2069,7 @@
           <a:p>
             <a:fld id="{55F0E5CF-1040-4245-9F91-D18CDDA0757F}" type="datetimeFigureOut">
               <a:rPr lang="en-US" smtClean="0"/>
-              <a:t>5/15/23</a:t>
+              <a:t>3/5/24</a:t>
             </a:fld>
             <a:endParaRPr lang="en-US"/>
           </a:p>
@@ -2380,7 +2380,7 @@
           <a:p>
             <a:fld id="{55F0E5CF-1040-4245-9F91-D18CDDA0757F}" type="datetimeFigureOut">
               <a:rPr lang="en-US" smtClean="0"/>
-              <a:t>5/15/23</a:t>
+              <a:t>3/5/24</a:t>
             </a:fld>
             <a:endParaRPr lang="en-US"/>
           </a:p>
@@ -2668,7 +2668,7 @@
           <a:p>
             <a:fld id="{55F0E5CF-1040-4245-9F91-D18CDDA0757F}" type="datetimeFigureOut">
               <a:rPr lang="en-US" smtClean="0"/>
-              <a:t>5/15/23</a:t>
+              <a:t>3/5/24</a:t>
             </a:fld>
             <a:endParaRPr lang="en-US"/>
           </a:p>
@@ -2909,7 +2909,7 @@
           <a:p>
             <a:fld id="{55F0E5CF-1040-4245-9F91-D18CDDA0757F}" type="datetimeFigureOut">
               <a:rPr lang="en-US" smtClean="0"/>
-              <a:t>5/15/23</a:t>
+              <a:t>3/5/24</a:t>
             </a:fld>
             <a:endParaRPr lang="en-US"/>
           </a:p>
@@ -3328,10 +3328,13 @@
       </p:grpSpPr>
       <p:sp>
         <p:nvSpPr>
-          <p:cNvPr id="142" name="Rectangle 141">
-            <a:extLst>
-              <a:ext uri="{FF2B5EF4-FFF2-40B4-BE49-F238E27FC236}">
-                <a16:creationId xmlns:a16="http://schemas.microsoft.com/office/drawing/2014/main" id="{57362C8F-2B5A-0797-76C2-284747B79369}"/>
+          <p:cNvPr id="4" name="Rectangle 3">
+            <a:extLst>
+              <a:ext uri="{FF2B5EF4-FFF2-40B4-BE49-F238E27FC236}">
+                <a16:creationId xmlns:a16="http://schemas.microsoft.com/office/drawing/2014/main" id="{EADBFC82-2672-3946-EFE8-EC5E5460E4B6}"/>
+              </a:ext>
+              <a:ext uri="{C183D7F6-B498-43B3-948B-1728B52AA6E4}">
+                <adec:decorative xmlns:adec="http://schemas.microsoft.com/office/drawing/2017/decorative" val="1"/>
               </a:ext>
             </a:extLst>
           </p:cNvPr>
@@ -3340,22 +3343,18 @@
         </p:nvSpPr>
         <p:spPr>
           <a:xfrm>
-            <a:off x="4787010" y="3767996"/>
-            <a:ext cx="2108215" cy="1237734"/>
+            <a:off x="2687238" y="2861614"/>
+            <a:ext cx="2527461" cy="1688593"/>
           </a:xfrm>
           <a:prstGeom prst="rect">
             <a:avLst/>
           </a:prstGeom>
-          <a:solidFill>
-            <a:schemeClr val="accent6">
-              <a:lumMod val="20000"/>
-              <a:lumOff val="80000"/>
-              <a:alpha val="20000"/>
-            </a:schemeClr>
-          </a:solidFill>
-          <a:ln w="12700">
-            <a:noFill/>
-            <a:prstDash val="dash"/>
+          <a:noFill/>
+          <a:ln w="15875">
+            <a:solidFill>
+              <a:srgbClr val="7AA116"/>
+            </a:solidFill>
+            <a:prstDash val="solid"/>
           </a:ln>
         </p:spPr>
         <p:style>
@@ -3375,467 +3374,47 @@
           </a:fontRef>
         </p:style>
         <p:txBody>
-          <a:bodyPr rot="0" spcFirstLastPara="0" vertOverflow="overflow" horzOverflow="overflow" vert="horz" wrap="square" lIns="338328" tIns="45720" rIns="91440" bIns="45720" numCol="1" spcCol="0" rtlCol="0" fromWordArt="0" anchor="t" anchorCtr="0" forceAA="0" compatLnSpc="1">
-            <a:prstTxWarp prst="textNoShape">
-              <a:avLst/>
-            </a:prstTxWarp>
-            <a:noAutofit/>
-          </a:bodyPr>
-          <a:lstStyle/>
-          <a:p>
-            <a:pPr algn="l"/>
-            <a:endParaRPr lang="en-US" sz="1200" dirty="0">
-              <a:solidFill>
-                <a:schemeClr val="accent6"/>
-              </a:solidFill>
-            </a:endParaRPr>
-          </a:p>
-        </p:txBody>
-      </p:sp>
-      <p:pic>
-        <p:nvPicPr>
-          <p:cNvPr id="144" name="Graphic 143">
-            <a:extLst>
-              <a:ext uri="{FF2B5EF4-FFF2-40B4-BE49-F238E27FC236}">
-                <a16:creationId xmlns:a16="http://schemas.microsoft.com/office/drawing/2014/main" id="{F59EACDC-07FF-3BE1-F1D6-F8259CF14697}"/>
-              </a:ext>
-            </a:extLst>
-          </p:cNvPr>
-          <p:cNvPicPr>
-            <a:picLocks noChangeAspect="1"/>
-          </p:cNvPicPr>
-          <p:nvPr/>
-        </p:nvPicPr>
-        <p:blipFill>
-          <a:blip r:embed="rId2">
-            <a:extLst>
-              <a:ext uri="{96DAC541-7B7A-43D3-8B79-37D633B846F1}">
-                <asvg:svgBlip xmlns:asvg="http://schemas.microsoft.com/office/drawing/2016/SVG/main" r:embed="rId3"/>
-              </a:ext>
-            </a:extLst>
-          </a:blip>
-          <a:stretch>
-            <a:fillRect/>
-          </a:stretch>
-        </p:blipFill>
-        <p:spPr>
-          <a:xfrm>
-            <a:off x="4783802" y="3770547"/>
-            <a:ext cx="381000" cy="381000"/>
-          </a:xfrm>
-          <a:prstGeom prst="rect">
-            <a:avLst/>
-          </a:prstGeom>
-        </p:spPr>
-      </p:pic>
-      <p:sp>
-        <p:nvSpPr>
-          <p:cNvPr id="139" name="Rectangle 138">
-            <a:extLst>
-              <a:ext uri="{FF2B5EF4-FFF2-40B4-BE49-F238E27FC236}">
-                <a16:creationId xmlns:a16="http://schemas.microsoft.com/office/drawing/2014/main" id="{C3E1B924-D36A-CD17-0211-0D89A69B45A1}"/>
-              </a:ext>
-            </a:extLst>
-          </p:cNvPr>
-          <p:cNvSpPr/>
-          <p:nvPr/>
-        </p:nvSpPr>
-        <p:spPr>
-          <a:xfrm>
-            <a:off x="2513328" y="3767996"/>
-            <a:ext cx="2108215" cy="1237734"/>
-          </a:xfrm>
-          <a:prstGeom prst="rect">
-            <a:avLst/>
-          </a:prstGeom>
-          <a:solidFill>
-            <a:schemeClr val="accent6">
-              <a:lumMod val="20000"/>
-              <a:lumOff val="80000"/>
-              <a:alpha val="20000"/>
-            </a:schemeClr>
-          </a:solidFill>
-          <a:ln w="12700">
-            <a:noFill/>
-            <a:prstDash val="dash"/>
-          </a:ln>
-        </p:spPr>
-        <p:style>
-          <a:lnRef idx="2">
-            <a:schemeClr val="accent1">
-              <a:shade val="50000"/>
-            </a:schemeClr>
-          </a:lnRef>
-          <a:fillRef idx="1">
-            <a:schemeClr val="accent1"/>
-          </a:fillRef>
-          <a:effectRef idx="0">
-            <a:schemeClr val="accent1"/>
-          </a:effectRef>
-          <a:fontRef idx="minor">
-            <a:schemeClr val="lt1"/>
-          </a:fontRef>
-        </p:style>
-        <p:txBody>
-          <a:bodyPr rot="0" spcFirstLastPara="0" vertOverflow="overflow" horzOverflow="overflow" vert="horz" wrap="square" lIns="338328" tIns="45720" rIns="91440" bIns="45720" numCol="1" spcCol="0" rtlCol="0" fromWordArt="0" anchor="t" anchorCtr="0" forceAA="0" compatLnSpc="1">
-            <a:prstTxWarp prst="textNoShape">
-              <a:avLst/>
-            </a:prstTxWarp>
-            <a:noAutofit/>
-          </a:bodyPr>
-          <a:lstStyle/>
-          <a:p>
-            <a:pPr algn="l"/>
-            <a:endParaRPr lang="en-US" sz="1200" dirty="0">
-              <a:solidFill>
-                <a:schemeClr val="accent6"/>
-              </a:solidFill>
-            </a:endParaRPr>
-          </a:p>
-        </p:txBody>
-      </p:sp>
-      <p:pic>
-        <p:nvPicPr>
-          <p:cNvPr id="141" name="Graphic 140">
-            <a:extLst>
-              <a:ext uri="{FF2B5EF4-FFF2-40B4-BE49-F238E27FC236}">
-                <a16:creationId xmlns:a16="http://schemas.microsoft.com/office/drawing/2014/main" id="{66EBA29C-1B2E-5CC8-FAE7-BFDD450B335F}"/>
-              </a:ext>
-            </a:extLst>
-          </p:cNvPr>
-          <p:cNvPicPr>
-            <a:picLocks noChangeAspect="1"/>
-          </p:cNvPicPr>
-          <p:nvPr/>
-        </p:nvPicPr>
-        <p:blipFill>
-          <a:blip r:embed="rId2">
-            <a:extLst>
-              <a:ext uri="{96DAC541-7B7A-43D3-8B79-37D633B846F1}">
-                <asvg:svgBlip xmlns:asvg="http://schemas.microsoft.com/office/drawing/2016/SVG/main" r:embed="rId3"/>
-              </a:ext>
-            </a:extLst>
-          </a:blip>
-          <a:stretch>
-            <a:fillRect/>
-          </a:stretch>
-        </p:blipFill>
-        <p:spPr>
-          <a:xfrm>
-            <a:off x="2510120" y="3770547"/>
-            <a:ext cx="381000" cy="381000"/>
-          </a:xfrm>
-          <a:prstGeom prst="rect">
-            <a:avLst/>
-          </a:prstGeom>
-        </p:spPr>
-      </p:pic>
-      <p:sp>
-        <p:nvSpPr>
-          <p:cNvPr id="136" name="Rectangle 135">
-            <a:extLst>
-              <a:ext uri="{FF2B5EF4-FFF2-40B4-BE49-F238E27FC236}">
-                <a16:creationId xmlns:a16="http://schemas.microsoft.com/office/drawing/2014/main" id="{B8E4C2D0-BE3F-6461-B4E8-EA0519B9BC4C}"/>
-              </a:ext>
-            </a:extLst>
-          </p:cNvPr>
-          <p:cNvSpPr/>
-          <p:nvPr/>
-        </p:nvSpPr>
-        <p:spPr>
-          <a:xfrm>
-            <a:off x="4790218" y="2297319"/>
-            <a:ext cx="2108215" cy="1237734"/>
-          </a:xfrm>
-          <a:prstGeom prst="rect">
-            <a:avLst/>
-          </a:prstGeom>
-          <a:solidFill>
-            <a:schemeClr val="accent6">
-              <a:lumMod val="20000"/>
-              <a:lumOff val="80000"/>
-              <a:alpha val="20000"/>
-            </a:schemeClr>
-          </a:solidFill>
-          <a:ln w="12700">
-            <a:noFill/>
-            <a:prstDash val="dash"/>
-          </a:ln>
-        </p:spPr>
-        <p:style>
-          <a:lnRef idx="2">
-            <a:schemeClr val="accent1">
-              <a:shade val="50000"/>
-            </a:schemeClr>
-          </a:lnRef>
-          <a:fillRef idx="1">
-            <a:schemeClr val="accent1"/>
-          </a:fillRef>
-          <a:effectRef idx="0">
-            <a:schemeClr val="accent1"/>
-          </a:effectRef>
-          <a:fontRef idx="minor">
-            <a:schemeClr val="lt1"/>
-          </a:fontRef>
-        </p:style>
-        <p:txBody>
-          <a:bodyPr rot="0" spcFirstLastPara="0" vertOverflow="overflow" horzOverflow="overflow" vert="horz" wrap="square" lIns="338328" tIns="45720" rIns="91440" bIns="45720" numCol="1" spcCol="0" rtlCol="0" fromWordArt="0" anchor="t" anchorCtr="0" forceAA="0" compatLnSpc="1">
-            <a:prstTxWarp prst="textNoShape">
-              <a:avLst/>
-            </a:prstTxWarp>
-            <a:noAutofit/>
-          </a:bodyPr>
-          <a:lstStyle/>
-          <a:p>
-            <a:pPr algn="l"/>
-            <a:endParaRPr lang="en-US" sz="1200" dirty="0">
-              <a:solidFill>
-                <a:schemeClr val="accent6"/>
-              </a:solidFill>
-            </a:endParaRPr>
-          </a:p>
-        </p:txBody>
-      </p:sp>
-      <p:sp>
-        <p:nvSpPr>
-          <p:cNvPr id="137" name="TextBox 136">
-            <a:extLst>
-              <a:ext uri="{FF2B5EF4-FFF2-40B4-BE49-F238E27FC236}">
-                <a16:creationId xmlns:a16="http://schemas.microsoft.com/office/drawing/2014/main" id="{2601AA68-3953-41F7-892E-2572A70594D4}"/>
-              </a:ext>
-            </a:extLst>
-          </p:cNvPr>
-          <p:cNvSpPr txBox="1"/>
-          <p:nvPr/>
-        </p:nvSpPr>
-        <p:spPr>
-          <a:xfrm>
-            <a:off x="5088290" y="2297319"/>
-            <a:ext cx="1323754" cy="276999"/>
-          </a:xfrm>
-          <a:prstGeom prst="rect">
-            <a:avLst/>
-          </a:prstGeom>
-          <a:noFill/>
-        </p:spPr>
-        <p:txBody>
-          <a:bodyPr wrap="square" rtlCol="0">
-            <a:spAutoFit/>
-          </a:bodyPr>
-          <a:lstStyle/>
-          <a:p>
-            <a:pPr marL="91440"/>
+          <a:bodyPr lIns="502920" tIns="91440" bIns="91440" anchor="b" anchorCtr="0"/>
+          <a:lstStyle/>
+          <a:p>
+            <a:pPr eaLnBrk="1" fontAlgn="auto" hangingPunct="1">
+              <a:spcBef>
+                <a:spcPts val="0"/>
+              </a:spcBef>
+              <a:spcAft>
+                <a:spcPts val="0"/>
+              </a:spcAft>
+              <a:defRPr/>
+            </a:pPr>
             <a:r>
               <a:rPr lang="en-US" sz="1200" dirty="0">
-                <a:ln w="0"/>
                 <a:solidFill>
-                  <a:srgbClr val="6CAE3E"/>
+                  <a:schemeClr val="tx1"/>
                 </a:solidFill>
                 <a:latin typeface="Arial" panose="020B0604020202020204" pitchFamily="34" charset="0"/>
                 <a:cs typeface="Arial" panose="020B0604020202020204" pitchFamily="34" charset="0"/>
               </a:rPr>
-              <a:t>Public subnet</a:t>
-            </a:r>
-          </a:p>
-        </p:txBody>
-      </p:sp>
-      <p:pic>
-        <p:nvPicPr>
-          <p:cNvPr id="138" name="Graphic 137">
-            <a:extLst>
-              <a:ext uri="{FF2B5EF4-FFF2-40B4-BE49-F238E27FC236}">
-                <a16:creationId xmlns:a16="http://schemas.microsoft.com/office/drawing/2014/main" id="{FD6B0914-2899-50B6-5366-EB97375D19CB}"/>
-              </a:ext>
-            </a:extLst>
-          </p:cNvPr>
-          <p:cNvPicPr>
-            <a:picLocks noChangeAspect="1"/>
-          </p:cNvPicPr>
+              <a:t>Private subnet</a:t>
+            </a:r>
+          </a:p>
+        </p:txBody>
+      </p:sp>
+      <p:sp>
+        <p:nvSpPr>
+          <p:cNvPr id="8" name="Rectangle 7">
+            <a:extLst>
+              <a:ext uri="{FF2B5EF4-FFF2-40B4-BE49-F238E27FC236}">
+                <a16:creationId xmlns:a16="http://schemas.microsoft.com/office/drawing/2014/main" id="{D52CE59D-A7E2-F341-BBD2-2234BA19F1B8}"/>
+              </a:ext>
+            </a:extLst>
+          </p:cNvPr>
+          <p:cNvSpPr/>
           <p:nvPr/>
-        </p:nvPicPr>
-        <p:blipFill>
-          <a:blip r:embed="rId2">
-            <a:extLst>
-              <a:ext uri="{96DAC541-7B7A-43D3-8B79-37D633B846F1}">
-                <asvg:svgBlip xmlns:asvg="http://schemas.microsoft.com/office/drawing/2016/SVG/main" r:embed="rId3"/>
-              </a:ext>
-            </a:extLst>
-          </a:blip>
-          <a:stretch>
-            <a:fillRect/>
-          </a:stretch>
-        </p:blipFill>
+        </p:nvSpPr>
         <p:spPr>
           <a:xfrm>
-            <a:off x="4787010" y="2299870"/>
-            <a:ext cx="381000" cy="381000"/>
-          </a:xfrm>
-          <a:prstGeom prst="rect">
-            <a:avLst/>
-          </a:prstGeom>
-        </p:spPr>
-      </p:pic>
-      <p:sp>
-        <p:nvSpPr>
-          <p:cNvPr id="133" name="Rectangle 132">
-            <a:extLst>
-              <a:ext uri="{FF2B5EF4-FFF2-40B4-BE49-F238E27FC236}">
-                <a16:creationId xmlns:a16="http://schemas.microsoft.com/office/drawing/2014/main" id="{8BEBC90F-F3B4-90DA-D92B-76042B96FAAA}"/>
-              </a:ext>
-            </a:extLst>
-          </p:cNvPr>
-          <p:cNvSpPr/>
-          <p:nvPr/>
-        </p:nvSpPr>
-        <p:spPr>
-          <a:xfrm>
-            <a:off x="2513328" y="2297319"/>
-            <a:ext cx="2108215" cy="1237734"/>
-          </a:xfrm>
-          <a:prstGeom prst="rect">
-            <a:avLst/>
-          </a:prstGeom>
-          <a:solidFill>
-            <a:schemeClr val="accent6">
-              <a:lumMod val="20000"/>
-              <a:lumOff val="80000"/>
-              <a:alpha val="20000"/>
-            </a:schemeClr>
-          </a:solidFill>
-          <a:ln w="12700">
-            <a:noFill/>
-            <a:prstDash val="dash"/>
-          </a:ln>
-        </p:spPr>
-        <p:style>
-          <a:lnRef idx="2">
-            <a:schemeClr val="accent1">
-              <a:shade val="50000"/>
-            </a:schemeClr>
-          </a:lnRef>
-          <a:fillRef idx="1">
-            <a:schemeClr val="accent1"/>
-          </a:fillRef>
-          <a:effectRef idx="0">
-            <a:schemeClr val="accent1"/>
-          </a:effectRef>
-          <a:fontRef idx="minor">
-            <a:schemeClr val="lt1"/>
-          </a:fontRef>
-        </p:style>
-        <p:txBody>
-          <a:bodyPr rot="0" spcFirstLastPara="0" vertOverflow="overflow" horzOverflow="overflow" vert="horz" wrap="square" lIns="338328" tIns="45720" rIns="91440" bIns="45720" numCol="1" spcCol="0" rtlCol="0" fromWordArt="0" anchor="t" anchorCtr="0" forceAA="0" compatLnSpc="1">
-            <a:prstTxWarp prst="textNoShape">
-              <a:avLst/>
-            </a:prstTxWarp>
-            <a:noAutofit/>
-          </a:bodyPr>
-          <a:lstStyle/>
-          <a:p>
-            <a:pPr algn="l"/>
-            <a:endParaRPr lang="en-US" sz="1200" dirty="0">
-              <a:solidFill>
-                <a:schemeClr val="accent6"/>
-              </a:solidFill>
-            </a:endParaRPr>
-          </a:p>
-        </p:txBody>
-      </p:sp>
-      <p:sp>
-        <p:nvSpPr>
-          <p:cNvPr id="134" name="TextBox 133">
-            <a:extLst>
-              <a:ext uri="{FF2B5EF4-FFF2-40B4-BE49-F238E27FC236}">
-                <a16:creationId xmlns:a16="http://schemas.microsoft.com/office/drawing/2014/main" id="{1AF1F1A6-5DCB-EFA9-B306-C16CF5EFFBCE}"/>
-              </a:ext>
-            </a:extLst>
-          </p:cNvPr>
-          <p:cNvSpPr txBox="1"/>
-          <p:nvPr/>
-        </p:nvSpPr>
-        <p:spPr>
-          <a:xfrm>
-            <a:off x="2811400" y="2297319"/>
-            <a:ext cx="1323754" cy="276999"/>
-          </a:xfrm>
-          <a:prstGeom prst="rect">
-            <a:avLst/>
-          </a:prstGeom>
-          <a:noFill/>
-        </p:spPr>
-        <p:txBody>
-          <a:bodyPr wrap="square" rtlCol="0">
-            <a:spAutoFit/>
-          </a:bodyPr>
-          <a:lstStyle/>
-          <a:p>
-            <a:pPr marL="91440"/>
-            <a:r>
-              <a:rPr lang="en-US" sz="1200" dirty="0">
-                <a:ln w="0"/>
-                <a:solidFill>
-                  <a:srgbClr val="6CAE3E"/>
-                </a:solidFill>
-                <a:latin typeface="Arial" panose="020B0604020202020204" pitchFamily="34" charset="0"/>
-                <a:cs typeface="Arial" panose="020B0604020202020204" pitchFamily="34" charset="0"/>
-              </a:rPr>
-              <a:t>Public subnet</a:t>
-            </a:r>
-          </a:p>
-        </p:txBody>
-      </p:sp>
-      <p:pic>
-        <p:nvPicPr>
-          <p:cNvPr id="135" name="Graphic 134">
-            <a:extLst>
-              <a:ext uri="{FF2B5EF4-FFF2-40B4-BE49-F238E27FC236}">
-                <a16:creationId xmlns:a16="http://schemas.microsoft.com/office/drawing/2014/main" id="{7ADCF5B0-3A56-5762-76B8-D0731EAFC8EA}"/>
-              </a:ext>
-            </a:extLst>
-          </p:cNvPr>
-          <p:cNvPicPr>
-            <a:picLocks noChangeAspect="1"/>
-          </p:cNvPicPr>
-          <p:nvPr/>
-        </p:nvPicPr>
-        <p:blipFill>
-          <a:blip r:embed="rId2">
-            <a:extLst>
-              <a:ext uri="{96DAC541-7B7A-43D3-8B79-37D633B846F1}">
-                <asvg:svgBlip xmlns:asvg="http://schemas.microsoft.com/office/drawing/2016/SVG/main" r:embed="rId3"/>
-              </a:ext>
-            </a:extLst>
-          </a:blip>
-          <a:stretch>
-            <a:fillRect/>
-          </a:stretch>
-        </p:blipFill>
-        <p:spPr>
-          <a:xfrm>
-            <a:off x="2510120" y="2299870"/>
-            <a:ext cx="381000" cy="381000"/>
-          </a:xfrm>
-          <a:prstGeom prst="rect">
-            <a:avLst/>
-          </a:prstGeom>
-        </p:spPr>
-      </p:pic>
-      <p:sp>
-        <p:nvSpPr>
-          <p:cNvPr id="107" name="Rectangle 106">
-            <a:extLst>
-              <a:ext uri="{FF2B5EF4-FFF2-40B4-BE49-F238E27FC236}">
-                <a16:creationId xmlns:a16="http://schemas.microsoft.com/office/drawing/2014/main" id="{07D95CAB-A2AE-1B0A-2B31-EF4A1CD4AE6E}"/>
-              </a:ext>
-            </a:extLst>
-          </p:cNvPr>
-          <p:cNvSpPr/>
-          <p:nvPr/>
-        </p:nvSpPr>
-        <p:spPr>
-          <a:xfrm>
-            <a:off x="969888" y="1834743"/>
-            <a:ext cx="6235309" cy="3302866"/>
+            <a:off x="1025144" y="540512"/>
+            <a:ext cx="7326376" cy="4385056"/>
           </a:xfrm>
           <a:prstGeom prst="rect">
             <a:avLst/>
@@ -3843,7 +3422,7 @@
           <a:noFill/>
           <a:ln w="12700">
             <a:solidFill>
-              <a:schemeClr val="accent6"/>
+              <a:srgbClr val="8C4EFF"/>
             </a:solidFill>
           </a:ln>
         </p:spPr>
@@ -3864,7 +3443,7 @@
           </a:fontRef>
         </p:style>
         <p:txBody>
-          <a:bodyPr rot="0" spcFirstLastPara="0" vertOverflow="overflow" horzOverflow="overflow" vert="horz" wrap="square" lIns="457200" tIns="91440" rIns="91440" bIns="45720" numCol="1" spcCol="0" rtlCol="0" fromWordArt="0" anchor="t" anchorCtr="0" forceAA="0" compatLnSpc="1">
+          <a:bodyPr rot="0" spcFirstLastPara="0" vertOverflow="overflow" horzOverflow="overflow" vert="horz" wrap="square" lIns="365760" tIns="91440" rIns="91440" bIns="45720" numCol="1" spcCol="0" rtlCol="0" fromWordArt="0" anchor="t" anchorCtr="0" forceAA="0" compatLnSpc="1">
             <a:prstTxWarp prst="textNoShape">
               <a:avLst/>
             </a:prstTxWarp>
@@ -3887,12 +3466,88 @@
           </a:p>
         </p:txBody>
       </p:sp>
-      <p:sp>
-        <p:nvSpPr>
-          <p:cNvPr id="109" name="Rectangle 108">
-            <a:extLst>
-              <a:ext uri="{FF2B5EF4-FFF2-40B4-BE49-F238E27FC236}">
-                <a16:creationId xmlns:a16="http://schemas.microsoft.com/office/drawing/2014/main" id="{9FBEB06F-2278-832E-B82B-719A27638781}"/>
+      <p:pic>
+        <p:nvPicPr>
+          <p:cNvPr id="15" name="Graphic 14" descr="VPC group icon. ">
+            <a:extLst>
+              <a:ext uri="{FF2B5EF4-FFF2-40B4-BE49-F238E27FC236}">
+                <a16:creationId xmlns:a16="http://schemas.microsoft.com/office/drawing/2014/main" id="{07874CE3-0EB1-AF7A-FED9-A70C549E3CDC}"/>
+              </a:ext>
+            </a:extLst>
+          </p:cNvPr>
+          <p:cNvPicPr>
+            <a:picLocks noChangeAspect="1"/>
+          </p:cNvPicPr>
+          <p:nvPr/>
+        </p:nvPicPr>
+        <p:blipFill>
+          <a:blip r:embed="rId2">
+            <a:extLst>
+              <a:ext uri="{96DAC541-7B7A-43D3-8B79-37D633B846F1}">
+                <asvg:svgBlip xmlns:asvg="http://schemas.microsoft.com/office/drawing/2016/SVG/main" r:embed="rId3"/>
+              </a:ext>
+            </a:extLst>
+          </a:blip>
+          <a:srcRect/>
+          <a:stretch/>
+        </p:blipFill>
+        <p:spPr>
+          <a:xfrm>
+            <a:off x="1022265" y="538396"/>
+            <a:ext cx="338509" cy="338509"/>
+          </a:xfrm>
+          <a:prstGeom prst="rect">
+            <a:avLst/>
+          </a:prstGeom>
+        </p:spPr>
+      </p:pic>
+      <p:pic>
+        <p:nvPicPr>
+          <p:cNvPr id="16" name="Graphic 15">
+            <a:extLst>
+              <a:ext uri="{FF2B5EF4-FFF2-40B4-BE49-F238E27FC236}">
+                <a16:creationId xmlns:a16="http://schemas.microsoft.com/office/drawing/2014/main" id="{17D29FB9-5AE8-D63A-4D3D-1AE702CFB3B0}"/>
+              </a:ext>
+              <a:ext uri="{C183D7F6-B498-43B3-948B-1728B52AA6E4}">
+                <adec:decorative xmlns:adec="http://schemas.microsoft.com/office/drawing/2017/decorative" val="1"/>
+              </a:ext>
+            </a:extLst>
+          </p:cNvPr>
+          <p:cNvPicPr>
+            <a:picLocks noChangeAspect="1"/>
+          </p:cNvPicPr>
+          <p:nvPr/>
+        </p:nvPicPr>
+        <p:blipFill>
+          <a:blip r:embed="rId4">
+            <a:extLst>
+              <a:ext uri="{96DAC541-7B7A-43D3-8B79-37D633B846F1}">
+                <asvg:svgBlip xmlns:asvg="http://schemas.microsoft.com/office/drawing/2016/SVG/main" r:embed="rId5"/>
+              </a:ext>
+            </a:extLst>
+          </a:blip>
+          <a:srcRect/>
+          <a:stretch/>
+        </p:blipFill>
+        <p:spPr>
+          <a:xfrm>
+            <a:off x="2687238" y="4211699"/>
+            <a:ext cx="338509" cy="338509"/>
+          </a:xfrm>
+          <a:prstGeom prst="rect">
+            <a:avLst/>
+          </a:prstGeom>
+        </p:spPr>
+      </p:pic>
+      <p:sp>
+        <p:nvSpPr>
+          <p:cNvPr id="25" name="Rectangle 24">
+            <a:extLst>
+              <a:ext uri="{FF2B5EF4-FFF2-40B4-BE49-F238E27FC236}">
+                <a16:creationId xmlns:a16="http://schemas.microsoft.com/office/drawing/2014/main" id="{B9D00082-7FBA-376F-486B-58E26AAE4726}"/>
+              </a:ext>
+              <a:ext uri="{C183D7F6-B498-43B3-948B-1728B52AA6E4}">
+                <adec:decorative xmlns:adec="http://schemas.microsoft.com/office/drawing/2017/decorative" val="1"/>
               </a:ext>
             </a:extLst>
           </p:cNvPr>
@@ -3901,18 +3556,18 @@
         </p:nvSpPr>
         <p:spPr>
           <a:xfrm>
-            <a:off x="2473326" y="1449005"/>
-            <a:ext cx="2187552" cy="3891076"/>
+            <a:off x="5497707" y="2861614"/>
+            <a:ext cx="2527461" cy="1688594"/>
           </a:xfrm>
           <a:prstGeom prst="rect">
             <a:avLst/>
           </a:prstGeom>
           <a:noFill/>
-          <a:ln w="12700">
+          <a:ln w="15875">
             <a:solidFill>
-              <a:srgbClr val="00A0C8"/>
+              <a:srgbClr val="7AA116"/>
             </a:solidFill>
-            <a:prstDash val="dash"/>
+            <a:prstDash val="solid"/>
           </a:ln>
         </p:spPr>
         <p:style>
@@ -3932,15 +3587,18 @@
           </a:fontRef>
         </p:style>
         <p:txBody>
-          <a:bodyPr rot="0" spcFirstLastPara="0" vertOverflow="overflow" horzOverflow="overflow" vert="horz" wrap="square" lIns="91440" tIns="91440" rIns="91440" bIns="45720" numCol="1" spcCol="0" rtlCol="0" fromWordArt="0" anchor="t" anchorCtr="0" forceAA="0" compatLnSpc="1">
-            <a:prstTxWarp prst="textNoShape">
-              <a:avLst/>
-            </a:prstTxWarp>
-            <a:noAutofit/>
-          </a:bodyPr>
-          <a:lstStyle/>
-          <a:p>
-            <a:pPr algn="ctr"/>
+          <a:bodyPr lIns="502920" tIns="91440" bIns="91440" anchor="b" anchorCtr="0"/>
+          <a:lstStyle/>
+          <a:p>
+            <a:pPr eaLnBrk="1" fontAlgn="auto" hangingPunct="1">
+              <a:spcBef>
+                <a:spcPts val="0"/>
+              </a:spcBef>
+              <a:spcAft>
+                <a:spcPts val="0"/>
+              </a:spcAft>
+              <a:defRPr/>
+            </a:pPr>
             <a:r>
               <a:rPr lang="en-US" sz="1200" dirty="0">
                 <a:solidFill>
@@ -3949,17 +3607,58 @@
                 <a:latin typeface="Arial" panose="020B0604020202020204" pitchFamily="34" charset="0"/>
                 <a:cs typeface="Arial" panose="020B0604020202020204" pitchFamily="34" charset="0"/>
               </a:rPr>
-              <a:t>Availability Zone 1</a:t>
-            </a:r>
-          </a:p>
-        </p:txBody>
-      </p:sp>
-      <p:sp>
-        <p:nvSpPr>
-          <p:cNvPr id="111" name="Rectangle 110">
-            <a:extLst>
-              <a:ext uri="{FF2B5EF4-FFF2-40B4-BE49-F238E27FC236}">
-                <a16:creationId xmlns:a16="http://schemas.microsoft.com/office/drawing/2014/main" id="{9115605B-2BDF-E13C-3BA9-311F56CF20E3}"/>
+              <a:t>Private subnet</a:t>
+            </a:r>
+          </a:p>
+        </p:txBody>
+      </p:sp>
+      <p:pic>
+        <p:nvPicPr>
+          <p:cNvPr id="26" name="Graphic 25">
+            <a:extLst>
+              <a:ext uri="{FF2B5EF4-FFF2-40B4-BE49-F238E27FC236}">
+                <a16:creationId xmlns:a16="http://schemas.microsoft.com/office/drawing/2014/main" id="{52E09478-3E56-80D2-9A51-295F3279C50B}"/>
+              </a:ext>
+              <a:ext uri="{C183D7F6-B498-43B3-948B-1728B52AA6E4}">
+                <adec:decorative xmlns:adec="http://schemas.microsoft.com/office/drawing/2017/decorative" val="1"/>
+              </a:ext>
+            </a:extLst>
+          </p:cNvPr>
+          <p:cNvPicPr>
+            <a:picLocks noChangeAspect="1"/>
+          </p:cNvPicPr>
+          <p:nvPr/>
+        </p:nvPicPr>
+        <p:blipFill>
+          <a:blip r:embed="rId4">
+            <a:extLst>
+              <a:ext uri="{96DAC541-7B7A-43D3-8B79-37D633B846F1}">
+                <asvg:svgBlip xmlns:asvg="http://schemas.microsoft.com/office/drawing/2016/SVG/main" r:embed="rId5"/>
+              </a:ext>
+            </a:extLst>
+          </a:blip>
+          <a:srcRect/>
+          <a:stretch/>
+        </p:blipFill>
+        <p:spPr>
+          <a:xfrm>
+            <a:off x="5497707" y="4211699"/>
+            <a:ext cx="338509" cy="338509"/>
+          </a:xfrm>
+          <a:prstGeom prst="rect">
+            <a:avLst/>
+          </a:prstGeom>
+        </p:spPr>
+      </p:pic>
+      <p:sp>
+        <p:nvSpPr>
+          <p:cNvPr id="27" name="Rectangle 26">
+            <a:extLst>
+              <a:ext uri="{FF2B5EF4-FFF2-40B4-BE49-F238E27FC236}">
+                <a16:creationId xmlns:a16="http://schemas.microsoft.com/office/drawing/2014/main" id="{C3550C67-7FB1-663F-2ADF-517B85F0B52D}"/>
+              </a:ext>
+              <a:ext uri="{C183D7F6-B498-43B3-948B-1728B52AA6E4}">
+                <adec:decorative xmlns:adec="http://schemas.microsoft.com/office/drawing/2017/decorative" val="1"/>
               </a:ext>
             </a:extLst>
           </p:cNvPr>
@@ -3968,18 +3667,18 @@
         </p:nvSpPr>
         <p:spPr>
           <a:xfrm>
-            <a:off x="4752508" y="1449005"/>
-            <a:ext cx="2187552" cy="3891076"/>
+            <a:off x="2687238" y="876905"/>
+            <a:ext cx="2527461" cy="1688593"/>
           </a:xfrm>
           <a:prstGeom prst="rect">
             <a:avLst/>
           </a:prstGeom>
           <a:noFill/>
-          <a:ln w="12700">
+          <a:ln w="15875">
             <a:solidFill>
-              <a:srgbClr val="00A0C8"/>
+              <a:srgbClr val="7AA116"/>
             </a:solidFill>
-            <a:prstDash val="dash"/>
+            <a:prstDash val="solid"/>
           </a:ln>
         </p:spPr>
         <p:style>
@@ -3999,15 +3698,18 @@
           </a:fontRef>
         </p:style>
         <p:txBody>
-          <a:bodyPr rot="0" spcFirstLastPara="0" vertOverflow="overflow" horzOverflow="overflow" vert="horz" wrap="square" lIns="91440" tIns="91440" rIns="91440" bIns="45720" numCol="1" spcCol="0" rtlCol="0" fromWordArt="0" anchor="t" anchorCtr="0" forceAA="0" compatLnSpc="1">
-            <a:prstTxWarp prst="textNoShape">
-              <a:avLst/>
-            </a:prstTxWarp>
-            <a:noAutofit/>
-          </a:bodyPr>
-          <a:lstStyle/>
-          <a:p>
-            <a:pPr algn="ctr"/>
+          <a:bodyPr lIns="502920" tIns="91440" bIns="91440" anchor="t" anchorCtr="0"/>
+          <a:lstStyle/>
+          <a:p>
+            <a:pPr eaLnBrk="1" fontAlgn="auto" hangingPunct="1">
+              <a:spcBef>
+                <a:spcPts val="0"/>
+              </a:spcBef>
+              <a:spcAft>
+                <a:spcPts val="0"/>
+              </a:spcAft>
+              <a:defRPr/>
+            </a:pPr>
             <a:r>
               <a:rPr lang="en-US" sz="1200" dirty="0">
                 <a:solidFill>
@@ -4016,95 +3718,20 @@
                 <a:latin typeface="Arial" panose="020B0604020202020204" pitchFamily="34" charset="0"/>
                 <a:cs typeface="Arial" panose="020B0604020202020204" pitchFamily="34" charset="0"/>
               </a:rPr>
-              <a:t>Availability Zone 2</a:t>
-            </a:r>
-          </a:p>
-        </p:txBody>
-      </p:sp>
-      <p:sp>
-        <p:nvSpPr>
-          <p:cNvPr id="113" name="TextBox 112">
-            <a:extLst>
-              <a:ext uri="{FF2B5EF4-FFF2-40B4-BE49-F238E27FC236}">
-                <a16:creationId xmlns:a16="http://schemas.microsoft.com/office/drawing/2014/main" id="{D8C8D73C-046C-10ED-CED9-63AF69CB673C}"/>
-              </a:ext>
-            </a:extLst>
-          </p:cNvPr>
-          <p:cNvSpPr txBox="1"/>
-          <p:nvPr/>
-        </p:nvSpPr>
-        <p:spPr>
-          <a:xfrm>
-            <a:off x="2678413" y="3120649"/>
-            <a:ext cx="1778046" cy="261610"/>
-          </a:xfrm>
-          <a:prstGeom prst="rect">
-            <a:avLst/>
-          </a:prstGeom>
-          <a:noFill/>
-        </p:spPr>
-        <p:txBody>
-          <a:bodyPr wrap="square" rtlCol="0">
-            <a:spAutoFit/>
-          </a:bodyPr>
-          <a:lstStyle/>
-          <a:p>
-            <a:pPr algn="ctr"/>
-            <a:r>
-              <a:rPr lang="en-US" sz="1100" dirty="0">
-                <a:latin typeface="Arial" panose="020B0604020202020204" pitchFamily="34" charset="0"/>
-                <a:cs typeface="Arial" panose="020B0604020202020204" pitchFamily="34" charset="0"/>
-              </a:rPr>
-              <a:t>NAT gateway</a:t>
-            </a:r>
-          </a:p>
-        </p:txBody>
-      </p:sp>
-      <p:sp>
-        <p:nvSpPr>
-          <p:cNvPr id="114" name="TextBox 113">
-            <a:extLst>
-              <a:ext uri="{FF2B5EF4-FFF2-40B4-BE49-F238E27FC236}">
-                <a16:creationId xmlns:a16="http://schemas.microsoft.com/office/drawing/2014/main" id="{FE76BB8D-F97F-DD4D-E86D-BA57C802F302}"/>
-              </a:ext>
-            </a:extLst>
-          </p:cNvPr>
-          <p:cNvSpPr txBox="1"/>
-          <p:nvPr/>
-        </p:nvSpPr>
-        <p:spPr>
-          <a:xfrm>
-            <a:off x="4997463" y="3120649"/>
-            <a:ext cx="1778046" cy="261610"/>
-          </a:xfrm>
-          <a:prstGeom prst="rect">
-            <a:avLst/>
-          </a:prstGeom>
-          <a:noFill/>
-        </p:spPr>
-        <p:txBody>
-          <a:bodyPr wrap="square" rtlCol="0">
-            <a:spAutoFit/>
-          </a:bodyPr>
-          <a:lstStyle/>
-          <a:p>
-            <a:pPr algn="ctr"/>
-            <a:r>
-              <a:rPr lang="en-US" sz="1100" dirty="0">
-                <a:latin typeface="Arial" panose="020B0604020202020204" pitchFamily="34" charset="0"/>
-                <a:cs typeface="Arial" panose="020B0604020202020204" pitchFamily="34" charset="0"/>
-              </a:rPr>
-              <a:t>NAT gateway</a:t>
+              <a:t>Public subnet</a:t>
             </a:r>
           </a:p>
         </p:txBody>
       </p:sp>
       <p:pic>
         <p:nvPicPr>
-          <p:cNvPr id="128" name="Graphic 127">
-            <a:extLst>
-              <a:ext uri="{FF2B5EF4-FFF2-40B4-BE49-F238E27FC236}">
-                <a16:creationId xmlns:a16="http://schemas.microsoft.com/office/drawing/2014/main" id="{727CFEAF-F392-E671-D5E0-159672329E9E}"/>
+          <p:cNvPr id="28" name="Graphic 27">
+            <a:extLst>
+              <a:ext uri="{FF2B5EF4-FFF2-40B4-BE49-F238E27FC236}">
+                <a16:creationId xmlns:a16="http://schemas.microsoft.com/office/drawing/2014/main" id="{61F805BC-B033-4F7B-8797-998FFA33B4AD}"/>
+              </a:ext>
+              <a:ext uri="{C183D7F6-B498-43B3-948B-1728B52AA6E4}">
+                <adec:decorative xmlns:adec="http://schemas.microsoft.com/office/drawing/2017/decorative" val="1"/>
               </a:ext>
             </a:extLst>
           </p:cNvPr>
@@ -4121,14 +3748,400 @@
               </a:ext>
             </a:extLst>
           </a:blip>
+          <a:srcRect/>
+          <a:stretch/>
+        </p:blipFill>
+        <p:spPr>
+          <a:xfrm>
+            <a:off x="2687238" y="876904"/>
+            <a:ext cx="338509" cy="338509"/>
+          </a:xfrm>
+          <a:prstGeom prst="rect">
+            <a:avLst/>
+          </a:prstGeom>
+        </p:spPr>
+      </p:pic>
+      <p:sp>
+        <p:nvSpPr>
+          <p:cNvPr id="29" name="Rectangle 28">
+            <a:extLst>
+              <a:ext uri="{FF2B5EF4-FFF2-40B4-BE49-F238E27FC236}">
+                <a16:creationId xmlns:a16="http://schemas.microsoft.com/office/drawing/2014/main" id="{2B47B207-4C03-8DE3-B6EF-B71A9468E20C}"/>
+              </a:ext>
+              <a:ext uri="{C183D7F6-B498-43B3-948B-1728B52AA6E4}">
+                <adec:decorative xmlns:adec="http://schemas.microsoft.com/office/drawing/2017/decorative" val="1"/>
+              </a:ext>
+            </a:extLst>
+          </p:cNvPr>
+          <p:cNvSpPr/>
+          <p:nvPr/>
+        </p:nvSpPr>
+        <p:spPr>
+          <a:xfrm>
+            <a:off x="5497707" y="876905"/>
+            <a:ext cx="2527461" cy="1688594"/>
+          </a:xfrm>
+          <a:prstGeom prst="rect">
+            <a:avLst/>
+          </a:prstGeom>
+          <a:noFill/>
+          <a:ln w="15875">
+            <a:solidFill>
+              <a:srgbClr val="7AA116"/>
+            </a:solidFill>
+            <a:prstDash val="solid"/>
+          </a:ln>
+        </p:spPr>
+        <p:style>
+          <a:lnRef idx="2">
+            <a:schemeClr val="accent1">
+              <a:shade val="50000"/>
+            </a:schemeClr>
+          </a:lnRef>
+          <a:fillRef idx="1">
+            <a:schemeClr val="accent1"/>
+          </a:fillRef>
+          <a:effectRef idx="0">
+            <a:schemeClr val="accent1"/>
+          </a:effectRef>
+          <a:fontRef idx="minor">
+            <a:schemeClr val="lt1"/>
+          </a:fontRef>
+        </p:style>
+        <p:txBody>
+          <a:bodyPr lIns="502920" tIns="91440" bIns="91440" anchor="t" anchorCtr="0"/>
+          <a:lstStyle/>
+          <a:p>
+            <a:pPr eaLnBrk="1" fontAlgn="auto" hangingPunct="1">
+              <a:spcBef>
+                <a:spcPts val="0"/>
+              </a:spcBef>
+              <a:spcAft>
+                <a:spcPts val="0"/>
+              </a:spcAft>
+              <a:defRPr/>
+            </a:pPr>
+            <a:r>
+              <a:rPr lang="en-US" sz="1200" dirty="0">
+                <a:solidFill>
+                  <a:schemeClr val="tx1"/>
+                </a:solidFill>
+                <a:latin typeface="Arial" panose="020B0604020202020204" pitchFamily="34" charset="0"/>
+                <a:cs typeface="Arial" panose="020B0604020202020204" pitchFamily="34" charset="0"/>
+              </a:rPr>
+              <a:t>Public subnet</a:t>
+            </a:r>
+          </a:p>
+        </p:txBody>
+      </p:sp>
+      <p:pic>
+        <p:nvPicPr>
+          <p:cNvPr id="30" name="Graphic 29">
+            <a:extLst>
+              <a:ext uri="{FF2B5EF4-FFF2-40B4-BE49-F238E27FC236}">
+                <a16:creationId xmlns:a16="http://schemas.microsoft.com/office/drawing/2014/main" id="{9A936BCD-8AD1-87BA-35DD-1BDA73BDD386}"/>
+              </a:ext>
+              <a:ext uri="{C183D7F6-B498-43B3-948B-1728B52AA6E4}">
+                <adec:decorative xmlns:adec="http://schemas.microsoft.com/office/drawing/2017/decorative" val="1"/>
+              </a:ext>
+            </a:extLst>
+          </p:cNvPr>
+          <p:cNvPicPr>
+            <a:picLocks noChangeAspect="1"/>
+          </p:cNvPicPr>
+          <p:nvPr/>
+        </p:nvPicPr>
+        <p:blipFill>
+          <a:blip r:embed="rId4">
+            <a:extLst>
+              <a:ext uri="{96DAC541-7B7A-43D3-8B79-37D633B846F1}">
+                <asvg:svgBlip xmlns:asvg="http://schemas.microsoft.com/office/drawing/2016/SVG/main" r:embed="rId5"/>
+              </a:ext>
+            </a:extLst>
+          </a:blip>
+          <a:srcRect/>
+          <a:stretch/>
+        </p:blipFill>
+        <p:spPr>
+          <a:xfrm>
+            <a:off x="5497707" y="876904"/>
+            <a:ext cx="338509" cy="338509"/>
+          </a:xfrm>
+          <a:prstGeom prst="rect">
+            <a:avLst/>
+          </a:prstGeom>
+        </p:spPr>
+      </p:pic>
+      <p:grpSp>
+        <p:nvGrpSpPr>
+          <p:cNvPr id="31" name="Group 30" descr="Internet gateway service icon on VPC container.">
+            <a:extLst>
+              <a:ext uri="{FF2B5EF4-FFF2-40B4-BE49-F238E27FC236}">
+                <a16:creationId xmlns:a16="http://schemas.microsoft.com/office/drawing/2014/main" id="{E36BC032-66B2-B519-7A9F-4422810D3B79}"/>
+              </a:ext>
+            </a:extLst>
+          </p:cNvPr>
+          <p:cNvGrpSpPr/>
+          <p:nvPr/>
+        </p:nvGrpSpPr>
+        <p:grpSpPr>
+          <a:xfrm>
+            <a:off x="1178900" y="1492602"/>
+            <a:ext cx="1403350" cy="733255"/>
+            <a:chOff x="7325969" y="1855841"/>
+            <a:chExt cx="1403350" cy="733255"/>
+          </a:xfrm>
+        </p:grpSpPr>
+        <p:pic>
+          <p:nvPicPr>
+            <p:cNvPr id="32" name="Graphic 10" descr="Internet gateway resource icon for the Amazon VPC service.">
+              <a:extLst>
+                <a:ext uri="{FF2B5EF4-FFF2-40B4-BE49-F238E27FC236}">
+                  <a16:creationId xmlns:a16="http://schemas.microsoft.com/office/drawing/2014/main" id="{56E3FA56-F1DB-983F-F217-2277AB897C50}"/>
+                </a:ext>
+              </a:extLst>
+            </p:cNvPr>
+            <p:cNvPicPr>
+              <a:picLocks noChangeAspect="1" noChangeArrowheads="1"/>
+            </p:cNvPicPr>
+            <p:nvPr/>
+          </p:nvPicPr>
+          <p:blipFill>
+            <a:blip r:embed="rId6">
+              <a:extLst>
+                <a:ext uri="{96DAC541-7B7A-43D3-8B79-37D633B846F1}">
+                  <asvg:svgBlip xmlns:asvg="http://schemas.microsoft.com/office/drawing/2016/SVG/main" r:embed="rId7"/>
+                </a:ext>
+              </a:extLst>
+            </a:blip>
+            <a:srcRect/>
+            <a:stretch/>
+          </p:blipFill>
+          <p:spPr bwMode="auto">
+            <a:xfrm>
+              <a:off x="7799044" y="1855841"/>
+              <a:ext cx="457200" cy="457200"/>
+            </a:xfrm>
+            <a:prstGeom prst="rect">
+              <a:avLst/>
+            </a:prstGeom>
+            <a:noFill/>
+            <a:ln>
+              <a:noFill/>
+            </a:ln>
+            <a:extLst>
+              <a:ext uri="{909E8E84-426E-40DD-AFC4-6F175D3DCCD1}">
+                <a14:hiddenFill xmlns:a14="http://schemas.microsoft.com/office/drawing/2010/main">
+                  <a:solidFill>
+                    <a:srgbClr val="FFFFFF"/>
+                  </a:solidFill>
+                </a14:hiddenFill>
+              </a:ext>
+              <a:ext uri="{91240B29-F687-4F45-9708-019B960494DF}">
+                <a14:hiddenLine xmlns:a14="http://schemas.microsoft.com/office/drawing/2010/main" w="9525">
+                  <a:solidFill>
+                    <a:srgbClr val="000000"/>
+                  </a:solidFill>
+                  <a:miter lim="800000"/>
+                  <a:headEnd/>
+                  <a:tailEnd/>
+                </a14:hiddenLine>
+              </a:ext>
+            </a:extLst>
+          </p:spPr>
+        </p:pic>
+        <p:sp>
+          <p:nvSpPr>
+            <p:cNvPr id="33" name="TextBox 12">
+              <a:extLst>
+                <a:ext uri="{FF2B5EF4-FFF2-40B4-BE49-F238E27FC236}">
+                  <a16:creationId xmlns:a16="http://schemas.microsoft.com/office/drawing/2014/main" id="{904964E0-5AAD-B381-9C0F-EB96F2449EA8}"/>
+                </a:ext>
+              </a:extLst>
+            </p:cNvPr>
+            <p:cNvSpPr txBox="1">
+              <a:spLocks noChangeArrowheads="1"/>
+            </p:cNvSpPr>
+            <p:nvPr/>
+          </p:nvSpPr>
+          <p:spPr bwMode="auto">
+            <a:xfrm>
+              <a:off x="7325969" y="2312097"/>
+              <a:ext cx="1403350" cy="276999"/>
+            </a:xfrm>
+            <a:prstGeom prst="rect">
+              <a:avLst/>
+            </a:prstGeom>
+            <a:noFill/>
+            <a:ln>
+              <a:noFill/>
+            </a:ln>
+            <a:extLst>
+              <a:ext uri="{909E8E84-426E-40DD-AFC4-6F175D3DCCD1}">
+                <a14:hiddenFill xmlns:a14="http://schemas.microsoft.com/office/drawing/2010/main">
+                  <a:solidFill>
+                    <a:srgbClr val="FFFFFF"/>
+                  </a:solidFill>
+                </a14:hiddenFill>
+              </a:ext>
+              <a:ext uri="{91240B29-F687-4F45-9708-019B960494DF}">
+                <a14:hiddenLine xmlns:a14="http://schemas.microsoft.com/office/drawing/2010/main" w="9525">
+                  <a:solidFill>
+                    <a:srgbClr val="000000"/>
+                  </a:solidFill>
+                  <a:miter lim="800000"/>
+                  <a:headEnd/>
+                  <a:tailEnd/>
+                </a14:hiddenLine>
+              </a:ext>
+            </a:extLst>
+          </p:spPr>
+          <p:txBody>
+            <a:bodyPr>
+              <a:spAutoFit/>
+            </a:bodyPr>
+            <a:lstStyle>
+              <a:lvl1pPr>
+                <a:defRPr>
+                  <a:solidFill>
+                    <a:schemeClr val="tx1"/>
+                  </a:solidFill>
+                  <a:latin typeface="Calibri" panose="020F0502020204030204" pitchFamily="34" charset="0"/>
+                </a:defRPr>
+              </a:lvl1pPr>
+              <a:lvl2pPr marL="742950" indent="-285750">
+                <a:defRPr>
+                  <a:solidFill>
+                    <a:schemeClr val="tx1"/>
+                  </a:solidFill>
+                  <a:latin typeface="Calibri" panose="020F0502020204030204" pitchFamily="34" charset="0"/>
+                </a:defRPr>
+              </a:lvl2pPr>
+              <a:lvl3pPr marL="1143000" indent="-228600">
+                <a:defRPr>
+                  <a:solidFill>
+                    <a:schemeClr val="tx1"/>
+                  </a:solidFill>
+                  <a:latin typeface="Calibri" panose="020F0502020204030204" pitchFamily="34" charset="0"/>
+                </a:defRPr>
+              </a:lvl3pPr>
+              <a:lvl4pPr marL="1600200" indent="-228600">
+                <a:defRPr>
+                  <a:solidFill>
+                    <a:schemeClr val="tx1"/>
+                  </a:solidFill>
+                  <a:latin typeface="Calibri" panose="020F0502020204030204" pitchFamily="34" charset="0"/>
+                </a:defRPr>
+              </a:lvl4pPr>
+              <a:lvl5pPr marL="2057400" indent="-228600">
+                <a:defRPr>
+                  <a:solidFill>
+                    <a:schemeClr val="tx1"/>
+                  </a:solidFill>
+                  <a:latin typeface="Calibri" panose="020F0502020204030204" pitchFamily="34" charset="0"/>
+                </a:defRPr>
+              </a:lvl5pPr>
+              <a:lvl6pPr marL="2514600" indent="-228600" eaLnBrk="0" fontAlgn="base" hangingPunct="0">
+                <a:spcBef>
+                  <a:spcPct val="0"/>
+                </a:spcBef>
+                <a:spcAft>
+                  <a:spcPct val="0"/>
+                </a:spcAft>
+                <a:defRPr>
+                  <a:solidFill>
+                    <a:schemeClr val="tx1"/>
+                  </a:solidFill>
+                  <a:latin typeface="Calibri" panose="020F0502020204030204" pitchFamily="34" charset="0"/>
+                </a:defRPr>
+              </a:lvl6pPr>
+              <a:lvl7pPr marL="2971800" indent="-228600" eaLnBrk="0" fontAlgn="base" hangingPunct="0">
+                <a:spcBef>
+                  <a:spcPct val="0"/>
+                </a:spcBef>
+                <a:spcAft>
+                  <a:spcPct val="0"/>
+                </a:spcAft>
+                <a:defRPr>
+                  <a:solidFill>
+                    <a:schemeClr val="tx1"/>
+                  </a:solidFill>
+                  <a:latin typeface="Calibri" panose="020F0502020204030204" pitchFamily="34" charset="0"/>
+                </a:defRPr>
+              </a:lvl7pPr>
+              <a:lvl8pPr marL="3429000" indent="-228600" eaLnBrk="0" fontAlgn="base" hangingPunct="0">
+                <a:spcBef>
+                  <a:spcPct val="0"/>
+                </a:spcBef>
+                <a:spcAft>
+                  <a:spcPct val="0"/>
+                </a:spcAft>
+                <a:defRPr>
+                  <a:solidFill>
+                    <a:schemeClr val="tx1"/>
+                  </a:solidFill>
+                  <a:latin typeface="Calibri" panose="020F0502020204030204" pitchFamily="34" charset="0"/>
+                </a:defRPr>
+              </a:lvl8pPr>
+              <a:lvl9pPr marL="3886200" indent="-228600" eaLnBrk="0" fontAlgn="base" hangingPunct="0">
+                <a:spcBef>
+                  <a:spcPct val="0"/>
+                </a:spcBef>
+                <a:spcAft>
+                  <a:spcPct val="0"/>
+                </a:spcAft>
+                <a:defRPr>
+                  <a:solidFill>
+                    <a:schemeClr val="tx1"/>
+                  </a:solidFill>
+                  <a:latin typeface="Calibri" panose="020F0502020204030204" pitchFamily="34" charset="0"/>
+                </a:defRPr>
+              </a:lvl9pPr>
+            </a:lstStyle>
+            <a:p>
+              <a:pPr algn="ctr" eaLnBrk="1" hangingPunct="1"/>
+              <a:r>
+                <a:rPr lang="en-US" altLang="en-US" sz="1200" dirty="0">
+                  <a:latin typeface="Arial" panose="020B0604020202020204" pitchFamily="34" charset="0"/>
+                  <a:ea typeface="Amazon Ember" panose="020B0603020204020204" pitchFamily="34" charset="0"/>
+                  <a:cs typeface="Arial" panose="020B0604020202020204" pitchFamily="34" charset="0"/>
+                </a:rPr>
+                <a:t>Internet gateway</a:t>
+              </a:r>
+            </a:p>
+          </p:txBody>
+        </p:sp>
+      </p:grpSp>
+      <p:pic>
+        <p:nvPicPr>
+          <p:cNvPr id="34" name="Graphic 33" descr="NAT gateway resource icon for the Amazon VPC service.&#10;">
+            <a:extLst>
+              <a:ext uri="{FF2B5EF4-FFF2-40B4-BE49-F238E27FC236}">
+                <a16:creationId xmlns:a16="http://schemas.microsoft.com/office/drawing/2014/main" id="{D9BE4C14-DBCC-756B-93DC-D62A14F89429}"/>
+              </a:ext>
+            </a:extLst>
+          </p:cNvPr>
+          <p:cNvPicPr>
+            <a:picLocks noChangeAspect="1"/>
+          </p:cNvPicPr>
+          <p:nvPr/>
+        </p:nvPicPr>
+        <p:blipFill>
+          <a:blip r:embed="rId8">
+            <a:extLst>
+              <a:ext uri="{96DAC541-7B7A-43D3-8B79-37D633B846F1}">
+                <asvg:svgBlip xmlns:asvg="http://schemas.microsoft.com/office/drawing/2016/SVG/main" r:embed="rId9"/>
+              </a:ext>
+            </a:extLst>
+          </a:blip>
           <a:stretch>
             <a:fillRect/>
           </a:stretch>
         </p:blipFill>
         <p:spPr>
           <a:xfrm>
-            <a:off x="969889" y="1833970"/>
-            <a:ext cx="381000" cy="381000"/>
+            <a:off x="3675508" y="1491658"/>
+            <a:ext cx="457200" cy="457200"/>
           </a:xfrm>
           <a:prstGeom prst="rect">
             <a:avLst/>
@@ -4137,119 +4150,22 @@
       </p:pic>
       <p:sp>
         <p:nvSpPr>
-          <p:cNvPr id="140" name="TextBox 139">
-            <a:extLst>
-              <a:ext uri="{FF2B5EF4-FFF2-40B4-BE49-F238E27FC236}">
-                <a16:creationId xmlns:a16="http://schemas.microsoft.com/office/drawing/2014/main" id="{7F012F11-11E5-6AE9-8B9D-930777917DB3}"/>
-              </a:ext>
-            </a:extLst>
-          </p:cNvPr>
-          <p:cNvSpPr txBox="1"/>
+          <p:cNvPr id="35" name="TextBox 17">
+            <a:extLst>
+              <a:ext uri="{FF2B5EF4-FFF2-40B4-BE49-F238E27FC236}">
+                <a16:creationId xmlns:a16="http://schemas.microsoft.com/office/drawing/2014/main" id="{0D9F54DE-E3B2-3F17-649D-3F83D0F53B8B}"/>
+              </a:ext>
+            </a:extLst>
+          </p:cNvPr>
+          <p:cNvSpPr txBox="1">
+            <a:spLocks noChangeArrowheads="1"/>
+          </p:cNvSpPr>
           <p:nvPr/>
         </p:nvSpPr>
-        <p:spPr>
-          <a:xfrm>
-            <a:off x="2811400" y="3767996"/>
-            <a:ext cx="1323754" cy="276999"/>
-          </a:xfrm>
-          <a:prstGeom prst="rect">
-            <a:avLst/>
-          </a:prstGeom>
-          <a:noFill/>
-        </p:spPr>
-        <p:txBody>
-          <a:bodyPr wrap="square" rtlCol="0">
-            <a:spAutoFit/>
-          </a:bodyPr>
-          <a:lstStyle/>
-          <a:p>
-            <a:pPr marL="91440"/>
-            <a:r>
-              <a:rPr lang="en-US" sz="1200" dirty="0">
-                <a:ln w="0"/>
-                <a:solidFill>
-                  <a:srgbClr val="6CAE3E"/>
-                </a:solidFill>
-                <a:latin typeface="Arial" panose="020B0604020202020204" pitchFamily="34" charset="0"/>
-                <a:cs typeface="Arial" panose="020B0604020202020204" pitchFamily="34" charset="0"/>
-              </a:rPr>
-              <a:t>Private subnet</a:t>
-            </a:r>
-          </a:p>
-        </p:txBody>
-      </p:sp>
-      <p:sp>
-        <p:nvSpPr>
-          <p:cNvPr id="143" name="TextBox 142">
-            <a:extLst>
-              <a:ext uri="{FF2B5EF4-FFF2-40B4-BE49-F238E27FC236}">
-                <a16:creationId xmlns:a16="http://schemas.microsoft.com/office/drawing/2014/main" id="{A634B611-691E-75BA-1776-8E9291A53FDE}"/>
-              </a:ext>
-            </a:extLst>
-          </p:cNvPr>
-          <p:cNvSpPr txBox="1"/>
-          <p:nvPr/>
-        </p:nvSpPr>
-        <p:spPr>
-          <a:xfrm>
-            <a:off x="5085082" y="3767996"/>
-            <a:ext cx="1323754" cy="276999"/>
-          </a:xfrm>
-          <a:prstGeom prst="rect">
-            <a:avLst/>
-          </a:prstGeom>
-          <a:noFill/>
-        </p:spPr>
-        <p:txBody>
-          <a:bodyPr wrap="square" rtlCol="0">
-            <a:spAutoFit/>
-          </a:bodyPr>
-          <a:lstStyle/>
-          <a:p>
-            <a:pPr marL="91440"/>
-            <a:r>
-              <a:rPr lang="en-US" sz="1200" dirty="0">
-                <a:ln w="0"/>
-                <a:solidFill>
-                  <a:srgbClr val="6CAE3E"/>
-                </a:solidFill>
-                <a:latin typeface="Arial" panose="020B0604020202020204" pitchFamily="34" charset="0"/>
-                <a:cs typeface="Arial" panose="020B0604020202020204" pitchFamily="34" charset="0"/>
-              </a:rPr>
-              <a:t>Private subnet</a:t>
-            </a:r>
-          </a:p>
-        </p:txBody>
-      </p:sp>
-      <p:pic>
-        <p:nvPicPr>
-          <p:cNvPr id="145" name="Graphic 34">
-            <a:extLst>
-              <a:ext uri="{FF2B5EF4-FFF2-40B4-BE49-F238E27FC236}">
-                <a16:creationId xmlns:a16="http://schemas.microsoft.com/office/drawing/2014/main" id="{F7B04004-3AD9-C664-2A94-67D4C671DE71}"/>
-              </a:ext>
-            </a:extLst>
-          </p:cNvPr>
-          <p:cNvPicPr>
-            <a:picLocks noChangeAspect="1" noChangeArrowheads="1"/>
-          </p:cNvPicPr>
-          <p:nvPr/>
-        </p:nvPicPr>
-        <p:blipFill>
-          <a:blip r:embed="rId6">
-            <a:extLst>
-              <a:ext uri="{96DAC541-7B7A-43D3-8B79-37D633B846F1}">
-                <asvg:svgBlip xmlns:asvg="http://schemas.microsoft.com/office/drawing/2016/SVG/main" r:embed="rId7"/>
-              </a:ext>
-            </a:extLst>
-          </a:blip>
-          <a:srcRect/>
-          <a:stretch/>
-        </p:blipFill>
         <p:spPr bwMode="auto">
           <a:xfrm>
-            <a:off x="3336813" y="4277938"/>
-            <a:ext cx="457200" cy="457200"/>
+            <a:off x="3279252" y="1948858"/>
+            <a:ext cx="1234766" cy="276999"/>
           </a:xfrm>
           <a:prstGeom prst="rect">
             <a:avLst/>
@@ -4278,36 +4194,175 @@
             </a:ext>
           </a:extLst>
         </p:spPr>
-      </p:pic>
+        <p:txBody>
+          <a:bodyPr wrap="square">
+            <a:spAutoFit/>
+          </a:bodyPr>
+          <a:lstStyle>
+            <a:lvl1pPr>
+              <a:defRPr>
+                <a:solidFill>
+                  <a:schemeClr val="tx1"/>
+                </a:solidFill>
+                <a:latin typeface="Calibri" panose="020F0502020204030204" pitchFamily="34" charset="0"/>
+              </a:defRPr>
+            </a:lvl1pPr>
+            <a:lvl2pPr marL="742950" indent="-285750">
+              <a:defRPr>
+                <a:solidFill>
+                  <a:schemeClr val="tx1"/>
+                </a:solidFill>
+                <a:latin typeface="Calibri" panose="020F0502020204030204" pitchFamily="34" charset="0"/>
+              </a:defRPr>
+            </a:lvl2pPr>
+            <a:lvl3pPr marL="1143000" indent="-228600">
+              <a:defRPr>
+                <a:solidFill>
+                  <a:schemeClr val="tx1"/>
+                </a:solidFill>
+                <a:latin typeface="Calibri" panose="020F0502020204030204" pitchFamily="34" charset="0"/>
+              </a:defRPr>
+            </a:lvl3pPr>
+            <a:lvl4pPr marL="1600200" indent="-228600">
+              <a:defRPr>
+                <a:solidFill>
+                  <a:schemeClr val="tx1"/>
+                </a:solidFill>
+                <a:latin typeface="Calibri" panose="020F0502020204030204" pitchFamily="34" charset="0"/>
+              </a:defRPr>
+            </a:lvl4pPr>
+            <a:lvl5pPr marL="2057400" indent="-228600">
+              <a:defRPr>
+                <a:solidFill>
+                  <a:schemeClr val="tx1"/>
+                </a:solidFill>
+                <a:latin typeface="Calibri" panose="020F0502020204030204" pitchFamily="34" charset="0"/>
+              </a:defRPr>
+            </a:lvl5pPr>
+            <a:lvl6pPr marL="2514600" indent="-228600" eaLnBrk="0" fontAlgn="base" hangingPunct="0">
+              <a:spcBef>
+                <a:spcPct val="0"/>
+              </a:spcBef>
+              <a:spcAft>
+                <a:spcPct val="0"/>
+              </a:spcAft>
+              <a:defRPr>
+                <a:solidFill>
+                  <a:schemeClr val="tx1"/>
+                </a:solidFill>
+                <a:latin typeface="Calibri" panose="020F0502020204030204" pitchFamily="34" charset="0"/>
+              </a:defRPr>
+            </a:lvl6pPr>
+            <a:lvl7pPr marL="2971800" indent="-228600" eaLnBrk="0" fontAlgn="base" hangingPunct="0">
+              <a:spcBef>
+                <a:spcPct val="0"/>
+              </a:spcBef>
+              <a:spcAft>
+                <a:spcPct val="0"/>
+              </a:spcAft>
+              <a:defRPr>
+                <a:solidFill>
+                  <a:schemeClr val="tx1"/>
+                </a:solidFill>
+                <a:latin typeface="Calibri" panose="020F0502020204030204" pitchFamily="34" charset="0"/>
+              </a:defRPr>
+            </a:lvl7pPr>
+            <a:lvl8pPr marL="3429000" indent="-228600" eaLnBrk="0" fontAlgn="base" hangingPunct="0">
+              <a:spcBef>
+                <a:spcPct val="0"/>
+              </a:spcBef>
+              <a:spcAft>
+                <a:spcPct val="0"/>
+              </a:spcAft>
+              <a:defRPr>
+                <a:solidFill>
+                  <a:schemeClr val="tx1"/>
+                </a:solidFill>
+                <a:latin typeface="Calibri" panose="020F0502020204030204" pitchFamily="34" charset="0"/>
+              </a:defRPr>
+            </a:lvl8pPr>
+            <a:lvl9pPr marL="3886200" indent="-228600" eaLnBrk="0" fontAlgn="base" hangingPunct="0">
+              <a:spcBef>
+                <a:spcPct val="0"/>
+              </a:spcBef>
+              <a:spcAft>
+                <a:spcPct val="0"/>
+              </a:spcAft>
+              <a:defRPr>
+                <a:solidFill>
+                  <a:schemeClr val="tx1"/>
+                </a:solidFill>
+                <a:latin typeface="Calibri" panose="020F0502020204030204" pitchFamily="34" charset="0"/>
+              </a:defRPr>
+            </a:lvl9pPr>
+          </a:lstStyle>
+          <a:p>
+            <a:pPr algn="ctr" eaLnBrk="1" hangingPunct="1"/>
+            <a:r>
+              <a:rPr lang="en-US" altLang="en-US" sz="1200" dirty="0">
+                <a:latin typeface="Arial" panose="020B0604020202020204" pitchFamily="34" charset="0"/>
+                <a:ea typeface="Amazon Ember" panose="020B0603020204020204" pitchFamily="34" charset="0"/>
+                <a:cs typeface="Arial" panose="020B0604020202020204" pitchFamily="34" charset="0"/>
+              </a:rPr>
+              <a:t>NAT gateway</a:t>
+            </a:r>
+          </a:p>
+        </p:txBody>
+      </p:sp>
       <p:pic>
         <p:nvPicPr>
-          <p:cNvPr id="146" name="Graphic 34">
-            <a:extLst>
-              <a:ext uri="{FF2B5EF4-FFF2-40B4-BE49-F238E27FC236}">
-                <a16:creationId xmlns:a16="http://schemas.microsoft.com/office/drawing/2014/main" id="{7D0BD3F8-025F-438E-E495-4F1E44513673}"/>
+          <p:cNvPr id="36" name="Graphic 35" descr="NAT gateway resource icon for the Amazon VPC service.&#10;">
+            <a:extLst>
+              <a:ext uri="{FF2B5EF4-FFF2-40B4-BE49-F238E27FC236}">
+                <a16:creationId xmlns:a16="http://schemas.microsoft.com/office/drawing/2014/main" id="{AC97A440-F735-4CA1-0A24-0384F6469E56}"/>
               </a:ext>
             </a:extLst>
           </p:cNvPr>
           <p:cNvPicPr>
-            <a:picLocks noChangeAspect="1" noChangeArrowheads="1"/>
+            <a:picLocks noChangeAspect="1"/>
           </p:cNvPicPr>
           <p:nvPr/>
         </p:nvPicPr>
         <p:blipFill>
-          <a:blip r:embed="rId6">
+          <a:blip r:embed="rId8">
             <a:extLst>
               <a:ext uri="{96DAC541-7B7A-43D3-8B79-37D633B846F1}">
-                <asvg:svgBlip xmlns:asvg="http://schemas.microsoft.com/office/drawing/2016/SVG/main" r:embed="rId7"/>
+                <asvg:svgBlip xmlns:asvg="http://schemas.microsoft.com/office/drawing/2016/SVG/main" r:embed="rId9"/>
               </a:ext>
             </a:extLst>
           </a:blip>
-          <a:srcRect/>
-          <a:stretch/>
+          <a:stretch>
+            <a:fillRect/>
+          </a:stretch>
         </p:blipFill>
+        <p:spPr>
+          <a:xfrm>
+            <a:off x="6436996" y="1491658"/>
+            <a:ext cx="457200" cy="457200"/>
+          </a:xfrm>
+          <a:prstGeom prst="rect">
+            <a:avLst/>
+          </a:prstGeom>
+        </p:spPr>
+      </p:pic>
+      <p:sp>
+        <p:nvSpPr>
+          <p:cNvPr id="37" name="TextBox 17">
+            <a:extLst>
+              <a:ext uri="{FF2B5EF4-FFF2-40B4-BE49-F238E27FC236}">
+                <a16:creationId xmlns:a16="http://schemas.microsoft.com/office/drawing/2014/main" id="{8CF9DF7C-F69C-66F8-C59B-C737CC94785A}"/>
+              </a:ext>
+            </a:extLst>
+          </p:cNvPr>
+          <p:cNvSpPr txBox="1">
+            <a:spLocks noChangeArrowheads="1"/>
+          </p:cNvSpPr>
+          <p:nvPr/>
+        </p:nvSpPr>
         <p:spPr bwMode="auto">
           <a:xfrm>
-            <a:off x="5642841" y="4283826"/>
-            <a:ext cx="457200" cy="457200"/>
+            <a:off x="6040740" y="1948858"/>
+            <a:ext cx="1234766" cy="276999"/>
           </a:xfrm>
           <a:prstGeom prst="rect">
             <a:avLst/>
@@ -4336,130 +4391,127 @@
             </a:ext>
           </a:extLst>
         </p:spPr>
-      </p:pic>
-      <p:sp>
-        <p:nvSpPr>
-          <p:cNvPr id="147" name="TextBox 146">
-            <a:extLst>
-              <a:ext uri="{FF2B5EF4-FFF2-40B4-BE49-F238E27FC236}">
-                <a16:creationId xmlns:a16="http://schemas.microsoft.com/office/drawing/2014/main" id="{46929181-19F6-984A-1709-765A5648CBFA}"/>
-              </a:ext>
-            </a:extLst>
-          </p:cNvPr>
-          <p:cNvSpPr txBox="1"/>
-          <p:nvPr/>
-        </p:nvSpPr>
-        <p:spPr>
-          <a:xfrm>
-            <a:off x="2676390" y="4650634"/>
-            <a:ext cx="1778046" cy="261610"/>
-          </a:xfrm>
-          <a:prstGeom prst="rect">
-            <a:avLst/>
-          </a:prstGeom>
-          <a:noFill/>
-        </p:spPr>
-        <p:txBody>
-          <a:bodyPr wrap="square" rtlCol="0">
+        <p:txBody>
+          <a:bodyPr wrap="square">
             <a:spAutoFit/>
           </a:bodyPr>
-          <a:lstStyle/>
-          <a:p>
-            <a:pPr algn="ctr"/>
-            <a:r>
-              <a:rPr lang="en-US" sz="1100" dirty="0">
+          <a:lstStyle>
+            <a:lvl1pPr>
+              <a:defRPr>
+                <a:solidFill>
+                  <a:schemeClr val="tx1"/>
+                </a:solidFill>
+                <a:latin typeface="Calibri" panose="020F0502020204030204" pitchFamily="34" charset="0"/>
+              </a:defRPr>
+            </a:lvl1pPr>
+            <a:lvl2pPr marL="742950" indent="-285750">
+              <a:defRPr>
+                <a:solidFill>
+                  <a:schemeClr val="tx1"/>
+                </a:solidFill>
+                <a:latin typeface="Calibri" panose="020F0502020204030204" pitchFamily="34" charset="0"/>
+              </a:defRPr>
+            </a:lvl2pPr>
+            <a:lvl3pPr marL="1143000" indent="-228600">
+              <a:defRPr>
+                <a:solidFill>
+                  <a:schemeClr val="tx1"/>
+                </a:solidFill>
+                <a:latin typeface="Calibri" panose="020F0502020204030204" pitchFamily="34" charset="0"/>
+              </a:defRPr>
+            </a:lvl3pPr>
+            <a:lvl4pPr marL="1600200" indent="-228600">
+              <a:defRPr>
+                <a:solidFill>
+                  <a:schemeClr val="tx1"/>
+                </a:solidFill>
+                <a:latin typeface="Calibri" panose="020F0502020204030204" pitchFamily="34" charset="0"/>
+              </a:defRPr>
+            </a:lvl4pPr>
+            <a:lvl5pPr marL="2057400" indent="-228600">
+              <a:defRPr>
+                <a:solidFill>
+                  <a:schemeClr val="tx1"/>
+                </a:solidFill>
+                <a:latin typeface="Calibri" panose="020F0502020204030204" pitchFamily="34" charset="0"/>
+              </a:defRPr>
+            </a:lvl5pPr>
+            <a:lvl6pPr marL="2514600" indent="-228600" eaLnBrk="0" fontAlgn="base" hangingPunct="0">
+              <a:spcBef>
+                <a:spcPct val="0"/>
+              </a:spcBef>
+              <a:spcAft>
+                <a:spcPct val="0"/>
+              </a:spcAft>
+              <a:defRPr>
+                <a:solidFill>
+                  <a:schemeClr val="tx1"/>
+                </a:solidFill>
+                <a:latin typeface="Calibri" panose="020F0502020204030204" pitchFamily="34" charset="0"/>
+              </a:defRPr>
+            </a:lvl6pPr>
+            <a:lvl7pPr marL="2971800" indent="-228600" eaLnBrk="0" fontAlgn="base" hangingPunct="0">
+              <a:spcBef>
+                <a:spcPct val="0"/>
+              </a:spcBef>
+              <a:spcAft>
+                <a:spcPct val="0"/>
+              </a:spcAft>
+              <a:defRPr>
+                <a:solidFill>
+                  <a:schemeClr val="tx1"/>
+                </a:solidFill>
+                <a:latin typeface="Calibri" panose="020F0502020204030204" pitchFamily="34" charset="0"/>
+              </a:defRPr>
+            </a:lvl7pPr>
+            <a:lvl8pPr marL="3429000" indent="-228600" eaLnBrk="0" fontAlgn="base" hangingPunct="0">
+              <a:spcBef>
+                <a:spcPct val="0"/>
+              </a:spcBef>
+              <a:spcAft>
+                <a:spcPct val="0"/>
+              </a:spcAft>
+              <a:defRPr>
+                <a:solidFill>
+                  <a:schemeClr val="tx1"/>
+                </a:solidFill>
+                <a:latin typeface="Calibri" panose="020F0502020204030204" pitchFamily="34" charset="0"/>
+              </a:defRPr>
+            </a:lvl8pPr>
+            <a:lvl9pPr marL="3886200" indent="-228600" eaLnBrk="0" fontAlgn="base" hangingPunct="0">
+              <a:spcBef>
+                <a:spcPct val="0"/>
+              </a:spcBef>
+              <a:spcAft>
+                <a:spcPct val="0"/>
+              </a:spcAft>
+              <a:defRPr>
+                <a:solidFill>
+                  <a:schemeClr val="tx1"/>
+                </a:solidFill>
+                <a:latin typeface="Calibri" panose="020F0502020204030204" pitchFamily="34" charset="0"/>
+              </a:defRPr>
+            </a:lvl9pPr>
+          </a:lstStyle>
+          <a:p>
+            <a:pPr algn="ctr" eaLnBrk="1" hangingPunct="1"/>
+            <a:r>
+              <a:rPr lang="en-US" altLang="en-US" sz="1200" dirty="0">
                 <a:latin typeface="Arial" panose="020B0604020202020204" pitchFamily="34" charset="0"/>
+                <a:ea typeface="Amazon Ember" panose="020B0603020204020204" pitchFamily="34" charset="0"/>
                 <a:cs typeface="Arial" panose="020B0604020202020204" pitchFamily="34" charset="0"/>
               </a:rPr>
-              <a:t>Container</a:t>
-            </a:r>
-          </a:p>
-        </p:txBody>
-      </p:sp>
-      <p:sp>
-        <p:nvSpPr>
-          <p:cNvPr id="148" name="TextBox 147">
-            <a:extLst>
-              <a:ext uri="{FF2B5EF4-FFF2-40B4-BE49-F238E27FC236}">
-                <a16:creationId xmlns:a16="http://schemas.microsoft.com/office/drawing/2014/main" id="{698FFEA5-59DC-1857-7F1D-C336F07038C0}"/>
-              </a:ext>
-            </a:extLst>
-          </p:cNvPr>
-          <p:cNvSpPr txBox="1"/>
-          <p:nvPr/>
-        </p:nvSpPr>
-        <p:spPr>
-          <a:xfrm>
-            <a:off x="4997463" y="4650634"/>
-            <a:ext cx="1778046" cy="261610"/>
-          </a:xfrm>
-          <a:prstGeom prst="rect">
-            <a:avLst/>
-          </a:prstGeom>
-          <a:noFill/>
-        </p:spPr>
-        <p:txBody>
-          <a:bodyPr wrap="square" rtlCol="0">
-            <a:spAutoFit/>
-          </a:bodyPr>
-          <a:lstStyle/>
-          <a:p>
-            <a:pPr algn="ctr"/>
-            <a:r>
-              <a:rPr lang="en-US" sz="1100" dirty="0">
-                <a:latin typeface="Arial" panose="020B0604020202020204" pitchFamily="34" charset="0"/>
-                <a:cs typeface="Arial" panose="020B0604020202020204" pitchFamily="34" charset="0"/>
-              </a:rPr>
-              <a:t>Container</a:t>
-            </a:r>
-          </a:p>
-        </p:txBody>
-      </p:sp>
-      <p:sp>
-        <p:nvSpPr>
-          <p:cNvPr id="149" name="TextBox 148">
-            <a:extLst>
-              <a:ext uri="{FF2B5EF4-FFF2-40B4-BE49-F238E27FC236}">
-                <a16:creationId xmlns:a16="http://schemas.microsoft.com/office/drawing/2014/main" id="{19AE27CF-DD64-05ED-360B-4B08CC39A5C2}"/>
-              </a:ext>
-            </a:extLst>
-          </p:cNvPr>
-          <p:cNvSpPr txBox="1"/>
-          <p:nvPr/>
-        </p:nvSpPr>
-        <p:spPr>
-          <a:xfrm>
-            <a:off x="786358" y="3166123"/>
-            <a:ext cx="1769070" cy="261610"/>
-          </a:xfrm>
-          <a:prstGeom prst="rect">
-            <a:avLst/>
-          </a:prstGeom>
-          <a:noFill/>
-        </p:spPr>
-        <p:txBody>
-          <a:bodyPr wrap="square" rtlCol="0">
-            <a:spAutoFit/>
-          </a:bodyPr>
-          <a:lstStyle/>
-          <a:p>
-            <a:pPr algn="ctr"/>
-            <a:r>
-              <a:rPr lang="en-US" sz="1100" dirty="0">
-                <a:latin typeface="Arial" panose="020B0604020202020204" pitchFamily="34" charset="0"/>
-                <a:cs typeface="Arial" panose="020B0604020202020204" pitchFamily="34" charset="0"/>
-              </a:rPr>
-              <a:t>Internet gateway</a:t>
+              <a:t>NAT gateway</a:t>
             </a:r>
           </a:p>
         </p:txBody>
       </p:sp>
       <p:pic>
         <p:nvPicPr>
-          <p:cNvPr id="150" name="Graphic 149">
-            <a:extLst>
-              <a:ext uri="{FF2B5EF4-FFF2-40B4-BE49-F238E27FC236}">
-                <a16:creationId xmlns:a16="http://schemas.microsoft.com/office/drawing/2014/main" id="{88721335-1E2B-2D45-51F2-95C41F59E94B}"/>
+          <p:cNvPr id="38" name="Graphic 37" descr="Route table resource icon for the Amazon Route 53 service.">
+            <a:extLst>
+              <a:ext uri="{FF2B5EF4-FFF2-40B4-BE49-F238E27FC236}">
+                <a16:creationId xmlns:a16="http://schemas.microsoft.com/office/drawing/2014/main" id="{0CE17D1D-E32E-0323-94F2-2D0B6FAF7582}"/>
               </a:ext>
             </a:extLst>
           </p:cNvPr>
@@ -4469,10 +4521,10 @@
           <p:nvPr/>
         </p:nvPicPr>
         <p:blipFill>
-          <a:blip r:embed="rId8">
+          <a:blip r:embed="rId10">
             <a:extLst>
               <a:ext uri="{96DAC541-7B7A-43D3-8B79-37D633B846F1}">
-                <asvg:svgBlip xmlns:asvg="http://schemas.microsoft.com/office/drawing/2016/SVG/main" r:embed="rId9"/>
+                <asvg:svgBlip xmlns:asvg="http://schemas.microsoft.com/office/drawing/2016/SVG/main" r:embed="rId11"/>
               </a:ext>
             </a:extLst>
           </a:blip>
@@ -4482,43 +4534,7 @@
         </p:blipFill>
         <p:spPr>
           <a:xfrm>
-            <a:off x="1435943" y="2686097"/>
-            <a:ext cx="469900" cy="469900"/>
-          </a:xfrm>
-          <a:prstGeom prst="rect">
-            <a:avLst/>
-          </a:prstGeom>
-        </p:spPr>
-      </p:pic>
-      <p:pic>
-        <p:nvPicPr>
-          <p:cNvPr id="5" name="Graphic 4">
-            <a:extLst>
-              <a:ext uri="{FF2B5EF4-FFF2-40B4-BE49-F238E27FC236}">
-                <a16:creationId xmlns:a16="http://schemas.microsoft.com/office/drawing/2014/main" id="{08DBCFA8-6A6B-283D-435A-084AC1E6F6C1}"/>
-              </a:ext>
-            </a:extLst>
-          </p:cNvPr>
-          <p:cNvPicPr>
-            <a:picLocks noChangeAspect="1"/>
-          </p:cNvPicPr>
-          <p:nvPr/>
-        </p:nvPicPr>
-        <p:blipFill>
-          <a:blip r:embed="rId10">
-            <a:extLst>
-              <a:ext uri="{96DAC541-7B7A-43D3-8B79-37D633B846F1}">
-                <asvg:svgBlip xmlns:asvg="http://schemas.microsoft.com/office/drawing/2016/SVG/main" r:embed="rId11"/>
-              </a:ext>
-            </a:extLst>
-          </a:blip>
-          <a:stretch>
-            <a:fillRect/>
-          </a:stretch>
-        </p:blipFill>
-        <p:spPr>
-          <a:xfrm>
-            <a:off x="3299131" y="2712400"/>
+            <a:off x="1621674" y="3223031"/>
             <a:ext cx="457200" cy="457200"/>
           </a:xfrm>
           <a:prstGeom prst="rect">
@@ -4526,42 +4542,425 @@
           </a:prstGeom>
         </p:spPr>
       </p:pic>
-      <p:pic>
-        <p:nvPicPr>
-          <p:cNvPr id="6" name="Graphic 5">
-            <a:extLst>
-              <a:ext uri="{FF2B5EF4-FFF2-40B4-BE49-F238E27FC236}">
-                <a16:creationId xmlns:a16="http://schemas.microsoft.com/office/drawing/2014/main" id="{CD9C0553-BE2D-58D2-8E54-DB7EFA3D53E6}"/>
-              </a:ext>
-            </a:extLst>
-          </p:cNvPr>
-          <p:cNvPicPr>
-            <a:picLocks noChangeAspect="1"/>
-          </p:cNvPicPr>
+      <p:sp>
+        <p:nvSpPr>
+          <p:cNvPr id="39" name="TextBox 26">
+            <a:extLst>
+              <a:ext uri="{FF2B5EF4-FFF2-40B4-BE49-F238E27FC236}">
+                <a16:creationId xmlns:a16="http://schemas.microsoft.com/office/drawing/2014/main" id="{FD777D84-EBB5-8574-31A8-8217207E2B7F}"/>
+              </a:ext>
+            </a:extLst>
+          </p:cNvPr>
+          <p:cNvSpPr txBox="1">
+            <a:spLocks noChangeArrowheads="1"/>
+          </p:cNvSpPr>
           <p:nvPr/>
-        </p:nvPicPr>
-        <p:blipFill>
-          <a:blip r:embed="rId10">
-            <a:extLst>
-              <a:ext uri="{96DAC541-7B7A-43D3-8B79-37D633B846F1}">
-                <asvg:svgBlip xmlns:asvg="http://schemas.microsoft.com/office/drawing/2016/SVG/main" r:embed="rId11"/>
-              </a:ext>
-            </a:extLst>
-          </a:blip>
-          <a:stretch>
-            <a:fillRect/>
-          </a:stretch>
-        </p:blipFill>
-        <p:spPr>
+        </p:nvSpPr>
+        <p:spPr bwMode="auto">
           <a:xfrm>
-            <a:off x="5678510" y="2706274"/>
-            <a:ext cx="457200" cy="457200"/>
+            <a:off x="1214927" y="3677768"/>
+            <a:ext cx="1270000" cy="276999"/>
           </a:xfrm>
           <a:prstGeom prst="rect">
             <a:avLst/>
           </a:prstGeom>
+          <a:noFill/>
+          <a:ln>
+            <a:noFill/>
+          </a:ln>
+          <a:extLst>
+            <a:ext uri="{909E8E84-426E-40DD-AFC4-6F175D3DCCD1}">
+              <a14:hiddenFill xmlns:a14="http://schemas.microsoft.com/office/drawing/2010/main">
+                <a:solidFill>
+                  <a:srgbClr val="FFFFFF"/>
+                </a:solidFill>
+              </a14:hiddenFill>
+            </a:ext>
+            <a:ext uri="{91240B29-F687-4F45-9708-019B960494DF}">
+              <a14:hiddenLine xmlns:a14="http://schemas.microsoft.com/office/drawing/2010/main" w="9525">
+                <a:solidFill>
+                  <a:srgbClr val="000000"/>
+                </a:solidFill>
+                <a:miter lim="800000"/>
+                <a:headEnd/>
+                <a:tailEnd/>
+              </a14:hiddenLine>
+            </a:ext>
+          </a:extLst>
         </p:spPr>
-      </p:pic>
+        <p:txBody>
+          <a:bodyPr wrap="square">
+            <a:spAutoFit/>
+          </a:bodyPr>
+          <a:lstStyle>
+            <a:lvl1pPr>
+              <a:defRPr>
+                <a:solidFill>
+                  <a:schemeClr val="tx1"/>
+                </a:solidFill>
+                <a:latin typeface="Calibri" panose="020F0502020204030204" pitchFamily="34" charset="0"/>
+              </a:defRPr>
+            </a:lvl1pPr>
+            <a:lvl2pPr marL="742950" indent="-285750">
+              <a:defRPr>
+                <a:solidFill>
+                  <a:schemeClr val="tx1"/>
+                </a:solidFill>
+                <a:latin typeface="Calibri" panose="020F0502020204030204" pitchFamily="34" charset="0"/>
+              </a:defRPr>
+            </a:lvl2pPr>
+            <a:lvl3pPr marL="1143000" indent="-228600">
+              <a:defRPr>
+                <a:solidFill>
+                  <a:schemeClr val="tx1"/>
+                </a:solidFill>
+                <a:latin typeface="Calibri" panose="020F0502020204030204" pitchFamily="34" charset="0"/>
+              </a:defRPr>
+            </a:lvl3pPr>
+            <a:lvl4pPr marL="1600200" indent="-228600">
+              <a:defRPr>
+                <a:solidFill>
+                  <a:schemeClr val="tx1"/>
+                </a:solidFill>
+                <a:latin typeface="Calibri" panose="020F0502020204030204" pitchFamily="34" charset="0"/>
+              </a:defRPr>
+            </a:lvl4pPr>
+            <a:lvl5pPr marL="2057400" indent="-228600">
+              <a:defRPr>
+                <a:solidFill>
+                  <a:schemeClr val="tx1"/>
+                </a:solidFill>
+                <a:latin typeface="Calibri" panose="020F0502020204030204" pitchFamily="34" charset="0"/>
+              </a:defRPr>
+            </a:lvl5pPr>
+            <a:lvl6pPr marL="2514600" indent="-228600" eaLnBrk="0" fontAlgn="base" hangingPunct="0">
+              <a:spcBef>
+                <a:spcPct val="0"/>
+              </a:spcBef>
+              <a:spcAft>
+                <a:spcPct val="0"/>
+              </a:spcAft>
+              <a:defRPr>
+                <a:solidFill>
+                  <a:schemeClr val="tx1"/>
+                </a:solidFill>
+                <a:latin typeface="Calibri" panose="020F0502020204030204" pitchFamily="34" charset="0"/>
+              </a:defRPr>
+            </a:lvl6pPr>
+            <a:lvl7pPr marL="2971800" indent="-228600" eaLnBrk="0" fontAlgn="base" hangingPunct="0">
+              <a:spcBef>
+                <a:spcPct val="0"/>
+              </a:spcBef>
+              <a:spcAft>
+                <a:spcPct val="0"/>
+              </a:spcAft>
+              <a:defRPr>
+                <a:solidFill>
+                  <a:schemeClr val="tx1"/>
+                </a:solidFill>
+                <a:latin typeface="Calibri" panose="020F0502020204030204" pitchFamily="34" charset="0"/>
+              </a:defRPr>
+            </a:lvl7pPr>
+            <a:lvl8pPr marL="3429000" indent="-228600" eaLnBrk="0" fontAlgn="base" hangingPunct="0">
+              <a:spcBef>
+                <a:spcPct val="0"/>
+              </a:spcBef>
+              <a:spcAft>
+                <a:spcPct val="0"/>
+              </a:spcAft>
+              <a:defRPr>
+                <a:solidFill>
+                  <a:schemeClr val="tx1"/>
+                </a:solidFill>
+                <a:latin typeface="Calibri" panose="020F0502020204030204" pitchFamily="34" charset="0"/>
+              </a:defRPr>
+            </a:lvl8pPr>
+            <a:lvl9pPr marL="3886200" indent="-228600" eaLnBrk="0" fontAlgn="base" hangingPunct="0">
+              <a:spcBef>
+                <a:spcPct val="0"/>
+              </a:spcBef>
+              <a:spcAft>
+                <a:spcPct val="0"/>
+              </a:spcAft>
+              <a:defRPr>
+                <a:solidFill>
+                  <a:schemeClr val="tx1"/>
+                </a:solidFill>
+                <a:latin typeface="Calibri" panose="020F0502020204030204" pitchFamily="34" charset="0"/>
+              </a:defRPr>
+            </a:lvl9pPr>
+          </a:lstStyle>
+          <a:p>
+            <a:pPr algn="ctr" eaLnBrk="1" hangingPunct="1"/>
+            <a:r>
+              <a:rPr lang="en-US" altLang="en-US" sz="1200" dirty="0">
+                <a:latin typeface="Arial" panose="020B0604020202020204" pitchFamily="34" charset="0"/>
+                <a:ea typeface="Amazon Ember" panose="020B0603020204020204" pitchFamily="34" charset="0"/>
+                <a:cs typeface="Arial" panose="020B0604020202020204" pitchFamily="34" charset="0"/>
+              </a:rPr>
+              <a:t>Route table</a:t>
+            </a:r>
+          </a:p>
+        </p:txBody>
+      </p:sp>
+      <p:cxnSp>
+        <p:nvCxnSpPr>
+          <p:cNvPr id="41" name="Straight Arrow Connector 40">
+            <a:extLst>
+              <a:ext uri="{FF2B5EF4-FFF2-40B4-BE49-F238E27FC236}">
+                <a16:creationId xmlns:a16="http://schemas.microsoft.com/office/drawing/2014/main" id="{62CF1B9A-B075-B727-7AA6-623A6EB154ED}"/>
+              </a:ext>
+            </a:extLst>
+          </p:cNvPr>
+          <p:cNvCxnSpPr>
+            <a:endCxn id="35" idx="2"/>
+          </p:cNvCxnSpPr>
+          <p:nvPr/>
+        </p:nvCxnSpPr>
+        <p:spPr>
+          <a:xfrm flipV="1">
+            <a:off x="3896635" y="2225857"/>
+            <a:ext cx="0" cy="1347076"/>
+          </a:xfrm>
+          <a:prstGeom prst="straightConnector1">
+            <a:avLst/>
+          </a:prstGeom>
+          <a:ln w="41275">
+            <a:solidFill>
+              <a:schemeClr val="bg2">
+                <a:lumMod val="50000"/>
+              </a:schemeClr>
+            </a:solidFill>
+            <a:tailEnd type="triangle"/>
+          </a:ln>
+        </p:spPr>
+        <p:style>
+          <a:lnRef idx="1">
+            <a:schemeClr val="accent1"/>
+          </a:lnRef>
+          <a:fillRef idx="0">
+            <a:schemeClr val="accent1"/>
+          </a:fillRef>
+          <a:effectRef idx="0">
+            <a:schemeClr val="accent1"/>
+          </a:effectRef>
+          <a:fontRef idx="minor">
+            <a:schemeClr val="tx1"/>
+          </a:fontRef>
+        </p:style>
+      </p:cxnSp>
+      <p:cxnSp>
+        <p:nvCxnSpPr>
+          <p:cNvPr id="42" name="Straight Arrow Connector 41">
+            <a:extLst>
+              <a:ext uri="{FF2B5EF4-FFF2-40B4-BE49-F238E27FC236}">
+                <a16:creationId xmlns:a16="http://schemas.microsoft.com/office/drawing/2014/main" id="{BF1A1706-1409-249E-D2C5-544F3595C26F}"/>
+              </a:ext>
+            </a:extLst>
+          </p:cNvPr>
+          <p:cNvCxnSpPr>
+            <a:cxnSpLocks/>
+            <a:endCxn id="37" idx="2"/>
+          </p:cNvCxnSpPr>
+          <p:nvPr/>
+        </p:nvCxnSpPr>
+        <p:spPr>
+          <a:xfrm flipH="1" flipV="1">
+            <a:off x="6658123" y="2225857"/>
+            <a:ext cx="7473" cy="1347076"/>
+          </a:xfrm>
+          <a:prstGeom prst="straightConnector1">
+            <a:avLst/>
+          </a:prstGeom>
+          <a:ln w="41275">
+            <a:solidFill>
+              <a:schemeClr val="bg2">
+                <a:lumMod val="50000"/>
+              </a:schemeClr>
+            </a:solidFill>
+            <a:tailEnd type="triangle"/>
+          </a:ln>
+        </p:spPr>
+        <p:style>
+          <a:lnRef idx="1">
+            <a:schemeClr val="accent1"/>
+          </a:lnRef>
+          <a:fillRef idx="0">
+            <a:schemeClr val="accent1"/>
+          </a:fillRef>
+          <a:effectRef idx="0">
+            <a:schemeClr val="accent1"/>
+          </a:effectRef>
+          <a:fontRef idx="minor">
+            <a:schemeClr val="tx1"/>
+          </a:fontRef>
+        </p:style>
+      </p:cxnSp>
+      <p:sp>
+        <p:nvSpPr>
+          <p:cNvPr id="45" name="TextBox 44">
+            <a:extLst>
+              <a:ext uri="{FF2B5EF4-FFF2-40B4-BE49-F238E27FC236}">
+                <a16:creationId xmlns:a16="http://schemas.microsoft.com/office/drawing/2014/main" id="{EE184A13-2CAE-D771-1AE0-EC1FB637EDE4}"/>
+              </a:ext>
+            </a:extLst>
+          </p:cNvPr>
+          <p:cNvSpPr txBox="1"/>
+          <p:nvPr/>
+        </p:nvSpPr>
+        <p:spPr>
+          <a:xfrm>
+            <a:off x="3002708" y="3623327"/>
+            <a:ext cx="1802799" cy="276999"/>
+          </a:xfrm>
+          <a:prstGeom prst="rect">
+            <a:avLst/>
+          </a:prstGeom>
+          <a:noFill/>
+        </p:spPr>
+        <p:txBody>
+          <a:bodyPr wrap="square" rtlCol="0">
+            <a:spAutoFit/>
+          </a:bodyPr>
+          <a:lstStyle/>
+          <a:p>
+            <a:r>
+              <a:rPr lang="en-US" sz="1200" dirty="0"/>
+              <a:t>Outbound internet traffic</a:t>
+            </a:r>
+          </a:p>
+        </p:txBody>
+      </p:sp>
+      <p:sp>
+        <p:nvSpPr>
+          <p:cNvPr id="46" name="TextBox 45">
+            <a:extLst>
+              <a:ext uri="{FF2B5EF4-FFF2-40B4-BE49-F238E27FC236}">
+                <a16:creationId xmlns:a16="http://schemas.microsoft.com/office/drawing/2014/main" id="{7B6E45F4-6D86-5616-024D-DBF8DE7EF2E8}"/>
+              </a:ext>
+            </a:extLst>
+          </p:cNvPr>
+          <p:cNvSpPr txBox="1"/>
+          <p:nvPr/>
+        </p:nvSpPr>
+        <p:spPr>
+          <a:xfrm>
+            <a:off x="5791738" y="3623314"/>
+            <a:ext cx="1894921" cy="276999"/>
+          </a:xfrm>
+          <a:prstGeom prst="rect">
+            <a:avLst/>
+          </a:prstGeom>
+          <a:noFill/>
+        </p:spPr>
+        <p:txBody>
+          <a:bodyPr wrap="square" rtlCol="0">
+            <a:spAutoFit/>
+          </a:bodyPr>
+          <a:lstStyle/>
+          <a:p>
+            <a:r>
+              <a:rPr lang="en-US" sz="1200" dirty="0"/>
+              <a:t>Outbound internet traffic</a:t>
+            </a:r>
+          </a:p>
+        </p:txBody>
+      </p:sp>
+      <p:cxnSp>
+        <p:nvCxnSpPr>
+          <p:cNvPr id="47" name="Straight Arrow Connector 46">
+            <a:extLst>
+              <a:ext uri="{FF2B5EF4-FFF2-40B4-BE49-F238E27FC236}">
+                <a16:creationId xmlns:a16="http://schemas.microsoft.com/office/drawing/2014/main" id="{7E5D9950-D25F-2650-A461-6D82BB77D520}"/>
+              </a:ext>
+            </a:extLst>
+          </p:cNvPr>
+          <p:cNvCxnSpPr>
+            <a:cxnSpLocks/>
+            <a:endCxn id="32" idx="3"/>
+          </p:cNvCxnSpPr>
+          <p:nvPr/>
+        </p:nvCxnSpPr>
+        <p:spPr>
+          <a:xfrm flipH="1">
+            <a:off x="2109175" y="1720258"/>
+            <a:ext cx="1552059" cy="944"/>
+          </a:xfrm>
+          <a:prstGeom prst="straightConnector1">
+            <a:avLst/>
+          </a:prstGeom>
+          <a:ln w="41275">
+            <a:solidFill>
+              <a:schemeClr val="bg2">
+                <a:lumMod val="50000"/>
+              </a:schemeClr>
+            </a:solidFill>
+            <a:tailEnd type="triangle"/>
+          </a:ln>
+        </p:spPr>
+        <p:style>
+          <a:lnRef idx="1">
+            <a:schemeClr val="accent1"/>
+          </a:lnRef>
+          <a:fillRef idx="0">
+            <a:schemeClr val="accent1"/>
+          </a:fillRef>
+          <a:effectRef idx="0">
+            <a:schemeClr val="accent1"/>
+          </a:effectRef>
+          <a:fontRef idx="minor">
+            <a:schemeClr val="tx1"/>
+          </a:fontRef>
+        </p:style>
+      </p:cxnSp>
+      <p:cxnSp>
+        <p:nvCxnSpPr>
+          <p:cNvPr id="50" name="Straight Arrow Connector 49">
+            <a:extLst>
+              <a:ext uri="{FF2B5EF4-FFF2-40B4-BE49-F238E27FC236}">
+                <a16:creationId xmlns:a16="http://schemas.microsoft.com/office/drawing/2014/main" id="{3FC908AD-07EF-5568-6E69-336CFA822B60}"/>
+              </a:ext>
+            </a:extLst>
+          </p:cNvPr>
+          <p:cNvCxnSpPr>
+            <a:cxnSpLocks/>
+            <a:stCxn id="36" idx="1"/>
+            <a:endCxn id="34" idx="3"/>
+          </p:cNvCxnSpPr>
+          <p:nvPr/>
+        </p:nvCxnSpPr>
+        <p:spPr>
+          <a:xfrm flipH="1">
+            <a:off x="4132708" y="1720258"/>
+            <a:ext cx="2304288" cy="0"/>
+          </a:xfrm>
+          <a:prstGeom prst="straightConnector1">
+            <a:avLst/>
+          </a:prstGeom>
+          <a:ln w="41275">
+            <a:solidFill>
+              <a:schemeClr val="bg2">
+                <a:lumMod val="50000"/>
+              </a:schemeClr>
+            </a:solidFill>
+            <a:tailEnd type="none"/>
+          </a:ln>
+        </p:spPr>
+        <p:style>
+          <a:lnRef idx="1">
+            <a:schemeClr val="accent1"/>
+          </a:lnRef>
+          <a:fillRef idx="0">
+            <a:schemeClr val="accent1"/>
+          </a:fillRef>
+          <a:effectRef idx="0">
+            <a:schemeClr val="accent1"/>
+          </a:effectRef>
+          <a:fontRef idx="minor">
+            <a:schemeClr val="tx1"/>
+          </a:fontRef>
+        </p:style>
+      </p:cxnSp>
     </p:spTree>
     <p:extLst>
       <p:ext uri="{BB962C8B-B14F-4D97-AF65-F5344CB8AC3E}">

</xml_diff>

<commit_message>
Isolated vpc example (#87)
* Adding isolated VPC template

* Finalizing the isolated VPC ref

* Modifying the diagrams and creating more cross links between VPC patterns

---------

Co-authored-by: EC2 Default User <ec2-user@ip-172-31-39-237.us-east-2.compute.internal>
</commit_message>
<xml_diff>
--- a/pattern/large-vpc-for-amazon-ecs-cluster/diagram.pptx
+++ b/pattern/large-vpc-for-amazon-ecs-cluster/diagram.pptx
@@ -259,7 +259,7 @@
           <a:p>
             <a:fld id="{55F0E5CF-1040-4245-9F91-D18CDDA0757F}" type="datetimeFigureOut">
               <a:rPr lang="en-US" smtClean="0"/>
-              <a:t>5/15/23</a:t>
+              <a:t>3/5/24</a:t>
             </a:fld>
             <a:endParaRPr lang="en-US"/>
           </a:p>
@@ -457,7 +457,7 @@
           <a:p>
             <a:fld id="{55F0E5CF-1040-4245-9F91-D18CDDA0757F}" type="datetimeFigureOut">
               <a:rPr lang="en-US" smtClean="0"/>
-              <a:t>5/15/23</a:t>
+              <a:t>3/5/24</a:t>
             </a:fld>
             <a:endParaRPr lang="en-US"/>
           </a:p>
@@ -665,7 +665,7 @@
           <a:p>
             <a:fld id="{55F0E5CF-1040-4245-9F91-D18CDDA0757F}" type="datetimeFigureOut">
               <a:rPr lang="en-US" smtClean="0"/>
-              <a:t>5/15/23</a:t>
+              <a:t>3/5/24</a:t>
             </a:fld>
             <a:endParaRPr lang="en-US"/>
           </a:p>
@@ -863,7 +863,7 @@
           <a:p>
             <a:fld id="{55F0E5CF-1040-4245-9F91-D18CDDA0757F}" type="datetimeFigureOut">
               <a:rPr lang="en-US" smtClean="0"/>
-              <a:t>5/15/23</a:t>
+              <a:t>3/5/24</a:t>
             </a:fld>
             <a:endParaRPr lang="en-US"/>
           </a:p>
@@ -1138,7 +1138,7 @@
           <a:p>
             <a:fld id="{55F0E5CF-1040-4245-9F91-D18CDDA0757F}" type="datetimeFigureOut">
               <a:rPr lang="en-US" smtClean="0"/>
-              <a:t>5/15/23</a:t>
+              <a:t>3/5/24</a:t>
             </a:fld>
             <a:endParaRPr lang="en-US"/>
           </a:p>
@@ -1403,7 +1403,7 @@
           <a:p>
             <a:fld id="{55F0E5CF-1040-4245-9F91-D18CDDA0757F}" type="datetimeFigureOut">
               <a:rPr lang="en-US" smtClean="0"/>
-              <a:t>5/15/23</a:t>
+              <a:t>3/5/24</a:t>
             </a:fld>
             <a:endParaRPr lang="en-US"/>
           </a:p>
@@ -1815,7 +1815,7 @@
           <a:p>
             <a:fld id="{55F0E5CF-1040-4245-9F91-D18CDDA0757F}" type="datetimeFigureOut">
               <a:rPr lang="en-US" smtClean="0"/>
-              <a:t>5/15/23</a:t>
+              <a:t>3/5/24</a:t>
             </a:fld>
             <a:endParaRPr lang="en-US"/>
           </a:p>
@@ -1956,7 +1956,7 @@
           <a:p>
             <a:fld id="{55F0E5CF-1040-4245-9F91-D18CDDA0757F}" type="datetimeFigureOut">
               <a:rPr lang="en-US" smtClean="0"/>
-              <a:t>5/15/23</a:t>
+              <a:t>3/5/24</a:t>
             </a:fld>
             <a:endParaRPr lang="en-US"/>
           </a:p>
@@ -2069,7 +2069,7 @@
           <a:p>
             <a:fld id="{55F0E5CF-1040-4245-9F91-D18CDDA0757F}" type="datetimeFigureOut">
               <a:rPr lang="en-US" smtClean="0"/>
-              <a:t>5/15/23</a:t>
+              <a:t>3/5/24</a:t>
             </a:fld>
             <a:endParaRPr lang="en-US"/>
           </a:p>
@@ -2380,7 +2380,7 @@
           <a:p>
             <a:fld id="{55F0E5CF-1040-4245-9F91-D18CDDA0757F}" type="datetimeFigureOut">
               <a:rPr lang="en-US" smtClean="0"/>
-              <a:t>5/15/23</a:t>
+              <a:t>3/5/24</a:t>
             </a:fld>
             <a:endParaRPr lang="en-US"/>
           </a:p>
@@ -2668,7 +2668,7 @@
           <a:p>
             <a:fld id="{55F0E5CF-1040-4245-9F91-D18CDDA0757F}" type="datetimeFigureOut">
               <a:rPr lang="en-US" smtClean="0"/>
-              <a:t>5/15/23</a:t>
+              <a:t>3/5/24</a:t>
             </a:fld>
             <a:endParaRPr lang="en-US"/>
           </a:p>
@@ -2909,7 +2909,7 @@
           <a:p>
             <a:fld id="{55F0E5CF-1040-4245-9F91-D18CDDA0757F}" type="datetimeFigureOut">
               <a:rPr lang="en-US" smtClean="0"/>
-              <a:t>5/15/23</a:t>
+              <a:t>3/5/24</a:t>
             </a:fld>
             <a:endParaRPr lang="en-US"/>
           </a:p>
@@ -3328,10 +3328,13 @@
       </p:grpSpPr>
       <p:sp>
         <p:nvSpPr>
-          <p:cNvPr id="142" name="Rectangle 141">
-            <a:extLst>
-              <a:ext uri="{FF2B5EF4-FFF2-40B4-BE49-F238E27FC236}">
-                <a16:creationId xmlns:a16="http://schemas.microsoft.com/office/drawing/2014/main" id="{57362C8F-2B5A-0797-76C2-284747B79369}"/>
+          <p:cNvPr id="4" name="Rectangle 3">
+            <a:extLst>
+              <a:ext uri="{FF2B5EF4-FFF2-40B4-BE49-F238E27FC236}">
+                <a16:creationId xmlns:a16="http://schemas.microsoft.com/office/drawing/2014/main" id="{EADBFC82-2672-3946-EFE8-EC5E5460E4B6}"/>
+              </a:ext>
+              <a:ext uri="{C183D7F6-B498-43B3-948B-1728B52AA6E4}">
+                <adec:decorative xmlns:adec="http://schemas.microsoft.com/office/drawing/2017/decorative" val="1"/>
               </a:ext>
             </a:extLst>
           </p:cNvPr>
@@ -3340,22 +3343,18 @@
         </p:nvSpPr>
         <p:spPr>
           <a:xfrm>
-            <a:off x="4787010" y="3767996"/>
-            <a:ext cx="2108215" cy="1237734"/>
+            <a:off x="2687238" y="2861614"/>
+            <a:ext cx="2527461" cy="1688593"/>
           </a:xfrm>
           <a:prstGeom prst="rect">
             <a:avLst/>
           </a:prstGeom>
-          <a:solidFill>
-            <a:schemeClr val="accent6">
-              <a:lumMod val="20000"/>
-              <a:lumOff val="80000"/>
-              <a:alpha val="20000"/>
-            </a:schemeClr>
-          </a:solidFill>
-          <a:ln w="12700">
-            <a:noFill/>
-            <a:prstDash val="dash"/>
+          <a:noFill/>
+          <a:ln w="15875">
+            <a:solidFill>
+              <a:srgbClr val="7AA116"/>
+            </a:solidFill>
+            <a:prstDash val="solid"/>
           </a:ln>
         </p:spPr>
         <p:style>
@@ -3375,467 +3374,47 @@
           </a:fontRef>
         </p:style>
         <p:txBody>
-          <a:bodyPr rot="0" spcFirstLastPara="0" vertOverflow="overflow" horzOverflow="overflow" vert="horz" wrap="square" lIns="338328" tIns="45720" rIns="91440" bIns="45720" numCol="1" spcCol="0" rtlCol="0" fromWordArt="0" anchor="t" anchorCtr="0" forceAA="0" compatLnSpc="1">
-            <a:prstTxWarp prst="textNoShape">
-              <a:avLst/>
-            </a:prstTxWarp>
-            <a:noAutofit/>
-          </a:bodyPr>
-          <a:lstStyle/>
-          <a:p>
-            <a:pPr algn="l"/>
-            <a:endParaRPr lang="en-US" sz="1200" dirty="0">
-              <a:solidFill>
-                <a:schemeClr val="accent6"/>
-              </a:solidFill>
-            </a:endParaRPr>
-          </a:p>
-        </p:txBody>
-      </p:sp>
-      <p:pic>
-        <p:nvPicPr>
-          <p:cNvPr id="144" name="Graphic 143">
-            <a:extLst>
-              <a:ext uri="{FF2B5EF4-FFF2-40B4-BE49-F238E27FC236}">
-                <a16:creationId xmlns:a16="http://schemas.microsoft.com/office/drawing/2014/main" id="{F59EACDC-07FF-3BE1-F1D6-F8259CF14697}"/>
-              </a:ext>
-            </a:extLst>
-          </p:cNvPr>
-          <p:cNvPicPr>
-            <a:picLocks noChangeAspect="1"/>
-          </p:cNvPicPr>
-          <p:nvPr/>
-        </p:nvPicPr>
-        <p:blipFill>
-          <a:blip r:embed="rId2">
-            <a:extLst>
-              <a:ext uri="{96DAC541-7B7A-43D3-8B79-37D633B846F1}">
-                <asvg:svgBlip xmlns:asvg="http://schemas.microsoft.com/office/drawing/2016/SVG/main" r:embed="rId3"/>
-              </a:ext>
-            </a:extLst>
-          </a:blip>
-          <a:stretch>
-            <a:fillRect/>
-          </a:stretch>
-        </p:blipFill>
-        <p:spPr>
-          <a:xfrm>
-            <a:off x="4783802" y="3770547"/>
-            <a:ext cx="381000" cy="381000"/>
-          </a:xfrm>
-          <a:prstGeom prst="rect">
-            <a:avLst/>
-          </a:prstGeom>
-        </p:spPr>
-      </p:pic>
-      <p:sp>
-        <p:nvSpPr>
-          <p:cNvPr id="139" name="Rectangle 138">
-            <a:extLst>
-              <a:ext uri="{FF2B5EF4-FFF2-40B4-BE49-F238E27FC236}">
-                <a16:creationId xmlns:a16="http://schemas.microsoft.com/office/drawing/2014/main" id="{C3E1B924-D36A-CD17-0211-0D89A69B45A1}"/>
-              </a:ext>
-            </a:extLst>
-          </p:cNvPr>
-          <p:cNvSpPr/>
-          <p:nvPr/>
-        </p:nvSpPr>
-        <p:spPr>
-          <a:xfrm>
-            <a:off x="2513328" y="3767996"/>
-            <a:ext cx="2108215" cy="1237734"/>
-          </a:xfrm>
-          <a:prstGeom prst="rect">
-            <a:avLst/>
-          </a:prstGeom>
-          <a:solidFill>
-            <a:schemeClr val="accent6">
-              <a:lumMod val="20000"/>
-              <a:lumOff val="80000"/>
-              <a:alpha val="20000"/>
-            </a:schemeClr>
-          </a:solidFill>
-          <a:ln w="12700">
-            <a:noFill/>
-            <a:prstDash val="dash"/>
-          </a:ln>
-        </p:spPr>
-        <p:style>
-          <a:lnRef idx="2">
-            <a:schemeClr val="accent1">
-              <a:shade val="50000"/>
-            </a:schemeClr>
-          </a:lnRef>
-          <a:fillRef idx="1">
-            <a:schemeClr val="accent1"/>
-          </a:fillRef>
-          <a:effectRef idx="0">
-            <a:schemeClr val="accent1"/>
-          </a:effectRef>
-          <a:fontRef idx="minor">
-            <a:schemeClr val="lt1"/>
-          </a:fontRef>
-        </p:style>
-        <p:txBody>
-          <a:bodyPr rot="0" spcFirstLastPara="0" vertOverflow="overflow" horzOverflow="overflow" vert="horz" wrap="square" lIns="338328" tIns="45720" rIns="91440" bIns="45720" numCol="1" spcCol="0" rtlCol="0" fromWordArt="0" anchor="t" anchorCtr="0" forceAA="0" compatLnSpc="1">
-            <a:prstTxWarp prst="textNoShape">
-              <a:avLst/>
-            </a:prstTxWarp>
-            <a:noAutofit/>
-          </a:bodyPr>
-          <a:lstStyle/>
-          <a:p>
-            <a:pPr algn="l"/>
-            <a:endParaRPr lang="en-US" sz="1200" dirty="0">
-              <a:solidFill>
-                <a:schemeClr val="accent6"/>
-              </a:solidFill>
-            </a:endParaRPr>
-          </a:p>
-        </p:txBody>
-      </p:sp>
-      <p:pic>
-        <p:nvPicPr>
-          <p:cNvPr id="141" name="Graphic 140">
-            <a:extLst>
-              <a:ext uri="{FF2B5EF4-FFF2-40B4-BE49-F238E27FC236}">
-                <a16:creationId xmlns:a16="http://schemas.microsoft.com/office/drawing/2014/main" id="{66EBA29C-1B2E-5CC8-FAE7-BFDD450B335F}"/>
-              </a:ext>
-            </a:extLst>
-          </p:cNvPr>
-          <p:cNvPicPr>
-            <a:picLocks noChangeAspect="1"/>
-          </p:cNvPicPr>
-          <p:nvPr/>
-        </p:nvPicPr>
-        <p:blipFill>
-          <a:blip r:embed="rId2">
-            <a:extLst>
-              <a:ext uri="{96DAC541-7B7A-43D3-8B79-37D633B846F1}">
-                <asvg:svgBlip xmlns:asvg="http://schemas.microsoft.com/office/drawing/2016/SVG/main" r:embed="rId3"/>
-              </a:ext>
-            </a:extLst>
-          </a:blip>
-          <a:stretch>
-            <a:fillRect/>
-          </a:stretch>
-        </p:blipFill>
-        <p:spPr>
-          <a:xfrm>
-            <a:off x="2510120" y="3770547"/>
-            <a:ext cx="381000" cy="381000"/>
-          </a:xfrm>
-          <a:prstGeom prst="rect">
-            <a:avLst/>
-          </a:prstGeom>
-        </p:spPr>
-      </p:pic>
-      <p:sp>
-        <p:nvSpPr>
-          <p:cNvPr id="136" name="Rectangle 135">
-            <a:extLst>
-              <a:ext uri="{FF2B5EF4-FFF2-40B4-BE49-F238E27FC236}">
-                <a16:creationId xmlns:a16="http://schemas.microsoft.com/office/drawing/2014/main" id="{B8E4C2D0-BE3F-6461-B4E8-EA0519B9BC4C}"/>
-              </a:ext>
-            </a:extLst>
-          </p:cNvPr>
-          <p:cNvSpPr/>
-          <p:nvPr/>
-        </p:nvSpPr>
-        <p:spPr>
-          <a:xfrm>
-            <a:off x="4790218" y="2297319"/>
-            <a:ext cx="2108215" cy="1237734"/>
-          </a:xfrm>
-          <a:prstGeom prst="rect">
-            <a:avLst/>
-          </a:prstGeom>
-          <a:solidFill>
-            <a:schemeClr val="accent6">
-              <a:lumMod val="20000"/>
-              <a:lumOff val="80000"/>
-              <a:alpha val="20000"/>
-            </a:schemeClr>
-          </a:solidFill>
-          <a:ln w="12700">
-            <a:noFill/>
-            <a:prstDash val="dash"/>
-          </a:ln>
-        </p:spPr>
-        <p:style>
-          <a:lnRef idx="2">
-            <a:schemeClr val="accent1">
-              <a:shade val="50000"/>
-            </a:schemeClr>
-          </a:lnRef>
-          <a:fillRef idx="1">
-            <a:schemeClr val="accent1"/>
-          </a:fillRef>
-          <a:effectRef idx="0">
-            <a:schemeClr val="accent1"/>
-          </a:effectRef>
-          <a:fontRef idx="minor">
-            <a:schemeClr val="lt1"/>
-          </a:fontRef>
-        </p:style>
-        <p:txBody>
-          <a:bodyPr rot="0" spcFirstLastPara="0" vertOverflow="overflow" horzOverflow="overflow" vert="horz" wrap="square" lIns="338328" tIns="45720" rIns="91440" bIns="45720" numCol="1" spcCol="0" rtlCol="0" fromWordArt="0" anchor="t" anchorCtr="0" forceAA="0" compatLnSpc="1">
-            <a:prstTxWarp prst="textNoShape">
-              <a:avLst/>
-            </a:prstTxWarp>
-            <a:noAutofit/>
-          </a:bodyPr>
-          <a:lstStyle/>
-          <a:p>
-            <a:pPr algn="l"/>
-            <a:endParaRPr lang="en-US" sz="1200" dirty="0">
-              <a:solidFill>
-                <a:schemeClr val="accent6"/>
-              </a:solidFill>
-            </a:endParaRPr>
-          </a:p>
-        </p:txBody>
-      </p:sp>
-      <p:sp>
-        <p:nvSpPr>
-          <p:cNvPr id="137" name="TextBox 136">
-            <a:extLst>
-              <a:ext uri="{FF2B5EF4-FFF2-40B4-BE49-F238E27FC236}">
-                <a16:creationId xmlns:a16="http://schemas.microsoft.com/office/drawing/2014/main" id="{2601AA68-3953-41F7-892E-2572A70594D4}"/>
-              </a:ext>
-            </a:extLst>
-          </p:cNvPr>
-          <p:cNvSpPr txBox="1"/>
-          <p:nvPr/>
-        </p:nvSpPr>
-        <p:spPr>
-          <a:xfrm>
-            <a:off x="5088290" y="2297319"/>
-            <a:ext cx="1323754" cy="276999"/>
-          </a:xfrm>
-          <a:prstGeom prst="rect">
-            <a:avLst/>
-          </a:prstGeom>
-          <a:noFill/>
-        </p:spPr>
-        <p:txBody>
-          <a:bodyPr wrap="square" rtlCol="0">
-            <a:spAutoFit/>
-          </a:bodyPr>
-          <a:lstStyle/>
-          <a:p>
-            <a:pPr marL="91440"/>
+          <a:bodyPr lIns="502920" tIns="91440" bIns="91440" anchor="b" anchorCtr="0"/>
+          <a:lstStyle/>
+          <a:p>
+            <a:pPr eaLnBrk="1" fontAlgn="auto" hangingPunct="1">
+              <a:spcBef>
+                <a:spcPts val="0"/>
+              </a:spcBef>
+              <a:spcAft>
+                <a:spcPts val="0"/>
+              </a:spcAft>
+              <a:defRPr/>
+            </a:pPr>
             <a:r>
               <a:rPr lang="en-US" sz="1200" dirty="0">
-                <a:ln w="0"/>
                 <a:solidFill>
-                  <a:srgbClr val="6CAE3E"/>
+                  <a:schemeClr val="tx1"/>
                 </a:solidFill>
                 <a:latin typeface="Arial" panose="020B0604020202020204" pitchFamily="34" charset="0"/>
                 <a:cs typeface="Arial" panose="020B0604020202020204" pitchFamily="34" charset="0"/>
               </a:rPr>
-              <a:t>Public subnet</a:t>
-            </a:r>
-          </a:p>
-        </p:txBody>
-      </p:sp>
-      <p:pic>
-        <p:nvPicPr>
-          <p:cNvPr id="138" name="Graphic 137">
-            <a:extLst>
-              <a:ext uri="{FF2B5EF4-FFF2-40B4-BE49-F238E27FC236}">
-                <a16:creationId xmlns:a16="http://schemas.microsoft.com/office/drawing/2014/main" id="{FD6B0914-2899-50B6-5366-EB97375D19CB}"/>
-              </a:ext>
-            </a:extLst>
-          </p:cNvPr>
-          <p:cNvPicPr>
-            <a:picLocks noChangeAspect="1"/>
-          </p:cNvPicPr>
+              <a:t>Private subnet</a:t>
+            </a:r>
+          </a:p>
+        </p:txBody>
+      </p:sp>
+      <p:sp>
+        <p:nvSpPr>
+          <p:cNvPr id="8" name="Rectangle 7">
+            <a:extLst>
+              <a:ext uri="{FF2B5EF4-FFF2-40B4-BE49-F238E27FC236}">
+                <a16:creationId xmlns:a16="http://schemas.microsoft.com/office/drawing/2014/main" id="{D52CE59D-A7E2-F341-BBD2-2234BA19F1B8}"/>
+              </a:ext>
+            </a:extLst>
+          </p:cNvPr>
+          <p:cNvSpPr/>
           <p:nvPr/>
-        </p:nvPicPr>
-        <p:blipFill>
-          <a:blip r:embed="rId2">
-            <a:extLst>
-              <a:ext uri="{96DAC541-7B7A-43D3-8B79-37D633B846F1}">
-                <asvg:svgBlip xmlns:asvg="http://schemas.microsoft.com/office/drawing/2016/SVG/main" r:embed="rId3"/>
-              </a:ext>
-            </a:extLst>
-          </a:blip>
-          <a:stretch>
-            <a:fillRect/>
-          </a:stretch>
-        </p:blipFill>
+        </p:nvSpPr>
         <p:spPr>
           <a:xfrm>
-            <a:off x="4787010" y="2299870"/>
-            <a:ext cx="381000" cy="381000"/>
-          </a:xfrm>
-          <a:prstGeom prst="rect">
-            <a:avLst/>
-          </a:prstGeom>
-        </p:spPr>
-      </p:pic>
-      <p:sp>
-        <p:nvSpPr>
-          <p:cNvPr id="133" name="Rectangle 132">
-            <a:extLst>
-              <a:ext uri="{FF2B5EF4-FFF2-40B4-BE49-F238E27FC236}">
-                <a16:creationId xmlns:a16="http://schemas.microsoft.com/office/drawing/2014/main" id="{8BEBC90F-F3B4-90DA-D92B-76042B96FAAA}"/>
-              </a:ext>
-            </a:extLst>
-          </p:cNvPr>
-          <p:cNvSpPr/>
-          <p:nvPr/>
-        </p:nvSpPr>
-        <p:spPr>
-          <a:xfrm>
-            <a:off x="2513328" y="2297319"/>
-            <a:ext cx="2108215" cy="1237734"/>
-          </a:xfrm>
-          <a:prstGeom prst="rect">
-            <a:avLst/>
-          </a:prstGeom>
-          <a:solidFill>
-            <a:schemeClr val="accent6">
-              <a:lumMod val="20000"/>
-              <a:lumOff val="80000"/>
-              <a:alpha val="20000"/>
-            </a:schemeClr>
-          </a:solidFill>
-          <a:ln w="12700">
-            <a:noFill/>
-            <a:prstDash val="dash"/>
-          </a:ln>
-        </p:spPr>
-        <p:style>
-          <a:lnRef idx="2">
-            <a:schemeClr val="accent1">
-              <a:shade val="50000"/>
-            </a:schemeClr>
-          </a:lnRef>
-          <a:fillRef idx="1">
-            <a:schemeClr val="accent1"/>
-          </a:fillRef>
-          <a:effectRef idx="0">
-            <a:schemeClr val="accent1"/>
-          </a:effectRef>
-          <a:fontRef idx="minor">
-            <a:schemeClr val="lt1"/>
-          </a:fontRef>
-        </p:style>
-        <p:txBody>
-          <a:bodyPr rot="0" spcFirstLastPara="0" vertOverflow="overflow" horzOverflow="overflow" vert="horz" wrap="square" lIns="338328" tIns="45720" rIns="91440" bIns="45720" numCol="1" spcCol="0" rtlCol="0" fromWordArt="0" anchor="t" anchorCtr="0" forceAA="0" compatLnSpc="1">
-            <a:prstTxWarp prst="textNoShape">
-              <a:avLst/>
-            </a:prstTxWarp>
-            <a:noAutofit/>
-          </a:bodyPr>
-          <a:lstStyle/>
-          <a:p>
-            <a:pPr algn="l"/>
-            <a:endParaRPr lang="en-US" sz="1200" dirty="0">
-              <a:solidFill>
-                <a:schemeClr val="accent6"/>
-              </a:solidFill>
-            </a:endParaRPr>
-          </a:p>
-        </p:txBody>
-      </p:sp>
-      <p:sp>
-        <p:nvSpPr>
-          <p:cNvPr id="134" name="TextBox 133">
-            <a:extLst>
-              <a:ext uri="{FF2B5EF4-FFF2-40B4-BE49-F238E27FC236}">
-                <a16:creationId xmlns:a16="http://schemas.microsoft.com/office/drawing/2014/main" id="{1AF1F1A6-5DCB-EFA9-B306-C16CF5EFFBCE}"/>
-              </a:ext>
-            </a:extLst>
-          </p:cNvPr>
-          <p:cNvSpPr txBox="1"/>
-          <p:nvPr/>
-        </p:nvSpPr>
-        <p:spPr>
-          <a:xfrm>
-            <a:off x="2811400" y="2297319"/>
-            <a:ext cx="1323754" cy="276999"/>
-          </a:xfrm>
-          <a:prstGeom prst="rect">
-            <a:avLst/>
-          </a:prstGeom>
-          <a:noFill/>
-        </p:spPr>
-        <p:txBody>
-          <a:bodyPr wrap="square" rtlCol="0">
-            <a:spAutoFit/>
-          </a:bodyPr>
-          <a:lstStyle/>
-          <a:p>
-            <a:pPr marL="91440"/>
-            <a:r>
-              <a:rPr lang="en-US" sz="1200" dirty="0">
-                <a:ln w="0"/>
-                <a:solidFill>
-                  <a:srgbClr val="6CAE3E"/>
-                </a:solidFill>
-                <a:latin typeface="Arial" panose="020B0604020202020204" pitchFamily="34" charset="0"/>
-                <a:cs typeface="Arial" panose="020B0604020202020204" pitchFamily="34" charset="0"/>
-              </a:rPr>
-              <a:t>Public subnet</a:t>
-            </a:r>
-          </a:p>
-        </p:txBody>
-      </p:sp>
-      <p:pic>
-        <p:nvPicPr>
-          <p:cNvPr id="135" name="Graphic 134">
-            <a:extLst>
-              <a:ext uri="{FF2B5EF4-FFF2-40B4-BE49-F238E27FC236}">
-                <a16:creationId xmlns:a16="http://schemas.microsoft.com/office/drawing/2014/main" id="{7ADCF5B0-3A56-5762-76B8-D0731EAFC8EA}"/>
-              </a:ext>
-            </a:extLst>
-          </p:cNvPr>
-          <p:cNvPicPr>
-            <a:picLocks noChangeAspect="1"/>
-          </p:cNvPicPr>
-          <p:nvPr/>
-        </p:nvPicPr>
-        <p:blipFill>
-          <a:blip r:embed="rId2">
-            <a:extLst>
-              <a:ext uri="{96DAC541-7B7A-43D3-8B79-37D633B846F1}">
-                <asvg:svgBlip xmlns:asvg="http://schemas.microsoft.com/office/drawing/2016/SVG/main" r:embed="rId3"/>
-              </a:ext>
-            </a:extLst>
-          </a:blip>
-          <a:stretch>
-            <a:fillRect/>
-          </a:stretch>
-        </p:blipFill>
-        <p:spPr>
-          <a:xfrm>
-            <a:off x="2510120" y="2299870"/>
-            <a:ext cx="381000" cy="381000"/>
-          </a:xfrm>
-          <a:prstGeom prst="rect">
-            <a:avLst/>
-          </a:prstGeom>
-        </p:spPr>
-      </p:pic>
-      <p:sp>
-        <p:nvSpPr>
-          <p:cNvPr id="107" name="Rectangle 106">
-            <a:extLst>
-              <a:ext uri="{FF2B5EF4-FFF2-40B4-BE49-F238E27FC236}">
-                <a16:creationId xmlns:a16="http://schemas.microsoft.com/office/drawing/2014/main" id="{07D95CAB-A2AE-1B0A-2B31-EF4A1CD4AE6E}"/>
-              </a:ext>
-            </a:extLst>
-          </p:cNvPr>
-          <p:cNvSpPr/>
-          <p:nvPr/>
-        </p:nvSpPr>
-        <p:spPr>
-          <a:xfrm>
-            <a:off x="969888" y="1834743"/>
-            <a:ext cx="6235309" cy="3302866"/>
+            <a:off x="1025144" y="540512"/>
+            <a:ext cx="7326376" cy="4385056"/>
           </a:xfrm>
           <a:prstGeom prst="rect">
             <a:avLst/>
@@ -3843,7 +3422,7 @@
           <a:noFill/>
           <a:ln w="12700">
             <a:solidFill>
-              <a:schemeClr val="accent6"/>
+              <a:srgbClr val="8C4EFF"/>
             </a:solidFill>
           </a:ln>
         </p:spPr>
@@ -3864,7 +3443,7 @@
           </a:fontRef>
         </p:style>
         <p:txBody>
-          <a:bodyPr rot="0" spcFirstLastPara="0" vertOverflow="overflow" horzOverflow="overflow" vert="horz" wrap="square" lIns="457200" tIns="91440" rIns="91440" bIns="45720" numCol="1" spcCol="0" rtlCol="0" fromWordArt="0" anchor="t" anchorCtr="0" forceAA="0" compatLnSpc="1">
+          <a:bodyPr rot="0" spcFirstLastPara="0" vertOverflow="overflow" horzOverflow="overflow" vert="horz" wrap="square" lIns="365760" tIns="91440" rIns="91440" bIns="45720" numCol="1" spcCol="0" rtlCol="0" fromWordArt="0" anchor="t" anchorCtr="0" forceAA="0" compatLnSpc="1">
             <a:prstTxWarp prst="textNoShape">
               <a:avLst/>
             </a:prstTxWarp>
@@ -3887,12 +3466,88 @@
           </a:p>
         </p:txBody>
       </p:sp>
-      <p:sp>
-        <p:nvSpPr>
-          <p:cNvPr id="109" name="Rectangle 108">
-            <a:extLst>
-              <a:ext uri="{FF2B5EF4-FFF2-40B4-BE49-F238E27FC236}">
-                <a16:creationId xmlns:a16="http://schemas.microsoft.com/office/drawing/2014/main" id="{9FBEB06F-2278-832E-B82B-719A27638781}"/>
+      <p:pic>
+        <p:nvPicPr>
+          <p:cNvPr id="15" name="Graphic 14" descr="VPC group icon. ">
+            <a:extLst>
+              <a:ext uri="{FF2B5EF4-FFF2-40B4-BE49-F238E27FC236}">
+                <a16:creationId xmlns:a16="http://schemas.microsoft.com/office/drawing/2014/main" id="{07874CE3-0EB1-AF7A-FED9-A70C549E3CDC}"/>
+              </a:ext>
+            </a:extLst>
+          </p:cNvPr>
+          <p:cNvPicPr>
+            <a:picLocks noChangeAspect="1"/>
+          </p:cNvPicPr>
+          <p:nvPr/>
+        </p:nvPicPr>
+        <p:blipFill>
+          <a:blip r:embed="rId2">
+            <a:extLst>
+              <a:ext uri="{96DAC541-7B7A-43D3-8B79-37D633B846F1}">
+                <asvg:svgBlip xmlns:asvg="http://schemas.microsoft.com/office/drawing/2016/SVG/main" r:embed="rId3"/>
+              </a:ext>
+            </a:extLst>
+          </a:blip>
+          <a:srcRect/>
+          <a:stretch/>
+        </p:blipFill>
+        <p:spPr>
+          <a:xfrm>
+            <a:off x="1022265" y="538396"/>
+            <a:ext cx="338509" cy="338509"/>
+          </a:xfrm>
+          <a:prstGeom prst="rect">
+            <a:avLst/>
+          </a:prstGeom>
+        </p:spPr>
+      </p:pic>
+      <p:pic>
+        <p:nvPicPr>
+          <p:cNvPr id="16" name="Graphic 15">
+            <a:extLst>
+              <a:ext uri="{FF2B5EF4-FFF2-40B4-BE49-F238E27FC236}">
+                <a16:creationId xmlns:a16="http://schemas.microsoft.com/office/drawing/2014/main" id="{17D29FB9-5AE8-D63A-4D3D-1AE702CFB3B0}"/>
+              </a:ext>
+              <a:ext uri="{C183D7F6-B498-43B3-948B-1728B52AA6E4}">
+                <adec:decorative xmlns:adec="http://schemas.microsoft.com/office/drawing/2017/decorative" val="1"/>
+              </a:ext>
+            </a:extLst>
+          </p:cNvPr>
+          <p:cNvPicPr>
+            <a:picLocks noChangeAspect="1"/>
+          </p:cNvPicPr>
+          <p:nvPr/>
+        </p:nvPicPr>
+        <p:blipFill>
+          <a:blip r:embed="rId4">
+            <a:extLst>
+              <a:ext uri="{96DAC541-7B7A-43D3-8B79-37D633B846F1}">
+                <asvg:svgBlip xmlns:asvg="http://schemas.microsoft.com/office/drawing/2016/SVG/main" r:embed="rId5"/>
+              </a:ext>
+            </a:extLst>
+          </a:blip>
+          <a:srcRect/>
+          <a:stretch/>
+        </p:blipFill>
+        <p:spPr>
+          <a:xfrm>
+            <a:off x="2687238" y="4211699"/>
+            <a:ext cx="338509" cy="338509"/>
+          </a:xfrm>
+          <a:prstGeom prst="rect">
+            <a:avLst/>
+          </a:prstGeom>
+        </p:spPr>
+      </p:pic>
+      <p:sp>
+        <p:nvSpPr>
+          <p:cNvPr id="25" name="Rectangle 24">
+            <a:extLst>
+              <a:ext uri="{FF2B5EF4-FFF2-40B4-BE49-F238E27FC236}">
+                <a16:creationId xmlns:a16="http://schemas.microsoft.com/office/drawing/2014/main" id="{B9D00082-7FBA-376F-486B-58E26AAE4726}"/>
+              </a:ext>
+              <a:ext uri="{C183D7F6-B498-43B3-948B-1728B52AA6E4}">
+                <adec:decorative xmlns:adec="http://schemas.microsoft.com/office/drawing/2017/decorative" val="1"/>
               </a:ext>
             </a:extLst>
           </p:cNvPr>
@@ -3901,18 +3556,18 @@
         </p:nvSpPr>
         <p:spPr>
           <a:xfrm>
-            <a:off x="2473326" y="1449005"/>
-            <a:ext cx="2187552" cy="3891076"/>
+            <a:off x="5497707" y="2861614"/>
+            <a:ext cx="2527461" cy="1688594"/>
           </a:xfrm>
           <a:prstGeom prst="rect">
             <a:avLst/>
           </a:prstGeom>
           <a:noFill/>
-          <a:ln w="12700">
+          <a:ln w="15875">
             <a:solidFill>
-              <a:srgbClr val="00A0C8"/>
+              <a:srgbClr val="7AA116"/>
             </a:solidFill>
-            <a:prstDash val="dash"/>
+            <a:prstDash val="solid"/>
           </a:ln>
         </p:spPr>
         <p:style>
@@ -3932,15 +3587,18 @@
           </a:fontRef>
         </p:style>
         <p:txBody>
-          <a:bodyPr rot="0" spcFirstLastPara="0" vertOverflow="overflow" horzOverflow="overflow" vert="horz" wrap="square" lIns="91440" tIns="91440" rIns="91440" bIns="45720" numCol="1" spcCol="0" rtlCol="0" fromWordArt="0" anchor="t" anchorCtr="0" forceAA="0" compatLnSpc="1">
-            <a:prstTxWarp prst="textNoShape">
-              <a:avLst/>
-            </a:prstTxWarp>
-            <a:noAutofit/>
-          </a:bodyPr>
-          <a:lstStyle/>
-          <a:p>
-            <a:pPr algn="ctr"/>
+          <a:bodyPr lIns="502920" tIns="91440" bIns="91440" anchor="b" anchorCtr="0"/>
+          <a:lstStyle/>
+          <a:p>
+            <a:pPr eaLnBrk="1" fontAlgn="auto" hangingPunct="1">
+              <a:spcBef>
+                <a:spcPts val="0"/>
+              </a:spcBef>
+              <a:spcAft>
+                <a:spcPts val="0"/>
+              </a:spcAft>
+              <a:defRPr/>
+            </a:pPr>
             <a:r>
               <a:rPr lang="en-US" sz="1200" dirty="0">
                 <a:solidFill>
@@ -3949,17 +3607,58 @@
                 <a:latin typeface="Arial" panose="020B0604020202020204" pitchFamily="34" charset="0"/>
                 <a:cs typeface="Arial" panose="020B0604020202020204" pitchFamily="34" charset="0"/>
               </a:rPr>
-              <a:t>Availability Zone 1</a:t>
-            </a:r>
-          </a:p>
-        </p:txBody>
-      </p:sp>
-      <p:sp>
-        <p:nvSpPr>
-          <p:cNvPr id="111" name="Rectangle 110">
-            <a:extLst>
-              <a:ext uri="{FF2B5EF4-FFF2-40B4-BE49-F238E27FC236}">
-                <a16:creationId xmlns:a16="http://schemas.microsoft.com/office/drawing/2014/main" id="{9115605B-2BDF-E13C-3BA9-311F56CF20E3}"/>
+              <a:t>Private subnet</a:t>
+            </a:r>
+          </a:p>
+        </p:txBody>
+      </p:sp>
+      <p:pic>
+        <p:nvPicPr>
+          <p:cNvPr id="26" name="Graphic 25">
+            <a:extLst>
+              <a:ext uri="{FF2B5EF4-FFF2-40B4-BE49-F238E27FC236}">
+                <a16:creationId xmlns:a16="http://schemas.microsoft.com/office/drawing/2014/main" id="{52E09478-3E56-80D2-9A51-295F3279C50B}"/>
+              </a:ext>
+              <a:ext uri="{C183D7F6-B498-43B3-948B-1728B52AA6E4}">
+                <adec:decorative xmlns:adec="http://schemas.microsoft.com/office/drawing/2017/decorative" val="1"/>
+              </a:ext>
+            </a:extLst>
+          </p:cNvPr>
+          <p:cNvPicPr>
+            <a:picLocks noChangeAspect="1"/>
+          </p:cNvPicPr>
+          <p:nvPr/>
+        </p:nvPicPr>
+        <p:blipFill>
+          <a:blip r:embed="rId4">
+            <a:extLst>
+              <a:ext uri="{96DAC541-7B7A-43D3-8B79-37D633B846F1}">
+                <asvg:svgBlip xmlns:asvg="http://schemas.microsoft.com/office/drawing/2016/SVG/main" r:embed="rId5"/>
+              </a:ext>
+            </a:extLst>
+          </a:blip>
+          <a:srcRect/>
+          <a:stretch/>
+        </p:blipFill>
+        <p:spPr>
+          <a:xfrm>
+            <a:off x="5497707" y="4211699"/>
+            <a:ext cx="338509" cy="338509"/>
+          </a:xfrm>
+          <a:prstGeom prst="rect">
+            <a:avLst/>
+          </a:prstGeom>
+        </p:spPr>
+      </p:pic>
+      <p:sp>
+        <p:nvSpPr>
+          <p:cNvPr id="27" name="Rectangle 26">
+            <a:extLst>
+              <a:ext uri="{FF2B5EF4-FFF2-40B4-BE49-F238E27FC236}">
+                <a16:creationId xmlns:a16="http://schemas.microsoft.com/office/drawing/2014/main" id="{C3550C67-7FB1-663F-2ADF-517B85F0B52D}"/>
+              </a:ext>
+              <a:ext uri="{C183D7F6-B498-43B3-948B-1728B52AA6E4}">
+                <adec:decorative xmlns:adec="http://schemas.microsoft.com/office/drawing/2017/decorative" val="1"/>
               </a:ext>
             </a:extLst>
           </p:cNvPr>
@@ -3968,18 +3667,18 @@
         </p:nvSpPr>
         <p:spPr>
           <a:xfrm>
-            <a:off x="4752508" y="1449005"/>
-            <a:ext cx="2187552" cy="3891076"/>
+            <a:off x="2687238" y="876905"/>
+            <a:ext cx="2527461" cy="1688593"/>
           </a:xfrm>
           <a:prstGeom prst="rect">
             <a:avLst/>
           </a:prstGeom>
           <a:noFill/>
-          <a:ln w="12700">
+          <a:ln w="15875">
             <a:solidFill>
-              <a:srgbClr val="00A0C8"/>
+              <a:srgbClr val="7AA116"/>
             </a:solidFill>
-            <a:prstDash val="dash"/>
+            <a:prstDash val="solid"/>
           </a:ln>
         </p:spPr>
         <p:style>
@@ -3999,15 +3698,18 @@
           </a:fontRef>
         </p:style>
         <p:txBody>
-          <a:bodyPr rot="0" spcFirstLastPara="0" vertOverflow="overflow" horzOverflow="overflow" vert="horz" wrap="square" lIns="91440" tIns="91440" rIns="91440" bIns="45720" numCol="1" spcCol="0" rtlCol="0" fromWordArt="0" anchor="t" anchorCtr="0" forceAA="0" compatLnSpc="1">
-            <a:prstTxWarp prst="textNoShape">
-              <a:avLst/>
-            </a:prstTxWarp>
-            <a:noAutofit/>
-          </a:bodyPr>
-          <a:lstStyle/>
-          <a:p>
-            <a:pPr algn="ctr"/>
+          <a:bodyPr lIns="502920" tIns="91440" bIns="91440" anchor="t" anchorCtr="0"/>
+          <a:lstStyle/>
+          <a:p>
+            <a:pPr eaLnBrk="1" fontAlgn="auto" hangingPunct="1">
+              <a:spcBef>
+                <a:spcPts val="0"/>
+              </a:spcBef>
+              <a:spcAft>
+                <a:spcPts val="0"/>
+              </a:spcAft>
+              <a:defRPr/>
+            </a:pPr>
             <a:r>
               <a:rPr lang="en-US" sz="1200" dirty="0">
                 <a:solidFill>
@@ -4016,95 +3718,20 @@
                 <a:latin typeface="Arial" panose="020B0604020202020204" pitchFamily="34" charset="0"/>
                 <a:cs typeface="Arial" panose="020B0604020202020204" pitchFamily="34" charset="0"/>
               </a:rPr>
-              <a:t>Availability Zone 2</a:t>
-            </a:r>
-          </a:p>
-        </p:txBody>
-      </p:sp>
-      <p:sp>
-        <p:nvSpPr>
-          <p:cNvPr id="113" name="TextBox 112">
-            <a:extLst>
-              <a:ext uri="{FF2B5EF4-FFF2-40B4-BE49-F238E27FC236}">
-                <a16:creationId xmlns:a16="http://schemas.microsoft.com/office/drawing/2014/main" id="{D8C8D73C-046C-10ED-CED9-63AF69CB673C}"/>
-              </a:ext>
-            </a:extLst>
-          </p:cNvPr>
-          <p:cNvSpPr txBox="1"/>
-          <p:nvPr/>
-        </p:nvSpPr>
-        <p:spPr>
-          <a:xfrm>
-            <a:off x="2678413" y="3120649"/>
-            <a:ext cx="1778046" cy="261610"/>
-          </a:xfrm>
-          <a:prstGeom prst="rect">
-            <a:avLst/>
-          </a:prstGeom>
-          <a:noFill/>
-        </p:spPr>
-        <p:txBody>
-          <a:bodyPr wrap="square" rtlCol="0">
-            <a:spAutoFit/>
-          </a:bodyPr>
-          <a:lstStyle/>
-          <a:p>
-            <a:pPr algn="ctr"/>
-            <a:r>
-              <a:rPr lang="en-US" sz="1100" dirty="0">
-                <a:latin typeface="Arial" panose="020B0604020202020204" pitchFamily="34" charset="0"/>
-                <a:cs typeface="Arial" panose="020B0604020202020204" pitchFamily="34" charset="0"/>
-              </a:rPr>
-              <a:t>NAT gateway</a:t>
-            </a:r>
-          </a:p>
-        </p:txBody>
-      </p:sp>
-      <p:sp>
-        <p:nvSpPr>
-          <p:cNvPr id="114" name="TextBox 113">
-            <a:extLst>
-              <a:ext uri="{FF2B5EF4-FFF2-40B4-BE49-F238E27FC236}">
-                <a16:creationId xmlns:a16="http://schemas.microsoft.com/office/drawing/2014/main" id="{FE76BB8D-F97F-DD4D-E86D-BA57C802F302}"/>
-              </a:ext>
-            </a:extLst>
-          </p:cNvPr>
-          <p:cNvSpPr txBox="1"/>
-          <p:nvPr/>
-        </p:nvSpPr>
-        <p:spPr>
-          <a:xfrm>
-            <a:off x="4997463" y="3120649"/>
-            <a:ext cx="1778046" cy="261610"/>
-          </a:xfrm>
-          <a:prstGeom prst="rect">
-            <a:avLst/>
-          </a:prstGeom>
-          <a:noFill/>
-        </p:spPr>
-        <p:txBody>
-          <a:bodyPr wrap="square" rtlCol="0">
-            <a:spAutoFit/>
-          </a:bodyPr>
-          <a:lstStyle/>
-          <a:p>
-            <a:pPr algn="ctr"/>
-            <a:r>
-              <a:rPr lang="en-US" sz="1100" dirty="0">
-                <a:latin typeface="Arial" panose="020B0604020202020204" pitchFamily="34" charset="0"/>
-                <a:cs typeface="Arial" panose="020B0604020202020204" pitchFamily="34" charset="0"/>
-              </a:rPr>
-              <a:t>NAT gateway</a:t>
+              <a:t>Public subnet</a:t>
             </a:r>
           </a:p>
         </p:txBody>
       </p:sp>
       <p:pic>
         <p:nvPicPr>
-          <p:cNvPr id="128" name="Graphic 127">
-            <a:extLst>
-              <a:ext uri="{FF2B5EF4-FFF2-40B4-BE49-F238E27FC236}">
-                <a16:creationId xmlns:a16="http://schemas.microsoft.com/office/drawing/2014/main" id="{727CFEAF-F392-E671-D5E0-159672329E9E}"/>
+          <p:cNvPr id="28" name="Graphic 27">
+            <a:extLst>
+              <a:ext uri="{FF2B5EF4-FFF2-40B4-BE49-F238E27FC236}">
+                <a16:creationId xmlns:a16="http://schemas.microsoft.com/office/drawing/2014/main" id="{61F805BC-B033-4F7B-8797-998FFA33B4AD}"/>
+              </a:ext>
+              <a:ext uri="{C183D7F6-B498-43B3-948B-1728B52AA6E4}">
+                <adec:decorative xmlns:adec="http://schemas.microsoft.com/office/drawing/2017/decorative" val="1"/>
               </a:ext>
             </a:extLst>
           </p:cNvPr>
@@ -4121,14 +3748,400 @@
               </a:ext>
             </a:extLst>
           </a:blip>
+          <a:srcRect/>
+          <a:stretch/>
+        </p:blipFill>
+        <p:spPr>
+          <a:xfrm>
+            <a:off x="2687238" y="876904"/>
+            <a:ext cx="338509" cy="338509"/>
+          </a:xfrm>
+          <a:prstGeom prst="rect">
+            <a:avLst/>
+          </a:prstGeom>
+        </p:spPr>
+      </p:pic>
+      <p:sp>
+        <p:nvSpPr>
+          <p:cNvPr id="29" name="Rectangle 28">
+            <a:extLst>
+              <a:ext uri="{FF2B5EF4-FFF2-40B4-BE49-F238E27FC236}">
+                <a16:creationId xmlns:a16="http://schemas.microsoft.com/office/drawing/2014/main" id="{2B47B207-4C03-8DE3-B6EF-B71A9468E20C}"/>
+              </a:ext>
+              <a:ext uri="{C183D7F6-B498-43B3-948B-1728B52AA6E4}">
+                <adec:decorative xmlns:adec="http://schemas.microsoft.com/office/drawing/2017/decorative" val="1"/>
+              </a:ext>
+            </a:extLst>
+          </p:cNvPr>
+          <p:cNvSpPr/>
+          <p:nvPr/>
+        </p:nvSpPr>
+        <p:spPr>
+          <a:xfrm>
+            <a:off x="5497707" y="876905"/>
+            <a:ext cx="2527461" cy="1688594"/>
+          </a:xfrm>
+          <a:prstGeom prst="rect">
+            <a:avLst/>
+          </a:prstGeom>
+          <a:noFill/>
+          <a:ln w="15875">
+            <a:solidFill>
+              <a:srgbClr val="7AA116"/>
+            </a:solidFill>
+            <a:prstDash val="solid"/>
+          </a:ln>
+        </p:spPr>
+        <p:style>
+          <a:lnRef idx="2">
+            <a:schemeClr val="accent1">
+              <a:shade val="50000"/>
+            </a:schemeClr>
+          </a:lnRef>
+          <a:fillRef idx="1">
+            <a:schemeClr val="accent1"/>
+          </a:fillRef>
+          <a:effectRef idx="0">
+            <a:schemeClr val="accent1"/>
+          </a:effectRef>
+          <a:fontRef idx="minor">
+            <a:schemeClr val="lt1"/>
+          </a:fontRef>
+        </p:style>
+        <p:txBody>
+          <a:bodyPr lIns="502920" tIns="91440" bIns="91440" anchor="t" anchorCtr="0"/>
+          <a:lstStyle/>
+          <a:p>
+            <a:pPr eaLnBrk="1" fontAlgn="auto" hangingPunct="1">
+              <a:spcBef>
+                <a:spcPts val="0"/>
+              </a:spcBef>
+              <a:spcAft>
+                <a:spcPts val="0"/>
+              </a:spcAft>
+              <a:defRPr/>
+            </a:pPr>
+            <a:r>
+              <a:rPr lang="en-US" sz="1200" dirty="0">
+                <a:solidFill>
+                  <a:schemeClr val="tx1"/>
+                </a:solidFill>
+                <a:latin typeface="Arial" panose="020B0604020202020204" pitchFamily="34" charset="0"/>
+                <a:cs typeface="Arial" panose="020B0604020202020204" pitchFamily="34" charset="0"/>
+              </a:rPr>
+              <a:t>Public subnet</a:t>
+            </a:r>
+          </a:p>
+        </p:txBody>
+      </p:sp>
+      <p:pic>
+        <p:nvPicPr>
+          <p:cNvPr id="30" name="Graphic 29">
+            <a:extLst>
+              <a:ext uri="{FF2B5EF4-FFF2-40B4-BE49-F238E27FC236}">
+                <a16:creationId xmlns:a16="http://schemas.microsoft.com/office/drawing/2014/main" id="{9A936BCD-8AD1-87BA-35DD-1BDA73BDD386}"/>
+              </a:ext>
+              <a:ext uri="{C183D7F6-B498-43B3-948B-1728B52AA6E4}">
+                <adec:decorative xmlns:adec="http://schemas.microsoft.com/office/drawing/2017/decorative" val="1"/>
+              </a:ext>
+            </a:extLst>
+          </p:cNvPr>
+          <p:cNvPicPr>
+            <a:picLocks noChangeAspect="1"/>
+          </p:cNvPicPr>
+          <p:nvPr/>
+        </p:nvPicPr>
+        <p:blipFill>
+          <a:blip r:embed="rId4">
+            <a:extLst>
+              <a:ext uri="{96DAC541-7B7A-43D3-8B79-37D633B846F1}">
+                <asvg:svgBlip xmlns:asvg="http://schemas.microsoft.com/office/drawing/2016/SVG/main" r:embed="rId5"/>
+              </a:ext>
+            </a:extLst>
+          </a:blip>
+          <a:srcRect/>
+          <a:stretch/>
+        </p:blipFill>
+        <p:spPr>
+          <a:xfrm>
+            <a:off x="5497707" y="876904"/>
+            <a:ext cx="338509" cy="338509"/>
+          </a:xfrm>
+          <a:prstGeom prst="rect">
+            <a:avLst/>
+          </a:prstGeom>
+        </p:spPr>
+      </p:pic>
+      <p:grpSp>
+        <p:nvGrpSpPr>
+          <p:cNvPr id="31" name="Group 30" descr="Internet gateway service icon on VPC container.">
+            <a:extLst>
+              <a:ext uri="{FF2B5EF4-FFF2-40B4-BE49-F238E27FC236}">
+                <a16:creationId xmlns:a16="http://schemas.microsoft.com/office/drawing/2014/main" id="{E36BC032-66B2-B519-7A9F-4422810D3B79}"/>
+              </a:ext>
+            </a:extLst>
+          </p:cNvPr>
+          <p:cNvGrpSpPr/>
+          <p:nvPr/>
+        </p:nvGrpSpPr>
+        <p:grpSpPr>
+          <a:xfrm>
+            <a:off x="1178900" y="1492602"/>
+            <a:ext cx="1403350" cy="733255"/>
+            <a:chOff x="7325969" y="1855841"/>
+            <a:chExt cx="1403350" cy="733255"/>
+          </a:xfrm>
+        </p:grpSpPr>
+        <p:pic>
+          <p:nvPicPr>
+            <p:cNvPr id="32" name="Graphic 10" descr="Internet gateway resource icon for the Amazon VPC service.">
+              <a:extLst>
+                <a:ext uri="{FF2B5EF4-FFF2-40B4-BE49-F238E27FC236}">
+                  <a16:creationId xmlns:a16="http://schemas.microsoft.com/office/drawing/2014/main" id="{56E3FA56-F1DB-983F-F217-2277AB897C50}"/>
+                </a:ext>
+              </a:extLst>
+            </p:cNvPr>
+            <p:cNvPicPr>
+              <a:picLocks noChangeAspect="1" noChangeArrowheads="1"/>
+            </p:cNvPicPr>
+            <p:nvPr/>
+          </p:nvPicPr>
+          <p:blipFill>
+            <a:blip r:embed="rId6">
+              <a:extLst>
+                <a:ext uri="{96DAC541-7B7A-43D3-8B79-37D633B846F1}">
+                  <asvg:svgBlip xmlns:asvg="http://schemas.microsoft.com/office/drawing/2016/SVG/main" r:embed="rId7"/>
+                </a:ext>
+              </a:extLst>
+            </a:blip>
+            <a:srcRect/>
+            <a:stretch/>
+          </p:blipFill>
+          <p:spPr bwMode="auto">
+            <a:xfrm>
+              <a:off x="7799044" y="1855841"/>
+              <a:ext cx="457200" cy="457200"/>
+            </a:xfrm>
+            <a:prstGeom prst="rect">
+              <a:avLst/>
+            </a:prstGeom>
+            <a:noFill/>
+            <a:ln>
+              <a:noFill/>
+            </a:ln>
+            <a:extLst>
+              <a:ext uri="{909E8E84-426E-40DD-AFC4-6F175D3DCCD1}">
+                <a14:hiddenFill xmlns:a14="http://schemas.microsoft.com/office/drawing/2010/main">
+                  <a:solidFill>
+                    <a:srgbClr val="FFFFFF"/>
+                  </a:solidFill>
+                </a14:hiddenFill>
+              </a:ext>
+              <a:ext uri="{91240B29-F687-4F45-9708-019B960494DF}">
+                <a14:hiddenLine xmlns:a14="http://schemas.microsoft.com/office/drawing/2010/main" w="9525">
+                  <a:solidFill>
+                    <a:srgbClr val="000000"/>
+                  </a:solidFill>
+                  <a:miter lim="800000"/>
+                  <a:headEnd/>
+                  <a:tailEnd/>
+                </a14:hiddenLine>
+              </a:ext>
+            </a:extLst>
+          </p:spPr>
+        </p:pic>
+        <p:sp>
+          <p:nvSpPr>
+            <p:cNvPr id="33" name="TextBox 12">
+              <a:extLst>
+                <a:ext uri="{FF2B5EF4-FFF2-40B4-BE49-F238E27FC236}">
+                  <a16:creationId xmlns:a16="http://schemas.microsoft.com/office/drawing/2014/main" id="{904964E0-5AAD-B381-9C0F-EB96F2449EA8}"/>
+                </a:ext>
+              </a:extLst>
+            </p:cNvPr>
+            <p:cNvSpPr txBox="1">
+              <a:spLocks noChangeArrowheads="1"/>
+            </p:cNvSpPr>
+            <p:nvPr/>
+          </p:nvSpPr>
+          <p:spPr bwMode="auto">
+            <a:xfrm>
+              <a:off x="7325969" y="2312097"/>
+              <a:ext cx="1403350" cy="276999"/>
+            </a:xfrm>
+            <a:prstGeom prst="rect">
+              <a:avLst/>
+            </a:prstGeom>
+            <a:noFill/>
+            <a:ln>
+              <a:noFill/>
+            </a:ln>
+            <a:extLst>
+              <a:ext uri="{909E8E84-426E-40DD-AFC4-6F175D3DCCD1}">
+                <a14:hiddenFill xmlns:a14="http://schemas.microsoft.com/office/drawing/2010/main">
+                  <a:solidFill>
+                    <a:srgbClr val="FFFFFF"/>
+                  </a:solidFill>
+                </a14:hiddenFill>
+              </a:ext>
+              <a:ext uri="{91240B29-F687-4F45-9708-019B960494DF}">
+                <a14:hiddenLine xmlns:a14="http://schemas.microsoft.com/office/drawing/2010/main" w="9525">
+                  <a:solidFill>
+                    <a:srgbClr val="000000"/>
+                  </a:solidFill>
+                  <a:miter lim="800000"/>
+                  <a:headEnd/>
+                  <a:tailEnd/>
+                </a14:hiddenLine>
+              </a:ext>
+            </a:extLst>
+          </p:spPr>
+          <p:txBody>
+            <a:bodyPr>
+              <a:spAutoFit/>
+            </a:bodyPr>
+            <a:lstStyle>
+              <a:lvl1pPr>
+                <a:defRPr>
+                  <a:solidFill>
+                    <a:schemeClr val="tx1"/>
+                  </a:solidFill>
+                  <a:latin typeface="Calibri" panose="020F0502020204030204" pitchFamily="34" charset="0"/>
+                </a:defRPr>
+              </a:lvl1pPr>
+              <a:lvl2pPr marL="742950" indent="-285750">
+                <a:defRPr>
+                  <a:solidFill>
+                    <a:schemeClr val="tx1"/>
+                  </a:solidFill>
+                  <a:latin typeface="Calibri" panose="020F0502020204030204" pitchFamily="34" charset="0"/>
+                </a:defRPr>
+              </a:lvl2pPr>
+              <a:lvl3pPr marL="1143000" indent="-228600">
+                <a:defRPr>
+                  <a:solidFill>
+                    <a:schemeClr val="tx1"/>
+                  </a:solidFill>
+                  <a:latin typeface="Calibri" panose="020F0502020204030204" pitchFamily="34" charset="0"/>
+                </a:defRPr>
+              </a:lvl3pPr>
+              <a:lvl4pPr marL="1600200" indent="-228600">
+                <a:defRPr>
+                  <a:solidFill>
+                    <a:schemeClr val="tx1"/>
+                  </a:solidFill>
+                  <a:latin typeface="Calibri" panose="020F0502020204030204" pitchFamily="34" charset="0"/>
+                </a:defRPr>
+              </a:lvl4pPr>
+              <a:lvl5pPr marL="2057400" indent="-228600">
+                <a:defRPr>
+                  <a:solidFill>
+                    <a:schemeClr val="tx1"/>
+                  </a:solidFill>
+                  <a:latin typeface="Calibri" panose="020F0502020204030204" pitchFamily="34" charset="0"/>
+                </a:defRPr>
+              </a:lvl5pPr>
+              <a:lvl6pPr marL="2514600" indent="-228600" eaLnBrk="0" fontAlgn="base" hangingPunct="0">
+                <a:spcBef>
+                  <a:spcPct val="0"/>
+                </a:spcBef>
+                <a:spcAft>
+                  <a:spcPct val="0"/>
+                </a:spcAft>
+                <a:defRPr>
+                  <a:solidFill>
+                    <a:schemeClr val="tx1"/>
+                  </a:solidFill>
+                  <a:latin typeface="Calibri" panose="020F0502020204030204" pitchFamily="34" charset="0"/>
+                </a:defRPr>
+              </a:lvl6pPr>
+              <a:lvl7pPr marL="2971800" indent="-228600" eaLnBrk="0" fontAlgn="base" hangingPunct="0">
+                <a:spcBef>
+                  <a:spcPct val="0"/>
+                </a:spcBef>
+                <a:spcAft>
+                  <a:spcPct val="0"/>
+                </a:spcAft>
+                <a:defRPr>
+                  <a:solidFill>
+                    <a:schemeClr val="tx1"/>
+                  </a:solidFill>
+                  <a:latin typeface="Calibri" panose="020F0502020204030204" pitchFamily="34" charset="0"/>
+                </a:defRPr>
+              </a:lvl7pPr>
+              <a:lvl8pPr marL="3429000" indent="-228600" eaLnBrk="0" fontAlgn="base" hangingPunct="0">
+                <a:spcBef>
+                  <a:spcPct val="0"/>
+                </a:spcBef>
+                <a:spcAft>
+                  <a:spcPct val="0"/>
+                </a:spcAft>
+                <a:defRPr>
+                  <a:solidFill>
+                    <a:schemeClr val="tx1"/>
+                  </a:solidFill>
+                  <a:latin typeface="Calibri" panose="020F0502020204030204" pitchFamily="34" charset="0"/>
+                </a:defRPr>
+              </a:lvl8pPr>
+              <a:lvl9pPr marL="3886200" indent="-228600" eaLnBrk="0" fontAlgn="base" hangingPunct="0">
+                <a:spcBef>
+                  <a:spcPct val="0"/>
+                </a:spcBef>
+                <a:spcAft>
+                  <a:spcPct val="0"/>
+                </a:spcAft>
+                <a:defRPr>
+                  <a:solidFill>
+                    <a:schemeClr val="tx1"/>
+                  </a:solidFill>
+                  <a:latin typeface="Calibri" panose="020F0502020204030204" pitchFamily="34" charset="0"/>
+                </a:defRPr>
+              </a:lvl9pPr>
+            </a:lstStyle>
+            <a:p>
+              <a:pPr algn="ctr" eaLnBrk="1" hangingPunct="1"/>
+              <a:r>
+                <a:rPr lang="en-US" altLang="en-US" sz="1200" dirty="0">
+                  <a:latin typeface="Arial" panose="020B0604020202020204" pitchFamily="34" charset="0"/>
+                  <a:ea typeface="Amazon Ember" panose="020B0603020204020204" pitchFamily="34" charset="0"/>
+                  <a:cs typeface="Arial" panose="020B0604020202020204" pitchFamily="34" charset="0"/>
+                </a:rPr>
+                <a:t>Internet gateway</a:t>
+              </a:r>
+            </a:p>
+          </p:txBody>
+        </p:sp>
+      </p:grpSp>
+      <p:pic>
+        <p:nvPicPr>
+          <p:cNvPr id="34" name="Graphic 33" descr="NAT gateway resource icon for the Amazon VPC service.&#10;">
+            <a:extLst>
+              <a:ext uri="{FF2B5EF4-FFF2-40B4-BE49-F238E27FC236}">
+                <a16:creationId xmlns:a16="http://schemas.microsoft.com/office/drawing/2014/main" id="{D9BE4C14-DBCC-756B-93DC-D62A14F89429}"/>
+              </a:ext>
+            </a:extLst>
+          </p:cNvPr>
+          <p:cNvPicPr>
+            <a:picLocks noChangeAspect="1"/>
+          </p:cNvPicPr>
+          <p:nvPr/>
+        </p:nvPicPr>
+        <p:blipFill>
+          <a:blip r:embed="rId8">
+            <a:extLst>
+              <a:ext uri="{96DAC541-7B7A-43D3-8B79-37D633B846F1}">
+                <asvg:svgBlip xmlns:asvg="http://schemas.microsoft.com/office/drawing/2016/SVG/main" r:embed="rId9"/>
+              </a:ext>
+            </a:extLst>
+          </a:blip>
           <a:stretch>
             <a:fillRect/>
           </a:stretch>
         </p:blipFill>
         <p:spPr>
           <a:xfrm>
-            <a:off x="969889" y="1833970"/>
-            <a:ext cx="381000" cy="381000"/>
+            <a:off x="3675508" y="1491658"/>
+            <a:ext cx="457200" cy="457200"/>
           </a:xfrm>
           <a:prstGeom prst="rect">
             <a:avLst/>
@@ -4137,119 +4150,22 @@
       </p:pic>
       <p:sp>
         <p:nvSpPr>
-          <p:cNvPr id="140" name="TextBox 139">
-            <a:extLst>
-              <a:ext uri="{FF2B5EF4-FFF2-40B4-BE49-F238E27FC236}">
-                <a16:creationId xmlns:a16="http://schemas.microsoft.com/office/drawing/2014/main" id="{7F012F11-11E5-6AE9-8B9D-930777917DB3}"/>
-              </a:ext>
-            </a:extLst>
-          </p:cNvPr>
-          <p:cNvSpPr txBox="1"/>
+          <p:cNvPr id="35" name="TextBox 17">
+            <a:extLst>
+              <a:ext uri="{FF2B5EF4-FFF2-40B4-BE49-F238E27FC236}">
+                <a16:creationId xmlns:a16="http://schemas.microsoft.com/office/drawing/2014/main" id="{0D9F54DE-E3B2-3F17-649D-3F83D0F53B8B}"/>
+              </a:ext>
+            </a:extLst>
+          </p:cNvPr>
+          <p:cNvSpPr txBox="1">
+            <a:spLocks noChangeArrowheads="1"/>
+          </p:cNvSpPr>
           <p:nvPr/>
         </p:nvSpPr>
-        <p:spPr>
-          <a:xfrm>
-            <a:off x="2811400" y="3767996"/>
-            <a:ext cx="1323754" cy="276999"/>
-          </a:xfrm>
-          <a:prstGeom prst="rect">
-            <a:avLst/>
-          </a:prstGeom>
-          <a:noFill/>
-        </p:spPr>
-        <p:txBody>
-          <a:bodyPr wrap="square" rtlCol="0">
-            <a:spAutoFit/>
-          </a:bodyPr>
-          <a:lstStyle/>
-          <a:p>
-            <a:pPr marL="91440"/>
-            <a:r>
-              <a:rPr lang="en-US" sz="1200" dirty="0">
-                <a:ln w="0"/>
-                <a:solidFill>
-                  <a:srgbClr val="6CAE3E"/>
-                </a:solidFill>
-                <a:latin typeface="Arial" panose="020B0604020202020204" pitchFamily="34" charset="0"/>
-                <a:cs typeface="Arial" panose="020B0604020202020204" pitchFamily="34" charset="0"/>
-              </a:rPr>
-              <a:t>Private subnet</a:t>
-            </a:r>
-          </a:p>
-        </p:txBody>
-      </p:sp>
-      <p:sp>
-        <p:nvSpPr>
-          <p:cNvPr id="143" name="TextBox 142">
-            <a:extLst>
-              <a:ext uri="{FF2B5EF4-FFF2-40B4-BE49-F238E27FC236}">
-                <a16:creationId xmlns:a16="http://schemas.microsoft.com/office/drawing/2014/main" id="{A634B611-691E-75BA-1776-8E9291A53FDE}"/>
-              </a:ext>
-            </a:extLst>
-          </p:cNvPr>
-          <p:cNvSpPr txBox="1"/>
-          <p:nvPr/>
-        </p:nvSpPr>
-        <p:spPr>
-          <a:xfrm>
-            <a:off x="5085082" y="3767996"/>
-            <a:ext cx="1323754" cy="276999"/>
-          </a:xfrm>
-          <a:prstGeom prst="rect">
-            <a:avLst/>
-          </a:prstGeom>
-          <a:noFill/>
-        </p:spPr>
-        <p:txBody>
-          <a:bodyPr wrap="square" rtlCol="0">
-            <a:spAutoFit/>
-          </a:bodyPr>
-          <a:lstStyle/>
-          <a:p>
-            <a:pPr marL="91440"/>
-            <a:r>
-              <a:rPr lang="en-US" sz="1200" dirty="0">
-                <a:ln w="0"/>
-                <a:solidFill>
-                  <a:srgbClr val="6CAE3E"/>
-                </a:solidFill>
-                <a:latin typeface="Arial" panose="020B0604020202020204" pitchFamily="34" charset="0"/>
-                <a:cs typeface="Arial" panose="020B0604020202020204" pitchFamily="34" charset="0"/>
-              </a:rPr>
-              <a:t>Private subnet</a:t>
-            </a:r>
-          </a:p>
-        </p:txBody>
-      </p:sp>
-      <p:pic>
-        <p:nvPicPr>
-          <p:cNvPr id="145" name="Graphic 34">
-            <a:extLst>
-              <a:ext uri="{FF2B5EF4-FFF2-40B4-BE49-F238E27FC236}">
-                <a16:creationId xmlns:a16="http://schemas.microsoft.com/office/drawing/2014/main" id="{F7B04004-3AD9-C664-2A94-67D4C671DE71}"/>
-              </a:ext>
-            </a:extLst>
-          </p:cNvPr>
-          <p:cNvPicPr>
-            <a:picLocks noChangeAspect="1" noChangeArrowheads="1"/>
-          </p:cNvPicPr>
-          <p:nvPr/>
-        </p:nvPicPr>
-        <p:blipFill>
-          <a:blip r:embed="rId6">
-            <a:extLst>
-              <a:ext uri="{96DAC541-7B7A-43D3-8B79-37D633B846F1}">
-                <asvg:svgBlip xmlns:asvg="http://schemas.microsoft.com/office/drawing/2016/SVG/main" r:embed="rId7"/>
-              </a:ext>
-            </a:extLst>
-          </a:blip>
-          <a:srcRect/>
-          <a:stretch/>
-        </p:blipFill>
         <p:spPr bwMode="auto">
           <a:xfrm>
-            <a:off x="3336813" y="4277938"/>
-            <a:ext cx="457200" cy="457200"/>
+            <a:off x="3279252" y="1948858"/>
+            <a:ext cx="1234766" cy="276999"/>
           </a:xfrm>
           <a:prstGeom prst="rect">
             <a:avLst/>
@@ -4278,36 +4194,175 @@
             </a:ext>
           </a:extLst>
         </p:spPr>
-      </p:pic>
+        <p:txBody>
+          <a:bodyPr wrap="square">
+            <a:spAutoFit/>
+          </a:bodyPr>
+          <a:lstStyle>
+            <a:lvl1pPr>
+              <a:defRPr>
+                <a:solidFill>
+                  <a:schemeClr val="tx1"/>
+                </a:solidFill>
+                <a:latin typeface="Calibri" panose="020F0502020204030204" pitchFamily="34" charset="0"/>
+              </a:defRPr>
+            </a:lvl1pPr>
+            <a:lvl2pPr marL="742950" indent="-285750">
+              <a:defRPr>
+                <a:solidFill>
+                  <a:schemeClr val="tx1"/>
+                </a:solidFill>
+                <a:latin typeface="Calibri" panose="020F0502020204030204" pitchFamily="34" charset="0"/>
+              </a:defRPr>
+            </a:lvl2pPr>
+            <a:lvl3pPr marL="1143000" indent="-228600">
+              <a:defRPr>
+                <a:solidFill>
+                  <a:schemeClr val="tx1"/>
+                </a:solidFill>
+                <a:latin typeface="Calibri" panose="020F0502020204030204" pitchFamily="34" charset="0"/>
+              </a:defRPr>
+            </a:lvl3pPr>
+            <a:lvl4pPr marL="1600200" indent="-228600">
+              <a:defRPr>
+                <a:solidFill>
+                  <a:schemeClr val="tx1"/>
+                </a:solidFill>
+                <a:latin typeface="Calibri" panose="020F0502020204030204" pitchFamily="34" charset="0"/>
+              </a:defRPr>
+            </a:lvl4pPr>
+            <a:lvl5pPr marL="2057400" indent="-228600">
+              <a:defRPr>
+                <a:solidFill>
+                  <a:schemeClr val="tx1"/>
+                </a:solidFill>
+                <a:latin typeface="Calibri" panose="020F0502020204030204" pitchFamily="34" charset="0"/>
+              </a:defRPr>
+            </a:lvl5pPr>
+            <a:lvl6pPr marL="2514600" indent="-228600" eaLnBrk="0" fontAlgn="base" hangingPunct="0">
+              <a:spcBef>
+                <a:spcPct val="0"/>
+              </a:spcBef>
+              <a:spcAft>
+                <a:spcPct val="0"/>
+              </a:spcAft>
+              <a:defRPr>
+                <a:solidFill>
+                  <a:schemeClr val="tx1"/>
+                </a:solidFill>
+                <a:latin typeface="Calibri" panose="020F0502020204030204" pitchFamily="34" charset="0"/>
+              </a:defRPr>
+            </a:lvl6pPr>
+            <a:lvl7pPr marL="2971800" indent="-228600" eaLnBrk="0" fontAlgn="base" hangingPunct="0">
+              <a:spcBef>
+                <a:spcPct val="0"/>
+              </a:spcBef>
+              <a:spcAft>
+                <a:spcPct val="0"/>
+              </a:spcAft>
+              <a:defRPr>
+                <a:solidFill>
+                  <a:schemeClr val="tx1"/>
+                </a:solidFill>
+                <a:latin typeface="Calibri" panose="020F0502020204030204" pitchFamily="34" charset="0"/>
+              </a:defRPr>
+            </a:lvl7pPr>
+            <a:lvl8pPr marL="3429000" indent="-228600" eaLnBrk="0" fontAlgn="base" hangingPunct="0">
+              <a:spcBef>
+                <a:spcPct val="0"/>
+              </a:spcBef>
+              <a:spcAft>
+                <a:spcPct val="0"/>
+              </a:spcAft>
+              <a:defRPr>
+                <a:solidFill>
+                  <a:schemeClr val="tx1"/>
+                </a:solidFill>
+                <a:latin typeface="Calibri" panose="020F0502020204030204" pitchFamily="34" charset="0"/>
+              </a:defRPr>
+            </a:lvl8pPr>
+            <a:lvl9pPr marL="3886200" indent="-228600" eaLnBrk="0" fontAlgn="base" hangingPunct="0">
+              <a:spcBef>
+                <a:spcPct val="0"/>
+              </a:spcBef>
+              <a:spcAft>
+                <a:spcPct val="0"/>
+              </a:spcAft>
+              <a:defRPr>
+                <a:solidFill>
+                  <a:schemeClr val="tx1"/>
+                </a:solidFill>
+                <a:latin typeface="Calibri" panose="020F0502020204030204" pitchFamily="34" charset="0"/>
+              </a:defRPr>
+            </a:lvl9pPr>
+          </a:lstStyle>
+          <a:p>
+            <a:pPr algn="ctr" eaLnBrk="1" hangingPunct="1"/>
+            <a:r>
+              <a:rPr lang="en-US" altLang="en-US" sz="1200" dirty="0">
+                <a:latin typeface="Arial" panose="020B0604020202020204" pitchFamily="34" charset="0"/>
+                <a:ea typeface="Amazon Ember" panose="020B0603020204020204" pitchFamily="34" charset="0"/>
+                <a:cs typeface="Arial" panose="020B0604020202020204" pitchFamily="34" charset="0"/>
+              </a:rPr>
+              <a:t>NAT gateway</a:t>
+            </a:r>
+          </a:p>
+        </p:txBody>
+      </p:sp>
       <p:pic>
         <p:nvPicPr>
-          <p:cNvPr id="146" name="Graphic 34">
-            <a:extLst>
-              <a:ext uri="{FF2B5EF4-FFF2-40B4-BE49-F238E27FC236}">
-                <a16:creationId xmlns:a16="http://schemas.microsoft.com/office/drawing/2014/main" id="{7D0BD3F8-025F-438E-E495-4F1E44513673}"/>
+          <p:cNvPr id="36" name="Graphic 35" descr="NAT gateway resource icon for the Amazon VPC service.&#10;">
+            <a:extLst>
+              <a:ext uri="{FF2B5EF4-FFF2-40B4-BE49-F238E27FC236}">
+                <a16:creationId xmlns:a16="http://schemas.microsoft.com/office/drawing/2014/main" id="{AC97A440-F735-4CA1-0A24-0384F6469E56}"/>
               </a:ext>
             </a:extLst>
           </p:cNvPr>
           <p:cNvPicPr>
-            <a:picLocks noChangeAspect="1" noChangeArrowheads="1"/>
+            <a:picLocks noChangeAspect="1"/>
           </p:cNvPicPr>
           <p:nvPr/>
         </p:nvPicPr>
         <p:blipFill>
-          <a:blip r:embed="rId6">
+          <a:blip r:embed="rId8">
             <a:extLst>
               <a:ext uri="{96DAC541-7B7A-43D3-8B79-37D633B846F1}">
-                <asvg:svgBlip xmlns:asvg="http://schemas.microsoft.com/office/drawing/2016/SVG/main" r:embed="rId7"/>
+                <asvg:svgBlip xmlns:asvg="http://schemas.microsoft.com/office/drawing/2016/SVG/main" r:embed="rId9"/>
               </a:ext>
             </a:extLst>
           </a:blip>
-          <a:srcRect/>
-          <a:stretch/>
+          <a:stretch>
+            <a:fillRect/>
+          </a:stretch>
         </p:blipFill>
+        <p:spPr>
+          <a:xfrm>
+            <a:off x="6436996" y="1491658"/>
+            <a:ext cx="457200" cy="457200"/>
+          </a:xfrm>
+          <a:prstGeom prst="rect">
+            <a:avLst/>
+          </a:prstGeom>
+        </p:spPr>
+      </p:pic>
+      <p:sp>
+        <p:nvSpPr>
+          <p:cNvPr id="37" name="TextBox 17">
+            <a:extLst>
+              <a:ext uri="{FF2B5EF4-FFF2-40B4-BE49-F238E27FC236}">
+                <a16:creationId xmlns:a16="http://schemas.microsoft.com/office/drawing/2014/main" id="{8CF9DF7C-F69C-66F8-C59B-C737CC94785A}"/>
+              </a:ext>
+            </a:extLst>
+          </p:cNvPr>
+          <p:cNvSpPr txBox="1">
+            <a:spLocks noChangeArrowheads="1"/>
+          </p:cNvSpPr>
+          <p:nvPr/>
+        </p:nvSpPr>
         <p:spPr bwMode="auto">
           <a:xfrm>
-            <a:off x="5642841" y="4283826"/>
-            <a:ext cx="457200" cy="457200"/>
+            <a:off x="6040740" y="1948858"/>
+            <a:ext cx="1234766" cy="276999"/>
           </a:xfrm>
           <a:prstGeom prst="rect">
             <a:avLst/>
@@ -4336,130 +4391,127 @@
             </a:ext>
           </a:extLst>
         </p:spPr>
-      </p:pic>
-      <p:sp>
-        <p:nvSpPr>
-          <p:cNvPr id="147" name="TextBox 146">
-            <a:extLst>
-              <a:ext uri="{FF2B5EF4-FFF2-40B4-BE49-F238E27FC236}">
-                <a16:creationId xmlns:a16="http://schemas.microsoft.com/office/drawing/2014/main" id="{46929181-19F6-984A-1709-765A5648CBFA}"/>
-              </a:ext>
-            </a:extLst>
-          </p:cNvPr>
-          <p:cNvSpPr txBox="1"/>
-          <p:nvPr/>
-        </p:nvSpPr>
-        <p:spPr>
-          <a:xfrm>
-            <a:off x="2676390" y="4650634"/>
-            <a:ext cx="1778046" cy="261610"/>
-          </a:xfrm>
-          <a:prstGeom prst="rect">
-            <a:avLst/>
-          </a:prstGeom>
-          <a:noFill/>
-        </p:spPr>
-        <p:txBody>
-          <a:bodyPr wrap="square" rtlCol="0">
+        <p:txBody>
+          <a:bodyPr wrap="square">
             <a:spAutoFit/>
           </a:bodyPr>
-          <a:lstStyle/>
-          <a:p>
-            <a:pPr algn="ctr"/>
-            <a:r>
-              <a:rPr lang="en-US" sz="1100" dirty="0">
+          <a:lstStyle>
+            <a:lvl1pPr>
+              <a:defRPr>
+                <a:solidFill>
+                  <a:schemeClr val="tx1"/>
+                </a:solidFill>
+                <a:latin typeface="Calibri" panose="020F0502020204030204" pitchFamily="34" charset="0"/>
+              </a:defRPr>
+            </a:lvl1pPr>
+            <a:lvl2pPr marL="742950" indent="-285750">
+              <a:defRPr>
+                <a:solidFill>
+                  <a:schemeClr val="tx1"/>
+                </a:solidFill>
+                <a:latin typeface="Calibri" panose="020F0502020204030204" pitchFamily="34" charset="0"/>
+              </a:defRPr>
+            </a:lvl2pPr>
+            <a:lvl3pPr marL="1143000" indent="-228600">
+              <a:defRPr>
+                <a:solidFill>
+                  <a:schemeClr val="tx1"/>
+                </a:solidFill>
+                <a:latin typeface="Calibri" panose="020F0502020204030204" pitchFamily="34" charset="0"/>
+              </a:defRPr>
+            </a:lvl3pPr>
+            <a:lvl4pPr marL="1600200" indent="-228600">
+              <a:defRPr>
+                <a:solidFill>
+                  <a:schemeClr val="tx1"/>
+                </a:solidFill>
+                <a:latin typeface="Calibri" panose="020F0502020204030204" pitchFamily="34" charset="0"/>
+              </a:defRPr>
+            </a:lvl4pPr>
+            <a:lvl5pPr marL="2057400" indent="-228600">
+              <a:defRPr>
+                <a:solidFill>
+                  <a:schemeClr val="tx1"/>
+                </a:solidFill>
+                <a:latin typeface="Calibri" panose="020F0502020204030204" pitchFamily="34" charset="0"/>
+              </a:defRPr>
+            </a:lvl5pPr>
+            <a:lvl6pPr marL="2514600" indent="-228600" eaLnBrk="0" fontAlgn="base" hangingPunct="0">
+              <a:spcBef>
+                <a:spcPct val="0"/>
+              </a:spcBef>
+              <a:spcAft>
+                <a:spcPct val="0"/>
+              </a:spcAft>
+              <a:defRPr>
+                <a:solidFill>
+                  <a:schemeClr val="tx1"/>
+                </a:solidFill>
+                <a:latin typeface="Calibri" panose="020F0502020204030204" pitchFamily="34" charset="0"/>
+              </a:defRPr>
+            </a:lvl6pPr>
+            <a:lvl7pPr marL="2971800" indent="-228600" eaLnBrk="0" fontAlgn="base" hangingPunct="0">
+              <a:spcBef>
+                <a:spcPct val="0"/>
+              </a:spcBef>
+              <a:spcAft>
+                <a:spcPct val="0"/>
+              </a:spcAft>
+              <a:defRPr>
+                <a:solidFill>
+                  <a:schemeClr val="tx1"/>
+                </a:solidFill>
+                <a:latin typeface="Calibri" panose="020F0502020204030204" pitchFamily="34" charset="0"/>
+              </a:defRPr>
+            </a:lvl7pPr>
+            <a:lvl8pPr marL="3429000" indent="-228600" eaLnBrk="0" fontAlgn="base" hangingPunct="0">
+              <a:spcBef>
+                <a:spcPct val="0"/>
+              </a:spcBef>
+              <a:spcAft>
+                <a:spcPct val="0"/>
+              </a:spcAft>
+              <a:defRPr>
+                <a:solidFill>
+                  <a:schemeClr val="tx1"/>
+                </a:solidFill>
+                <a:latin typeface="Calibri" panose="020F0502020204030204" pitchFamily="34" charset="0"/>
+              </a:defRPr>
+            </a:lvl8pPr>
+            <a:lvl9pPr marL="3886200" indent="-228600" eaLnBrk="0" fontAlgn="base" hangingPunct="0">
+              <a:spcBef>
+                <a:spcPct val="0"/>
+              </a:spcBef>
+              <a:spcAft>
+                <a:spcPct val="0"/>
+              </a:spcAft>
+              <a:defRPr>
+                <a:solidFill>
+                  <a:schemeClr val="tx1"/>
+                </a:solidFill>
+                <a:latin typeface="Calibri" panose="020F0502020204030204" pitchFamily="34" charset="0"/>
+              </a:defRPr>
+            </a:lvl9pPr>
+          </a:lstStyle>
+          <a:p>
+            <a:pPr algn="ctr" eaLnBrk="1" hangingPunct="1"/>
+            <a:r>
+              <a:rPr lang="en-US" altLang="en-US" sz="1200" dirty="0">
                 <a:latin typeface="Arial" panose="020B0604020202020204" pitchFamily="34" charset="0"/>
+                <a:ea typeface="Amazon Ember" panose="020B0603020204020204" pitchFamily="34" charset="0"/>
                 <a:cs typeface="Arial" panose="020B0604020202020204" pitchFamily="34" charset="0"/>
               </a:rPr>
-              <a:t>Container</a:t>
-            </a:r>
-          </a:p>
-        </p:txBody>
-      </p:sp>
-      <p:sp>
-        <p:nvSpPr>
-          <p:cNvPr id="148" name="TextBox 147">
-            <a:extLst>
-              <a:ext uri="{FF2B5EF4-FFF2-40B4-BE49-F238E27FC236}">
-                <a16:creationId xmlns:a16="http://schemas.microsoft.com/office/drawing/2014/main" id="{698FFEA5-59DC-1857-7F1D-C336F07038C0}"/>
-              </a:ext>
-            </a:extLst>
-          </p:cNvPr>
-          <p:cNvSpPr txBox="1"/>
-          <p:nvPr/>
-        </p:nvSpPr>
-        <p:spPr>
-          <a:xfrm>
-            <a:off x="4997463" y="4650634"/>
-            <a:ext cx="1778046" cy="261610"/>
-          </a:xfrm>
-          <a:prstGeom prst="rect">
-            <a:avLst/>
-          </a:prstGeom>
-          <a:noFill/>
-        </p:spPr>
-        <p:txBody>
-          <a:bodyPr wrap="square" rtlCol="0">
-            <a:spAutoFit/>
-          </a:bodyPr>
-          <a:lstStyle/>
-          <a:p>
-            <a:pPr algn="ctr"/>
-            <a:r>
-              <a:rPr lang="en-US" sz="1100" dirty="0">
-                <a:latin typeface="Arial" panose="020B0604020202020204" pitchFamily="34" charset="0"/>
-                <a:cs typeface="Arial" panose="020B0604020202020204" pitchFamily="34" charset="0"/>
-              </a:rPr>
-              <a:t>Container</a:t>
-            </a:r>
-          </a:p>
-        </p:txBody>
-      </p:sp>
-      <p:sp>
-        <p:nvSpPr>
-          <p:cNvPr id="149" name="TextBox 148">
-            <a:extLst>
-              <a:ext uri="{FF2B5EF4-FFF2-40B4-BE49-F238E27FC236}">
-                <a16:creationId xmlns:a16="http://schemas.microsoft.com/office/drawing/2014/main" id="{19AE27CF-DD64-05ED-360B-4B08CC39A5C2}"/>
-              </a:ext>
-            </a:extLst>
-          </p:cNvPr>
-          <p:cNvSpPr txBox="1"/>
-          <p:nvPr/>
-        </p:nvSpPr>
-        <p:spPr>
-          <a:xfrm>
-            <a:off x="786358" y="3166123"/>
-            <a:ext cx="1769070" cy="261610"/>
-          </a:xfrm>
-          <a:prstGeom prst="rect">
-            <a:avLst/>
-          </a:prstGeom>
-          <a:noFill/>
-        </p:spPr>
-        <p:txBody>
-          <a:bodyPr wrap="square" rtlCol="0">
-            <a:spAutoFit/>
-          </a:bodyPr>
-          <a:lstStyle/>
-          <a:p>
-            <a:pPr algn="ctr"/>
-            <a:r>
-              <a:rPr lang="en-US" sz="1100" dirty="0">
-                <a:latin typeface="Arial" panose="020B0604020202020204" pitchFamily="34" charset="0"/>
-                <a:cs typeface="Arial" panose="020B0604020202020204" pitchFamily="34" charset="0"/>
-              </a:rPr>
-              <a:t>Internet gateway</a:t>
+              <a:t>NAT gateway</a:t>
             </a:r>
           </a:p>
         </p:txBody>
       </p:sp>
       <p:pic>
         <p:nvPicPr>
-          <p:cNvPr id="150" name="Graphic 149">
-            <a:extLst>
-              <a:ext uri="{FF2B5EF4-FFF2-40B4-BE49-F238E27FC236}">
-                <a16:creationId xmlns:a16="http://schemas.microsoft.com/office/drawing/2014/main" id="{88721335-1E2B-2D45-51F2-95C41F59E94B}"/>
+          <p:cNvPr id="38" name="Graphic 37" descr="Route table resource icon for the Amazon Route 53 service.">
+            <a:extLst>
+              <a:ext uri="{FF2B5EF4-FFF2-40B4-BE49-F238E27FC236}">
+                <a16:creationId xmlns:a16="http://schemas.microsoft.com/office/drawing/2014/main" id="{0CE17D1D-E32E-0323-94F2-2D0B6FAF7582}"/>
               </a:ext>
             </a:extLst>
           </p:cNvPr>
@@ -4469,10 +4521,10 @@
           <p:nvPr/>
         </p:nvPicPr>
         <p:blipFill>
-          <a:blip r:embed="rId8">
+          <a:blip r:embed="rId10">
             <a:extLst>
               <a:ext uri="{96DAC541-7B7A-43D3-8B79-37D633B846F1}">
-                <asvg:svgBlip xmlns:asvg="http://schemas.microsoft.com/office/drawing/2016/SVG/main" r:embed="rId9"/>
+                <asvg:svgBlip xmlns:asvg="http://schemas.microsoft.com/office/drawing/2016/SVG/main" r:embed="rId11"/>
               </a:ext>
             </a:extLst>
           </a:blip>
@@ -4482,43 +4534,7 @@
         </p:blipFill>
         <p:spPr>
           <a:xfrm>
-            <a:off x="1435943" y="2686097"/>
-            <a:ext cx="469900" cy="469900"/>
-          </a:xfrm>
-          <a:prstGeom prst="rect">
-            <a:avLst/>
-          </a:prstGeom>
-        </p:spPr>
-      </p:pic>
-      <p:pic>
-        <p:nvPicPr>
-          <p:cNvPr id="5" name="Graphic 4">
-            <a:extLst>
-              <a:ext uri="{FF2B5EF4-FFF2-40B4-BE49-F238E27FC236}">
-                <a16:creationId xmlns:a16="http://schemas.microsoft.com/office/drawing/2014/main" id="{08DBCFA8-6A6B-283D-435A-084AC1E6F6C1}"/>
-              </a:ext>
-            </a:extLst>
-          </p:cNvPr>
-          <p:cNvPicPr>
-            <a:picLocks noChangeAspect="1"/>
-          </p:cNvPicPr>
-          <p:nvPr/>
-        </p:nvPicPr>
-        <p:blipFill>
-          <a:blip r:embed="rId10">
-            <a:extLst>
-              <a:ext uri="{96DAC541-7B7A-43D3-8B79-37D633B846F1}">
-                <asvg:svgBlip xmlns:asvg="http://schemas.microsoft.com/office/drawing/2016/SVG/main" r:embed="rId11"/>
-              </a:ext>
-            </a:extLst>
-          </a:blip>
-          <a:stretch>
-            <a:fillRect/>
-          </a:stretch>
-        </p:blipFill>
-        <p:spPr>
-          <a:xfrm>
-            <a:off x="3299131" y="2712400"/>
+            <a:off x="1621674" y="3223031"/>
             <a:ext cx="457200" cy="457200"/>
           </a:xfrm>
           <a:prstGeom prst="rect">
@@ -4526,42 +4542,425 @@
           </a:prstGeom>
         </p:spPr>
       </p:pic>
-      <p:pic>
-        <p:nvPicPr>
-          <p:cNvPr id="6" name="Graphic 5">
-            <a:extLst>
-              <a:ext uri="{FF2B5EF4-FFF2-40B4-BE49-F238E27FC236}">
-                <a16:creationId xmlns:a16="http://schemas.microsoft.com/office/drawing/2014/main" id="{CD9C0553-BE2D-58D2-8E54-DB7EFA3D53E6}"/>
-              </a:ext>
-            </a:extLst>
-          </p:cNvPr>
-          <p:cNvPicPr>
-            <a:picLocks noChangeAspect="1"/>
-          </p:cNvPicPr>
+      <p:sp>
+        <p:nvSpPr>
+          <p:cNvPr id="39" name="TextBox 26">
+            <a:extLst>
+              <a:ext uri="{FF2B5EF4-FFF2-40B4-BE49-F238E27FC236}">
+                <a16:creationId xmlns:a16="http://schemas.microsoft.com/office/drawing/2014/main" id="{FD777D84-EBB5-8574-31A8-8217207E2B7F}"/>
+              </a:ext>
+            </a:extLst>
+          </p:cNvPr>
+          <p:cNvSpPr txBox="1">
+            <a:spLocks noChangeArrowheads="1"/>
+          </p:cNvSpPr>
           <p:nvPr/>
-        </p:nvPicPr>
-        <p:blipFill>
-          <a:blip r:embed="rId10">
-            <a:extLst>
-              <a:ext uri="{96DAC541-7B7A-43D3-8B79-37D633B846F1}">
-                <asvg:svgBlip xmlns:asvg="http://schemas.microsoft.com/office/drawing/2016/SVG/main" r:embed="rId11"/>
-              </a:ext>
-            </a:extLst>
-          </a:blip>
-          <a:stretch>
-            <a:fillRect/>
-          </a:stretch>
-        </p:blipFill>
-        <p:spPr>
+        </p:nvSpPr>
+        <p:spPr bwMode="auto">
           <a:xfrm>
-            <a:off x="5678510" y="2706274"/>
-            <a:ext cx="457200" cy="457200"/>
+            <a:off x="1214927" y="3677768"/>
+            <a:ext cx="1270000" cy="276999"/>
           </a:xfrm>
           <a:prstGeom prst="rect">
             <a:avLst/>
           </a:prstGeom>
+          <a:noFill/>
+          <a:ln>
+            <a:noFill/>
+          </a:ln>
+          <a:extLst>
+            <a:ext uri="{909E8E84-426E-40DD-AFC4-6F175D3DCCD1}">
+              <a14:hiddenFill xmlns:a14="http://schemas.microsoft.com/office/drawing/2010/main">
+                <a:solidFill>
+                  <a:srgbClr val="FFFFFF"/>
+                </a:solidFill>
+              </a14:hiddenFill>
+            </a:ext>
+            <a:ext uri="{91240B29-F687-4F45-9708-019B960494DF}">
+              <a14:hiddenLine xmlns:a14="http://schemas.microsoft.com/office/drawing/2010/main" w="9525">
+                <a:solidFill>
+                  <a:srgbClr val="000000"/>
+                </a:solidFill>
+                <a:miter lim="800000"/>
+                <a:headEnd/>
+                <a:tailEnd/>
+              </a14:hiddenLine>
+            </a:ext>
+          </a:extLst>
         </p:spPr>
-      </p:pic>
+        <p:txBody>
+          <a:bodyPr wrap="square">
+            <a:spAutoFit/>
+          </a:bodyPr>
+          <a:lstStyle>
+            <a:lvl1pPr>
+              <a:defRPr>
+                <a:solidFill>
+                  <a:schemeClr val="tx1"/>
+                </a:solidFill>
+                <a:latin typeface="Calibri" panose="020F0502020204030204" pitchFamily="34" charset="0"/>
+              </a:defRPr>
+            </a:lvl1pPr>
+            <a:lvl2pPr marL="742950" indent="-285750">
+              <a:defRPr>
+                <a:solidFill>
+                  <a:schemeClr val="tx1"/>
+                </a:solidFill>
+                <a:latin typeface="Calibri" panose="020F0502020204030204" pitchFamily="34" charset="0"/>
+              </a:defRPr>
+            </a:lvl2pPr>
+            <a:lvl3pPr marL="1143000" indent="-228600">
+              <a:defRPr>
+                <a:solidFill>
+                  <a:schemeClr val="tx1"/>
+                </a:solidFill>
+                <a:latin typeface="Calibri" panose="020F0502020204030204" pitchFamily="34" charset="0"/>
+              </a:defRPr>
+            </a:lvl3pPr>
+            <a:lvl4pPr marL="1600200" indent="-228600">
+              <a:defRPr>
+                <a:solidFill>
+                  <a:schemeClr val="tx1"/>
+                </a:solidFill>
+                <a:latin typeface="Calibri" panose="020F0502020204030204" pitchFamily="34" charset="0"/>
+              </a:defRPr>
+            </a:lvl4pPr>
+            <a:lvl5pPr marL="2057400" indent="-228600">
+              <a:defRPr>
+                <a:solidFill>
+                  <a:schemeClr val="tx1"/>
+                </a:solidFill>
+                <a:latin typeface="Calibri" panose="020F0502020204030204" pitchFamily="34" charset="0"/>
+              </a:defRPr>
+            </a:lvl5pPr>
+            <a:lvl6pPr marL="2514600" indent="-228600" eaLnBrk="0" fontAlgn="base" hangingPunct="0">
+              <a:spcBef>
+                <a:spcPct val="0"/>
+              </a:spcBef>
+              <a:spcAft>
+                <a:spcPct val="0"/>
+              </a:spcAft>
+              <a:defRPr>
+                <a:solidFill>
+                  <a:schemeClr val="tx1"/>
+                </a:solidFill>
+                <a:latin typeface="Calibri" panose="020F0502020204030204" pitchFamily="34" charset="0"/>
+              </a:defRPr>
+            </a:lvl6pPr>
+            <a:lvl7pPr marL="2971800" indent="-228600" eaLnBrk="0" fontAlgn="base" hangingPunct="0">
+              <a:spcBef>
+                <a:spcPct val="0"/>
+              </a:spcBef>
+              <a:spcAft>
+                <a:spcPct val="0"/>
+              </a:spcAft>
+              <a:defRPr>
+                <a:solidFill>
+                  <a:schemeClr val="tx1"/>
+                </a:solidFill>
+                <a:latin typeface="Calibri" panose="020F0502020204030204" pitchFamily="34" charset="0"/>
+              </a:defRPr>
+            </a:lvl7pPr>
+            <a:lvl8pPr marL="3429000" indent="-228600" eaLnBrk="0" fontAlgn="base" hangingPunct="0">
+              <a:spcBef>
+                <a:spcPct val="0"/>
+              </a:spcBef>
+              <a:spcAft>
+                <a:spcPct val="0"/>
+              </a:spcAft>
+              <a:defRPr>
+                <a:solidFill>
+                  <a:schemeClr val="tx1"/>
+                </a:solidFill>
+                <a:latin typeface="Calibri" panose="020F0502020204030204" pitchFamily="34" charset="0"/>
+              </a:defRPr>
+            </a:lvl8pPr>
+            <a:lvl9pPr marL="3886200" indent="-228600" eaLnBrk="0" fontAlgn="base" hangingPunct="0">
+              <a:spcBef>
+                <a:spcPct val="0"/>
+              </a:spcBef>
+              <a:spcAft>
+                <a:spcPct val="0"/>
+              </a:spcAft>
+              <a:defRPr>
+                <a:solidFill>
+                  <a:schemeClr val="tx1"/>
+                </a:solidFill>
+                <a:latin typeface="Calibri" panose="020F0502020204030204" pitchFamily="34" charset="0"/>
+              </a:defRPr>
+            </a:lvl9pPr>
+          </a:lstStyle>
+          <a:p>
+            <a:pPr algn="ctr" eaLnBrk="1" hangingPunct="1"/>
+            <a:r>
+              <a:rPr lang="en-US" altLang="en-US" sz="1200" dirty="0">
+                <a:latin typeface="Arial" panose="020B0604020202020204" pitchFamily="34" charset="0"/>
+                <a:ea typeface="Amazon Ember" panose="020B0603020204020204" pitchFamily="34" charset="0"/>
+                <a:cs typeface="Arial" panose="020B0604020202020204" pitchFamily="34" charset="0"/>
+              </a:rPr>
+              <a:t>Route table</a:t>
+            </a:r>
+          </a:p>
+        </p:txBody>
+      </p:sp>
+      <p:cxnSp>
+        <p:nvCxnSpPr>
+          <p:cNvPr id="41" name="Straight Arrow Connector 40">
+            <a:extLst>
+              <a:ext uri="{FF2B5EF4-FFF2-40B4-BE49-F238E27FC236}">
+                <a16:creationId xmlns:a16="http://schemas.microsoft.com/office/drawing/2014/main" id="{62CF1B9A-B075-B727-7AA6-623A6EB154ED}"/>
+              </a:ext>
+            </a:extLst>
+          </p:cNvPr>
+          <p:cNvCxnSpPr>
+            <a:endCxn id="35" idx="2"/>
+          </p:cNvCxnSpPr>
+          <p:nvPr/>
+        </p:nvCxnSpPr>
+        <p:spPr>
+          <a:xfrm flipV="1">
+            <a:off x="3896635" y="2225857"/>
+            <a:ext cx="0" cy="1347076"/>
+          </a:xfrm>
+          <a:prstGeom prst="straightConnector1">
+            <a:avLst/>
+          </a:prstGeom>
+          <a:ln w="41275">
+            <a:solidFill>
+              <a:schemeClr val="bg2">
+                <a:lumMod val="50000"/>
+              </a:schemeClr>
+            </a:solidFill>
+            <a:tailEnd type="triangle"/>
+          </a:ln>
+        </p:spPr>
+        <p:style>
+          <a:lnRef idx="1">
+            <a:schemeClr val="accent1"/>
+          </a:lnRef>
+          <a:fillRef idx="0">
+            <a:schemeClr val="accent1"/>
+          </a:fillRef>
+          <a:effectRef idx="0">
+            <a:schemeClr val="accent1"/>
+          </a:effectRef>
+          <a:fontRef idx="minor">
+            <a:schemeClr val="tx1"/>
+          </a:fontRef>
+        </p:style>
+      </p:cxnSp>
+      <p:cxnSp>
+        <p:nvCxnSpPr>
+          <p:cNvPr id="42" name="Straight Arrow Connector 41">
+            <a:extLst>
+              <a:ext uri="{FF2B5EF4-FFF2-40B4-BE49-F238E27FC236}">
+                <a16:creationId xmlns:a16="http://schemas.microsoft.com/office/drawing/2014/main" id="{BF1A1706-1409-249E-D2C5-544F3595C26F}"/>
+              </a:ext>
+            </a:extLst>
+          </p:cNvPr>
+          <p:cNvCxnSpPr>
+            <a:cxnSpLocks/>
+            <a:endCxn id="37" idx="2"/>
+          </p:cNvCxnSpPr>
+          <p:nvPr/>
+        </p:nvCxnSpPr>
+        <p:spPr>
+          <a:xfrm flipH="1" flipV="1">
+            <a:off x="6658123" y="2225857"/>
+            <a:ext cx="7473" cy="1347076"/>
+          </a:xfrm>
+          <a:prstGeom prst="straightConnector1">
+            <a:avLst/>
+          </a:prstGeom>
+          <a:ln w="41275">
+            <a:solidFill>
+              <a:schemeClr val="bg2">
+                <a:lumMod val="50000"/>
+              </a:schemeClr>
+            </a:solidFill>
+            <a:tailEnd type="triangle"/>
+          </a:ln>
+        </p:spPr>
+        <p:style>
+          <a:lnRef idx="1">
+            <a:schemeClr val="accent1"/>
+          </a:lnRef>
+          <a:fillRef idx="0">
+            <a:schemeClr val="accent1"/>
+          </a:fillRef>
+          <a:effectRef idx="0">
+            <a:schemeClr val="accent1"/>
+          </a:effectRef>
+          <a:fontRef idx="minor">
+            <a:schemeClr val="tx1"/>
+          </a:fontRef>
+        </p:style>
+      </p:cxnSp>
+      <p:sp>
+        <p:nvSpPr>
+          <p:cNvPr id="45" name="TextBox 44">
+            <a:extLst>
+              <a:ext uri="{FF2B5EF4-FFF2-40B4-BE49-F238E27FC236}">
+                <a16:creationId xmlns:a16="http://schemas.microsoft.com/office/drawing/2014/main" id="{EE184A13-2CAE-D771-1AE0-EC1FB637EDE4}"/>
+              </a:ext>
+            </a:extLst>
+          </p:cNvPr>
+          <p:cNvSpPr txBox="1"/>
+          <p:nvPr/>
+        </p:nvSpPr>
+        <p:spPr>
+          <a:xfrm>
+            <a:off x="3002708" y="3623327"/>
+            <a:ext cx="1802799" cy="276999"/>
+          </a:xfrm>
+          <a:prstGeom prst="rect">
+            <a:avLst/>
+          </a:prstGeom>
+          <a:noFill/>
+        </p:spPr>
+        <p:txBody>
+          <a:bodyPr wrap="square" rtlCol="0">
+            <a:spAutoFit/>
+          </a:bodyPr>
+          <a:lstStyle/>
+          <a:p>
+            <a:r>
+              <a:rPr lang="en-US" sz="1200" dirty="0"/>
+              <a:t>Outbound internet traffic</a:t>
+            </a:r>
+          </a:p>
+        </p:txBody>
+      </p:sp>
+      <p:sp>
+        <p:nvSpPr>
+          <p:cNvPr id="46" name="TextBox 45">
+            <a:extLst>
+              <a:ext uri="{FF2B5EF4-FFF2-40B4-BE49-F238E27FC236}">
+                <a16:creationId xmlns:a16="http://schemas.microsoft.com/office/drawing/2014/main" id="{7B6E45F4-6D86-5616-024D-DBF8DE7EF2E8}"/>
+              </a:ext>
+            </a:extLst>
+          </p:cNvPr>
+          <p:cNvSpPr txBox="1"/>
+          <p:nvPr/>
+        </p:nvSpPr>
+        <p:spPr>
+          <a:xfrm>
+            <a:off x="5791738" y="3623314"/>
+            <a:ext cx="1894921" cy="276999"/>
+          </a:xfrm>
+          <a:prstGeom prst="rect">
+            <a:avLst/>
+          </a:prstGeom>
+          <a:noFill/>
+        </p:spPr>
+        <p:txBody>
+          <a:bodyPr wrap="square" rtlCol="0">
+            <a:spAutoFit/>
+          </a:bodyPr>
+          <a:lstStyle/>
+          <a:p>
+            <a:r>
+              <a:rPr lang="en-US" sz="1200" dirty="0"/>
+              <a:t>Outbound internet traffic</a:t>
+            </a:r>
+          </a:p>
+        </p:txBody>
+      </p:sp>
+      <p:cxnSp>
+        <p:nvCxnSpPr>
+          <p:cNvPr id="47" name="Straight Arrow Connector 46">
+            <a:extLst>
+              <a:ext uri="{FF2B5EF4-FFF2-40B4-BE49-F238E27FC236}">
+                <a16:creationId xmlns:a16="http://schemas.microsoft.com/office/drawing/2014/main" id="{7E5D9950-D25F-2650-A461-6D82BB77D520}"/>
+              </a:ext>
+            </a:extLst>
+          </p:cNvPr>
+          <p:cNvCxnSpPr>
+            <a:cxnSpLocks/>
+            <a:endCxn id="32" idx="3"/>
+          </p:cNvCxnSpPr>
+          <p:nvPr/>
+        </p:nvCxnSpPr>
+        <p:spPr>
+          <a:xfrm flipH="1">
+            <a:off x="2109175" y="1720258"/>
+            <a:ext cx="1552059" cy="944"/>
+          </a:xfrm>
+          <a:prstGeom prst="straightConnector1">
+            <a:avLst/>
+          </a:prstGeom>
+          <a:ln w="41275">
+            <a:solidFill>
+              <a:schemeClr val="bg2">
+                <a:lumMod val="50000"/>
+              </a:schemeClr>
+            </a:solidFill>
+            <a:tailEnd type="triangle"/>
+          </a:ln>
+        </p:spPr>
+        <p:style>
+          <a:lnRef idx="1">
+            <a:schemeClr val="accent1"/>
+          </a:lnRef>
+          <a:fillRef idx="0">
+            <a:schemeClr val="accent1"/>
+          </a:fillRef>
+          <a:effectRef idx="0">
+            <a:schemeClr val="accent1"/>
+          </a:effectRef>
+          <a:fontRef idx="minor">
+            <a:schemeClr val="tx1"/>
+          </a:fontRef>
+        </p:style>
+      </p:cxnSp>
+      <p:cxnSp>
+        <p:nvCxnSpPr>
+          <p:cNvPr id="50" name="Straight Arrow Connector 49">
+            <a:extLst>
+              <a:ext uri="{FF2B5EF4-FFF2-40B4-BE49-F238E27FC236}">
+                <a16:creationId xmlns:a16="http://schemas.microsoft.com/office/drawing/2014/main" id="{3FC908AD-07EF-5568-6E69-336CFA822B60}"/>
+              </a:ext>
+            </a:extLst>
+          </p:cNvPr>
+          <p:cNvCxnSpPr>
+            <a:cxnSpLocks/>
+            <a:stCxn id="36" idx="1"/>
+            <a:endCxn id="34" idx="3"/>
+          </p:cNvCxnSpPr>
+          <p:nvPr/>
+        </p:nvCxnSpPr>
+        <p:spPr>
+          <a:xfrm flipH="1">
+            <a:off x="4132708" y="1720258"/>
+            <a:ext cx="2304288" cy="0"/>
+          </a:xfrm>
+          <a:prstGeom prst="straightConnector1">
+            <a:avLst/>
+          </a:prstGeom>
+          <a:ln w="41275">
+            <a:solidFill>
+              <a:schemeClr val="bg2">
+                <a:lumMod val="50000"/>
+              </a:schemeClr>
+            </a:solidFill>
+            <a:tailEnd type="none"/>
+          </a:ln>
+        </p:spPr>
+        <p:style>
+          <a:lnRef idx="1">
+            <a:schemeClr val="accent1"/>
+          </a:lnRef>
+          <a:fillRef idx="0">
+            <a:schemeClr val="accent1"/>
+          </a:fillRef>
+          <a:effectRef idx="0">
+            <a:schemeClr val="accent1"/>
+          </a:effectRef>
+          <a:fontRef idx="minor">
+            <a:schemeClr val="tx1"/>
+          </a:fontRef>
+        </p:style>
+      </p:cxnSp>
     </p:spTree>
     <p:extLst>
       <p:ext uri="{BB962C8B-B14F-4D97-AF65-F5344CB8AC3E}">

</xml_diff>